<commit_message>
Added ActionResult. Updated buttons to icons. Added status flags.
</commit_message>
<xml_diff>
--- a/DotNetStateMachines.pptx
+++ b/DotNetStateMachines.pptx
@@ -6,9 +6,29 @@
   </p:sldMasterIdLst>
   <p:sldIdLst>
     <p:sldId id="256" r:id="rId2"/>
-    <p:sldId id="257" r:id="rId3"/>
-    <p:sldId id="258" r:id="rId4"/>
-    <p:sldId id="259" r:id="rId5"/>
+    <p:sldId id="261" r:id="rId3"/>
+    <p:sldId id="257" r:id="rId4"/>
+    <p:sldId id="262" r:id="rId5"/>
+    <p:sldId id="263" r:id="rId6"/>
+    <p:sldId id="265" r:id="rId7"/>
+    <p:sldId id="264" r:id="rId8"/>
+    <p:sldId id="266" r:id="rId9"/>
+    <p:sldId id="268" r:id="rId10"/>
+    <p:sldId id="267" r:id="rId11"/>
+    <p:sldId id="279" r:id="rId12"/>
+    <p:sldId id="270" r:id="rId13"/>
+    <p:sldId id="271" r:id="rId14"/>
+    <p:sldId id="272" r:id="rId15"/>
+    <p:sldId id="273" r:id="rId16"/>
+    <p:sldId id="275" r:id="rId17"/>
+    <p:sldId id="276" r:id="rId18"/>
+    <p:sldId id="274" r:id="rId19"/>
+    <p:sldId id="278" r:id="rId20"/>
+    <p:sldId id="277" r:id="rId21"/>
+    <p:sldId id="281" r:id="rId22"/>
+    <p:sldId id="282" r:id="rId23"/>
+    <p:sldId id="283" r:id="rId24"/>
+    <p:sldId id="280" r:id="rId25"/>
   </p:sldIdLst>
   <p:sldSz cx="12192000" cy="6858000"/>
   <p:notesSz cx="6858000" cy="9144000"/>
@@ -107,6 +127,11 @@
       </a:defRPr>
     </a:lvl9pPr>
   </p:defaultTextStyle>
+  <p:extLst>
+    <p:ext uri="{EFAFB233-063F-42B5-8137-9DF3F51BA10A}">
+      <p15:sldGuideLst xmlns:p15="http://schemas.microsoft.com/office/powerpoint/2012/main"/>
+    </p:ext>
+  </p:extLst>
 </p:presentation>
 </file>
 
@@ -324,7 +349,7 @@
             <a:fld id="{B61BEF0D-F0BB-DE4B-95CE-6DB70DBA9567}" type="datetimeFigureOut">
               <a:rPr lang="en-US" dirty="0"/>
               <a:pPr/>
-              <a:t>8/22/2020</a:t>
+              <a:t>8/25/2020</a:t>
             </a:fld>
             <a:endParaRPr lang="en-US" dirty="0"/>
           </a:p>
@@ -612,7 +637,7 @@
             <a:fld id="{B61BEF0D-F0BB-DE4B-95CE-6DB70DBA9567}" type="datetimeFigureOut">
               <a:rPr lang="en-US" dirty="0"/>
               <a:pPr/>
-              <a:t>8/22/2020</a:t>
+              <a:t>8/25/2020</a:t>
             </a:fld>
             <a:endParaRPr lang="en-US" dirty="0"/>
           </a:p>
@@ -868,7 +893,7 @@
             <a:fld id="{B61BEF0D-F0BB-DE4B-95CE-6DB70DBA9567}" type="datetimeFigureOut">
               <a:rPr lang="en-US" dirty="0"/>
               <a:pPr/>
-              <a:t>8/22/2020</a:t>
+              <a:t>8/25/2020</a:t>
             </a:fld>
             <a:endParaRPr lang="en-US" dirty="0"/>
           </a:p>
@@ -1334,7 +1359,7 @@
             <a:fld id="{B61BEF0D-F0BB-DE4B-95CE-6DB70DBA9567}" type="datetimeFigureOut">
               <a:rPr lang="en-US" dirty="0"/>
               <a:pPr/>
-              <a:t>8/22/2020</a:t>
+              <a:t>8/25/2020</a:t>
             </a:fld>
             <a:endParaRPr lang="en-US" dirty="0"/>
           </a:p>
@@ -1511,7 +1536,7 @@
             <a:fld id="{B61BEF0D-F0BB-DE4B-95CE-6DB70DBA9567}" type="datetimeFigureOut">
               <a:rPr lang="en-US" dirty="0"/>
               <a:pPr/>
-              <a:t>8/22/2020</a:t>
+              <a:t>8/25/2020</a:t>
             </a:fld>
             <a:endParaRPr lang="en-US" dirty="0"/>
           </a:p>
@@ -2084,7 +2109,7 @@
             <a:fld id="{B61BEF0D-F0BB-DE4B-95CE-6DB70DBA9567}" type="datetimeFigureOut">
               <a:rPr lang="en-US" dirty="0"/>
               <a:pPr/>
-              <a:t>8/22/2020</a:t>
+              <a:t>8/25/2020</a:t>
             </a:fld>
             <a:endParaRPr lang="en-US" dirty="0"/>
           </a:p>
@@ -2413,7 +2438,7 @@
             <a:fld id="{B61BEF0D-F0BB-DE4B-95CE-6DB70DBA9567}" type="datetimeFigureOut">
               <a:rPr lang="en-US" dirty="0"/>
               <a:pPr/>
-              <a:t>8/22/2020</a:t>
+              <a:t>8/25/2020</a:t>
             </a:fld>
             <a:endParaRPr lang="en-US" dirty="0"/>
           </a:p>
@@ -2585,7 +2610,7 @@
             <a:fld id="{B61BEF0D-F0BB-DE4B-95CE-6DB70DBA9567}" type="datetimeFigureOut">
               <a:rPr lang="en-US" dirty="0"/>
               <a:pPr/>
-              <a:t>8/22/2020</a:t>
+              <a:t>8/25/2020</a:t>
             </a:fld>
             <a:endParaRPr lang="en-US" dirty="0"/>
           </a:p>
@@ -2762,7 +2787,7 @@
             <a:fld id="{B61BEF0D-F0BB-DE4B-95CE-6DB70DBA9567}" type="datetimeFigureOut">
               <a:rPr lang="en-US" dirty="0"/>
               <a:pPr/>
-              <a:t>8/22/2020</a:t>
+              <a:t>8/25/2020</a:t>
             </a:fld>
             <a:endParaRPr lang="en-US" dirty="0"/>
           </a:p>
@@ -2929,7 +2954,7 @@
             <a:fld id="{B61BEF0D-F0BB-DE4B-95CE-6DB70DBA9567}" type="datetimeFigureOut">
               <a:rPr lang="en-US" dirty="0"/>
               <a:pPr/>
-              <a:t>8/22/2020</a:t>
+              <a:t>8/25/2020</a:t>
             </a:fld>
             <a:endParaRPr lang="en-US" dirty="0"/>
           </a:p>
@@ -3183,7 +3208,7 @@
             <a:fld id="{B61BEF0D-F0BB-DE4B-95CE-6DB70DBA9567}" type="datetimeFigureOut">
               <a:rPr lang="en-US" dirty="0"/>
               <a:pPr/>
-              <a:t>8/22/2020</a:t>
+              <a:t>8/25/2020</a:t>
             </a:fld>
             <a:endParaRPr lang="en-US" dirty="0"/>
           </a:p>
@@ -3472,7 +3497,7 @@
             <a:fld id="{B61BEF0D-F0BB-DE4B-95CE-6DB70DBA9567}" type="datetimeFigureOut">
               <a:rPr lang="en-US" dirty="0"/>
               <a:pPr/>
-              <a:t>8/22/2020</a:t>
+              <a:t>8/25/2020</a:t>
             </a:fld>
             <a:endParaRPr lang="en-US" dirty="0"/>
           </a:p>
@@ -3899,7 +3924,7 @@
             <a:fld id="{B61BEF0D-F0BB-DE4B-95CE-6DB70DBA9567}" type="datetimeFigureOut">
               <a:rPr lang="en-US" dirty="0"/>
               <a:pPr/>
-              <a:t>8/22/2020</a:t>
+              <a:t>8/25/2020</a:t>
             </a:fld>
             <a:endParaRPr lang="en-US" dirty="0"/>
           </a:p>
@@ -4014,7 +4039,7 @@
             <a:fld id="{B61BEF0D-F0BB-DE4B-95CE-6DB70DBA9567}" type="datetimeFigureOut">
               <a:rPr lang="en-US" dirty="0"/>
               <a:pPr/>
-              <a:t>8/22/2020</a:t>
+              <a:t>8/25/2020</a:t>
             </a:fld>
             <a:endParaRPr lang="en-US" dirty="0"/>
           </a:p>
@@ -4106,7 +4131,7 @@
             <a:fld id="{B61BEF0D-F0BB-DE4B-95CE-6DB70DBA9567}" type="datetimeFigureOut">
               <a:rPr lang="en-US" dirty="0"/>
               <a:pPr/>
-              <a:t>8/22/2020</a:t>
+              <a:t>8/25/2020</a:t>
             </a:fld>
             <a:endParaRPr lang="en-US" dirty="0"/>
           </a:p>
@@ -4386,7 +4411,7 @@
             <a:fld id="{B61BEF0D-F0BB-DE4B-95CE-6DB70DBA9567}" type="datetimeFigureOut">
               <a:rPr lang="en-US" dirty="0"/>
               <a:pPr/>
-              <a:t>8/22/2020</a:t>
+              <a:t>8/25/2020</a:t>
             </a:fld>
             <a:endParaRPr lang="en-US" dirty="0"/>
           </a:p>
@@ -4674,7 +4699,7 @@
             <a:fld id="{B61BEF0D-F0BB-DE4B-95CE-6DB70DBA9567}" type="datetimeFigureOut">
               <a:rPr lang="en-US" dirty="0"/>
               <a:pPr/>
-              <a:t>8/22/2020</a:t>
+              <a:t>8/25/2020</a:t>
             </a:fld>
             <a:endParaRPr lang="en-US" dirty="0"/>
           </a:p>
@@ -4902,7 +4927,7 @@
             <a:fld id="{B61BEF0D-F0BB-DE4B-95CE-6DB70DBA9567}" type="datetimeFigureOut">
               <a:rPr lang="en-US" dirty="0"/>
               <a:pPr/>
-              <a:t>8/22/2020</a:t>
+              <a:t>8/25/2020</a:t>
             </a:fld>
             <a:endParaRPr lang="en-US" dirty="0"/>
           </a:p>
@@ -5726,6 +5751,1454 @@
 </p:sld>
 </file>
 
+<file path=ppt/slides/slide10.xml><?xml version="1.0" encoding="utf-8"?>
+<p:sld xmlns:a="http://schemas.openxmlformats.org/drawingml/2006/main" xmlns:r="http://schemas.openxmlformats.org/officeDocument/2006/relationships" xmlns:p="http://schemas.openxmlformats.org/presentationml/2006/main">
+  <p:cSld>
+    <p:spTree>
+      <p:nvGrpSpPr>
+        <p:cNvPr id="1" name=""/>
+        <p:cNvGrpSpPr/>
+        <p:nvPr/>
+      </p:nvGrpSpPr>
+      <p:grpSpPr>
+        <a:xfrm>
+          <a:off x="0" y="0"/>
+          <a:ext cx="0" cy="0"/>
+          <a:chOff x="0" y="0"/>
+          <a:chExt cx="0" cy="0"/>
+        </a:xfrm>
+      </p:grpSpPr>
+      <p:sp>
+        <p:nvSpPr>
+          <p:cNvPr id="2" name="Title 1"/>
+          <p:cNvSpPr>
+            <a:spLocks noGrp="1"/>
+          </p:cNvSpPr>
+          <p:nvPr>
+            <p:ph type="title"/>
+          </p:nvPr>
+        </p:nvSpPr>
+        <p:spPr/>
+        <p:txBody>
+          <a:bodyPr/>
+          <a:lstStyle/>
+          <a:p>
+            <a:r>
+              <a:rPr lang="en-US" dirty="0" smtClean="0"/>
+              <a:t>FINITE SET OF sale STATES</a:t>
+            </a:r>
+            <a:endParaRPr lang="en-US" dirty="0"/>
+          </a:p>
+        </p:txBody>
+      </p:sp>
+      <p:sp>
+        <p:nvSpPr>
+          <p:cNvPr id="3" name="Content Placeholder 2"/>
+          <p:cNvSpPr>
+            <a:spLocks noGrp="1"/>
+          </p:cNvSpPr>
+          <p:nvPr>
+            <p:ph idx="1"/>
+          </p:nvPr>
+        </p:nvSpPr>
+        <p:spPr/>
+        <p:txBody>
+          <a:bodyPr>
+            <a:normAutofit fontScale="47500" lnSpcReduction="20000"/>
+          </a:bodyPr>
+          <a:lstStyle/>
+          <a:p>
+            <a:r>
+              <a:rPr lang="en-US" dirty="0"/>
+              <a:t>“payment if balance &lt; 0” </a:t>
+            </a:r>
+            <a:r>
+              <a:rPr lang="en-US" dirty="0" smtClean="0"/>
+              <a:t>-&gt; Open</a:t>
+            </a:r>
+          </a:p>
+          <a:p>
+            <a:pPr lvl="1"/>
+            <a:r>
+              <a:rPr lang="en-US" dirty="0" smtClean="0"/>
+              <a:t>Can modify items</a:t>
+            </a:r>
+          </a:p>
+          <a:p>
+            <a:pPr lvl="1"/>
+            <a:r>
+              <a:rPr lang="en-US" dirty="0" smtClean="0"/>
+              <a:t>If balance &lt; 0, can pay</a:t>
+            </a:r>
+          </a:p>
+          <a:p>
+            <a:pPr lvl="1"/>
+            <a:r>
+              <a:rPr lang="en-US" dirty="0" smtClean="0"/>
+              <a:t>If payments = 0, can cancel</a:t>
+            </a:r>
+          </a:p>
+          <a:p>
+            <a:pPr lvl="1"/>
+            <a:r>
+              <a:rPr lang="en-US" dirty="0"/>
+              <a:t>Can give change up to </a:t>
+            </a:r>
+            <a:r>
+              <a:rPr lang="en-US" dirty="0" smtClean="0"/>
+              <a:t>total payment amount</a:t>
+            </a:r>
+          </a:p>
+          <a:p>
+            <a:r>
+              <a:rPr lang="en-US" dirty="0"/>
+              <a:t>“balance &gt; 0” </a:t>
+            </a:r>
+            <a:r>
+              <a:rPr lang="en-US" dirty="0" smtClean="0"/>
+              <a:t>-&gt; Overpaid</a:t>
+            </a:r>
+          </a:p>
+          <a:p>
+            <a:pPr lvl="1"/>
+            <a:r>
+              <a:rPr lang="en-US" dirty="0"/>
+              <a:t>Can give change up to total payment amount</a:t>
+            </a:r>
+          </a:p>
+          <a:p>
+            <a:pPr lvl="1"/>
+            <a:r>
+              <a:rPr lang="en-US" dirty="0" smtClean="0"/>
+              <a:t>Can </a:t>
+            </a:r>
+            <a:r>
+              <a:rPr lang="en-US" dirty="0"/>
+              <a:t>modify </a:t>
+            </a:r>
+            <a:r>
+              <a:rPr lang="en-US" dirty="0" smtClean="0"/>
+              <a:t>items (possibly add in lieu of change)</a:t>
+            </a:r>
+          </a:p>
+          <a:p>
+            <a:pPr lvl="1"/>
+            <a:r>
+              <a:rPr lang="en-US" dirty="0" smtClean="0"/>
+              <a:t>Cannot pay</a:t>
+            </a:r>
+          </a:p>
+          <a:p>
+            <a:pPr lvl="1"/>
+            <a:r>
+              <a:rPr lang="en-US" dirty="0" smtClean="0"/>
+              <a:t>Cannot cancel</a:t>
+            </a:r>
+          </a:p>
+          <a:p>
+            <a:r>
+              <a:rPr lang="en-US" dirty="0"/>
+              <a:t>“cancelled sale” </a:t>
+            </a:r>
+            <a:r>
+              <a:rPr lang="en-US" dirty="0" smtClean="0"/>
+              <a:t>-&gt; Cancelled</a:t>
+            </a:r>
+          </a:p>
+          <a:p>
+            <a:pPr lvl="1"/>
+            <a:r>
+              <a:rPr lang="en-US" dirty="0" smtClean="0"/>
+              <a:t>No actions allowed</a:t>
+            </a:r>
+          </a:p>
+          <a:p>
+            <a:r>
+              <a:rPr lang="en-US" dirty="0" smtClean="0"/>
+              <a:t>“Paid </a:t>
+            </a:r>
+            <a:r>
+              <a:rPr lang="en-US" dirty="0"/>
+              <a:t>sales” </a:t>
+            </a:r>
+            <a:r>
+              <a:rPr lang="en-US" dirty="0" smtClean="0"/>
+              <a:t>-&gt; Completed</a:t>
+            </a:r>
+          </a:p>
+          <a:p>
+            <a:pPr lvl="1"/>
+            <a:r>
+              <a:rPr lang="en-US" dirty="0" smtClean="0"/>
+              <a:t>No actions allowed</a:t>
+            </a:r>
+            <a:endParaRPr lang="en-US" dirty="0"/>
+          </a:p>
+        </p:txBody>
+      </p:sp>
+    </p:spTree>
+    <p:extLst>
+      <p:ext uri="{BB962C8B-B14F-4D97-AF65-F5344CB8AC3E}">
+        <p14:creationId xmlns:p14="http://schemas.microsoft.com/office/powerpoint/2010/main" val="3276107639"/>
+      </p:ext>
+    </p:extLst>
+  </p:cSld>
+  <p:clrMapOvr>
+    <a:masterClrMapping/>
+  </p:clrMapOvr>
+</p:sld>
+</file>
+
+<file path=ppt/slides/slide11.xml><?xml version="1.0" encoding="utf-8"?>
+<p:sld xmlns:a="http://schemas.openxmlformats.org/drawingml/2006/main" xmlns:r="http://schemas.openxmlformats.org/officeDocument/2006/relationships" xmlns:p="http://schemas.openxmlformats.org/presentationml/2006/main">
+  <p:cSld>
+    <p:spTree>
+      <p:nvGrpSpPr>
+        <p:cNvPr id="1" name=""/>
+        <p:cNvGrpSpPr/>
+        <p:nvPr/>
+      </p:nvGrpSpPr>
+      <p:grpSpPr>
+        <a:xfrm>
+          <a:off x="0" y="0"/>
+          <a:ext cx="0" cy="0"/>
+          <a:chOff x="0" y="0"/>
+          <a:chExt cx="0" cy="0"/>
+        </a:xfrm>
+      </p:grpSpPr>
+      <p:sp>
+        <p:nvSpPr>
+          <p:cNvPr id="2" name="Title 1"/>
+          <p:cNvSpPr>
+            <a:spLocks noGrp="1"/>
+          </p:cNvSpPr>
+          <p:nvPr>
+            <p:ph type="title"/>
+          </p:nvPr>
+        </p:nvSpPr>
+        <p:spPr/>
+        <p:txBody>
+          <a:bodyPr/>
+          <a:lstStyle/>
+          <a:p>
+            <a:r>
+              <a:rPr lang="en-US" dirty="0" smtClean="0"/>
+              <a:t>Sale State diagram</a:t>
+            </a:r>
+            <a:endParaRPr lang="en-US" dirty="0"/>
+          </a:p>
+        </p:txBody>
+      </p:sp>
+      <p:pic>
+        <p:nvPicPr>
+          <p:cNvPr id="5" name="Content Placeholder 4"/>
+          <p:cNvPicPr>
+            <a:picLocks noGrp="1" noChangeAspect="1"/>
+          </p:cNvPicPr>
+          <p:nvPr>
+            <p:ph idx="1"/>
+          </p:nvPr>
+        </p:nvPicPr>
+        <p:blipFill>
+          <a:blip r:embed="rId2"/>
+          <a:stretch>
+            <a:fillRect/>
+          </a:stretch>
+        </p:blipFill>
+        <p:spPr>
+          <a:xfrm>
+            <a:off x="2040673" y="1821760"/>
+            <a:ext cx="8341111" cy="4953424"/>
+          </a:xfrm>
+          <a:prstGeom prst="rect">
+            <a:avLst/>
+          </a:prstGeom>
+        </p:spPr>
+      </p:pic>
+    </p:spTree>
+    <p:extLst>
+      <p:ext uri="{BB962C8B-B14F-4D97-AF65-F5344CB8AC3E}">
+        <p14:creationId xmlns:p14="http://schemas.microsoft.com/office/powerpoint/2010/main" val="3753801172"/>
+      </p:ext>
+    </p:extLst>
+  </p:cSld>
+  <p:clrMapOvr>
+    <a:masterClrMapping/>
+  </p:clrMapOvr>
+</p:sld>
+</file>
+
+<file path=ppt/slides/slide12.xml><?xml version="1.0" encoding="utf-8"?>
+<p:sld xmlns:a="http://schemas.openxmlformats.org/drawingml/2006/main" xmlns:r="http://schemas.openxmlformats.org/officeDocument/2006/relationships" xmlns:p="http://schemas.openxmlformats.org/presentationml/2006/main">
+  <p:cSld>
+    <p:spTree>
+      <p:nvGrpSpPr>
+        <p:cNvPr id="1" name=""/>
+        <p:cNvGrpSpPr/>
+        <p:nvPr/>
+      </p:nvGrpSpPr>
+      <p:grpSpPr>
+        <a:xfrm>
+          <a:off x="0" y="0"/>
+          <a:ext cx="0" cy="0"/>
+          <a:chOff x="0" y="0"/>
+          <a:chExt cx="0" cy="0"/>
+        </a:xfrm>
+      </p:grpSpPr>
+      <p:sp>
+        <p:nvSpPr>
+          <p:cNvPr id="2" name="Title 1"/>
+          <p:cNvSpPr>
+            <a:spLocks noGrp="1"/>
+          </p:cNvSpPr>
+          <p:nvPr>
+            <p:ph type="title"/>
+          </p:nvPr>
+        </p:nvSpPr>
+        <p:spPr/>
+        <p:txBody>
+          <a:bodyPr/>
+          <a:lstStyle/>
+          <a:p>
+            <a:r>
+              <a:rPr lang="en-US" dirty="0" smtClean="0"/>
+              <a:t>Lesson 2: state design pattern</a:t>
+            </a:r>
+            <a:endParaRPr lang="en-US" dirty="0"/>
+          </a:p>
+        </p:txBody>
+      </p:sp>
+      <p:sp>
+        <p:nvSpPr>
+          <p:cNvPr id="3" name="Content Placeholder 2"/>
+          <p:cNvSpPr>
+            <a:spLocks noGrp="1"/>
+          </p:cNvSpPr>
+          <p:nvPr>
+            <p:ph idx="1"/>
+          </p:nvPr>
+        </p:nvSpPr>
+        <p:spPr/>
+        <p:txBody>
+          <a:bodyPr>
+            <a:normAutofit fontScale="77500" lnSpcReduction="20000"/>
+          </a:bodyPr>
+          <a:lstStyle/>
+          <a:p>
+            <a:r>
+              <a:rPr lang="en-US" dirty="0" smtClean="0"/>
+              <a:t>The state design pattern is a well known implementation of a </a:t>
+            </a:r>
+            <a:r>
+              <a:rPr lang="en-US" b="1" i="1" dirty="0" smtClean="0"/>
+              <a:t>state machine</a:t>
+            </a:r>
+          </a:p>
+          <a:p>
+            <a:r>
+              <a:rPr lang="en-US" dirty="0" smtClean="0"/>
+              <a:t>A base class/interface defines </a:t>
+            </a:r>
+            <a:r>
+              <a:rPr lang="en-US" b="1" i="1" dirty="0" smtClean="0"/>
+              <a:t>state</a:t>
+            </a:r>
+            <a:r>
+              <a:rPr lang="en-US" dirty="0" smtClean="0"/>
+              <a:t> based actions for the </a:t>
+            </a:r>
+            <a:r>
+              <a:rPr lang="en-US" b="1" i="1" dirty="0" smtClean="0"/>
+              <a:t>context</a:t>
+            </a:r>
+            <a:endParaRPr lang="en-US" dirty="0" smtClean="0"/>
+          </a:p>
+          <a:p>
+            <a:r>
+              <a:rPr lang="en-US" dirty="0" smtClean="0"/>
+              <a:t>A </a:t>
+            </a:r>
+            <a:r>
+              <a:rPr lang="en-US" b="1" i="1" dirty="0" smtClean="0"/>
+              <a:t>concrete state</a:t>
+            </a:r>
+            <a:r>
+              <a:rPr lang="en-US" dirty="0" smtClean="0"/>
+              <a:t> implementation is created for each state (i.e. finite set of states)</a:t>
+            </a:r>
+          </a:p>
+          <a:p>
+            <a:pPr lvl="1"/>
+            <a:r>
+              <a:rPr lang="en-US" dirty="0" smtClean="0"/>
+              <a:t>Action methods implemented according to business rules</a:t>
+            </a:r>
+          </a:p>
+          <a:p>
+            <a:pPr lvl="1"/>
+            <a:r>
+              <a:rPr lang="en-US" dirty="0" smtClean="0"/>
+              <a:t>Action methods also transitions context’s state as needed</a:t>
+            </a:r>
+          </a:p>
+          <a:p>
+            <a:r>
+              <a:rPr lang="en-US" dirty="0" smtClean="0"/>
+              <a:t>The context class has a reference to a concreate state (as base class)</a:t>
+            </a:r>
+          </a:p>
+          <a:p>
+            <a:pPr lvl="1"/>
+            <a:r>
+              <a:rPr lang="en-US" dirty="0" smtClean="0"/>
+              <a:t>Must be initialized to starting state</a:t>
+            </a:r>
+          </a:p>
+          <a:p>
+            <a:pPr lvl="1"/>
+            <a:r>
+              <a:rPr lang="en-US" dirty="0" smtClean="0"/>
+              <a:t>What about when loading????</a:t>
+            </a:r>
+          </a:p>
+          <a:p>
+            <a:r>
+              <a:rPr lang="en-US" dirty="0" smtClean="0"/>
+              <a:t>The context forwards all actions to the state implementation</a:t>
+            </a:r>
+          </a:p>
+          <a:p>
+            <a:r>
+              <a:rPr lang="en-US" dirty="0" smtClean="0"/>
+              <a:t>!!!</a:t>
+            </a:r>
+            <a:r>
+              <a:rPr lang="en-US" dirty="0" smtClean="0">
+                <a:hlinkClick r:id="rId2"/>
+              </a:rPr>
+              <a:t> </a:t>
+            </a:r>
+            <a:r>
+              <a:rPr lang="en-US" dirty="0">
+                <a:hlinkClick r:id="rId2"/>
+              </a:rPr>
+              <a:t>https://refactoring.guru/design-patterns/state/csharp/example</a:t>
+            </a:r>
+            <a:endParaRPr lang="en-US" dirty="0" smtClean="0"/>
+          </a:p>
+          <a:p>
+            <a:endParaRPr lang="en-US" dirty="0" smtClean="0"/>
+          </a:p>
+          <a:p>
+            <a:pPr lvl="1"/>
+            <a:endParaRPr lang="en-US" dirty="0"/>
+          </a:p>
+        </p:txBody>
+      </p:sp>
+    </p:spTree>
+    <p:extLst>
+      <p:ext uri="{BB962C8B-B14F-4D97-AF65-F5344CB8AC3E}">
+        <p14:creationId xmlns:p14="http://schemas.microsoft.com/office/powerpoint/2010/main" val="1774790889"/>
+      </p:ext>
+    </p:extLst>
+  </p:cSld>
+  <p:clrMapOvr>
+    <a:masterClrMapping/>
+  </p:clrMapOvr>
+</p:sld>
+</file>
+
+<file path=ppt/slides/slide13.xml><?xml version="1.0" encoding="utf-8"?>
+<p:sld xmlns:a="http://schemas.openxmlformats.org/drawingml/2006/main" xmlns:r="http://schemas.openxmlformats.org/officeDocument/2006/relationships" xmlns:p="http://schemas.openxmlformats.org/presentationml/2006/main">
+  <p:cSld>
+    <p:spTree>
+      <p:nvGrpSpPr>
+        <p:cNvPr id="1" name=""/>
+        <p:cNvGrpSpPr/>
+        <p:nvPr/>
+      </p:nvGrpSpPr>
+      <p:grpSpPr>
+        <a:xfrm>
+          <a:off x="0" y="0"/>
+          <a:ext cx="0" cy="0"/>
+          <a:chOff x="0" y="0"/>
+          <a:chExt cx="0" cy="0"/>
+        </a:xfrm>
+      </p:grpSpPr>
+      <p:sp>
+        <p:nvSpPr>
+          <p:cNvPr id="2" name="Title 1"/>
+          <p:cNvSpPr>
+            <a:spLocks noGrp="1"/>
+          </p:cNvSpPr>
+          <p:nvPr>
+            <p:ph type="title"/>
+          </p:nvPr>
+        </p:nvSpPr>
+        <p:spPr/>
+        <p:txBody>
+          <a:bodyPr/>
+          <a:lstStyle/>
+          <a:p>
+            <a:r>
+              <a:rPr lang="en-US" dirty="0" smtClean="0"/>
+              <a:t>Sale State design</a:t>
+            </a:r>
+            <a:endParaRPr lang="en-US" dirty="0"/>
+          </a:p>
+        </p:txBody>
+      </p:sp>
+      <p:pic>
+        <p:nvPicPr>
+          <p:cNvPr id="6" name="Content Placeholder 5"/>
+          <p:cNvPicPr>
+            <a:picLocks noGrp="1" noChangeAspect="1"/>
+          </p:cNvPicPr>
+          <p:nvPr>
+            <p:ph idx="1"/>
+          </p:nvPr>
+        </p:nvPicPr>
+        <p:blipFill>
+          <a:blip r:embed="rId2"/>
+          <a:stretch>
+            <a:fillRect/>
+          </a:stretch>
+        </p:blipFill>
+        <p:spPr>
+          <a:xfrm>
+            <a:off x="807606" y="2107579"/>
+            <a:ext cx="10754242" cy="4315523"/>
+          </a:xfrm>
+          <a:prstGeom prst="rect">
+            <a:avLst/>
+          </a:prstGeom>
+        </p:spPr>
+      </p:pic>
+    </p:spTree>
+    <p:extLst>
+      <p:ext uri="{BB962C8B-B14F-4D97-AF65-F5344CB8AC3E}">
+        <p14:creationId xmlns:p14="http://schemas.microsoft.com/office/powerpoint/2010/main" val="3512000437"/>
+      </p:ext>
+    </p:extLst>
+  </p:cSld>
+  <p:clrMapOvr>
+    <a:masterClrMapping/>
+  </p:clrMapOvr>
+</p:sld>
+</file>
+
+<file path=ppt/slides/slide14.xml><?xml version="1.0" encoding="utf-8"?>
+<p:sld xmlns:a="http://schemas.openxmlformats.org/drawingml/2006/main" xmlns:r="http://schemas.openxmlformats.org/officeDocument/2006/relationships" xmlns:p="http://schemas.openxmlformats.org/presentationml/2006/main">
+  <p:cSld>
+    <p:spTree>
+      <p:nvGrpSpPr>
+        <p:cNvPr id="1" name=""/>
+        <p:cNvGrpSpPr/>
+        <p:nvPr/>
+      </p:nvGrpSpPr>
+      <p:grpSpPr>
+        <a:xfrm>
+          <a:off x="0" y="0"/>
+          <a:ext cx="0" cy="0"/>
+          <a:chOff x="0" y="0"/>
+          <a:chExt cx="0" cy="0"/>
+        </a:xfrm>
+      </p:grpSpPr>
+      <p:sp>
+        <p:nvSpPr>
+          <p:cNvPr id="2" name="Title 1"/>
+          <p:cNvSpPr>
+            <a:spLocks noGrp="1"/>
+          </p:cNvSpPr>
+          <p:nvPr>
+            <p:ph type="title"/>
+          </p:nvPr>
+        </p:nvSpPr>
+        <p:spPr/>
+        <p:txBody>
+          <a:bodyPr/>
+          <a:lstStyle/>
+          <a:p>
+            <a:r>
+              <a:rPr lang="en-US" dirty="0" smtClean="0"/>
+              <a:t>Exercise 2: implement sale state design</a:t>
+            </a:r>
+            <a:endParaRPr lang="en-US" dirty="0"/>
+          </a:p>
+        </p:txBody>
+      </p:sp>
+      <p:sp>
+        <p:nvSpPr>
+          <p:cNvPr id="3" name="Content Placeholder 2"/>
+          <p:cNvSpPr>
+            <a:spLocks noGrp="1"/>
+          </p:cNvSpPr>
+          <p:nvPr>
+            <p:ph idx="1"/>
+          </p:nvPr>
+        </p:nvSpPr>
+        <p:spPr/>
+        <p:txBody>
+          <a:bodyPr>
+            <a:normAutofit/>
+          </a:bodyPr>
+          <a:lstStyle/>
+          <a:p>
+            <a:r>
+              <a:rPr lang="en-US" dirty="0"/>
+              <a:t>Start from </a:t>
+            </a:r>
+            <a:r>
+              <a:rPr lang="en-US" dirty="0" smtClean="0"/>
+              <a:t>Exercise2_Initial\PointOfSaleStateManagement.sln</a:t>
+            </a:r>
+            <a:endParaRPr lang="en-US" dirty="0"/>
+          </a:p>
+          <a:p>
+            <a:r>
+              <a:rPr lang="en-US" dirty="0" smtClean="0"/>
+              <a:t>The initial solution includes</a:t>
+            </a:r>
+          </a:p>
+          <a:p>
+            <a:pPr lvl="1"/>
+            <a:r>
+              <a:rPr lang="en-US" dirty="0" smtClean="0"/>
+              <a:t>Base class for the states (???!!!)</a:t>
+            </a:r>
+          </a:p>
+          <a:p>
+            <a:pPr lvl="1"/>
+            <a:r>
+              <a:rPr lang="en-US" dirty="0" smtClean="0"/>
+              <a:t>Stubbed out concrete states</a:t>
+            </a:r>
+          </a:p>
+          <a:p>
+            <a:pPr lvl="1"/>
+            <a:r>
+              <a:rPr lang="en-US" dirty="0" smtClean="0"/>
+              <a:t>Reference from sale to current state (initialized to Open)</a:t>
+            </a:r>
+          </a:p>
+          <a:p>
+            <a:pPr lvl="1"/>
+            <a:r>
+              <a:rPr lang="en-US" dirty="0" smtClean="0"/>
+              <a:t>Reference from state to sale</a:t>
+            </a:r>
+            <a:endParaRPr lang="en-US" dirty="0"/>
+          </a:p>
+          <a:p>
+            <a:r>
+              <a:rPr lang="en-US" dirty="0"/>
+              <a:t>unit tests should pass when </a:t>
+            </a:r>
+            <a:r>
+              <a:rPr lang="en-US" dirty="0" smtClean="0"/>
+              <a:t>rules implemented</a:t>
+            </a:r>
+            <a:endParaRPr lang="en-US" dirty="0"/>
+          </a:p>
+          <a:p>
+            <a:endParaRPr lang="en-US" dirty="0"/>
+          </a:p>
+        </p:txBody>
+      </p:sp>
+    </p:spTree>
+    <p:extLst>
+      <p:ext uri="{BB962C8B-B14F-4D97-AF65-F5344CB8AC3E}">
+        <p14:creationId xmlns:p14="http://schemas.microsoft.com/office/powerpoint/2010/main" val="2390489064"/>
+      </p:ext>
+    </p:extLst>
+  </p:cSld>
+  <p:clrMapOvr>
+    <a:masterClrMapping/>
+  </p:clrMapOvr>
+</p:sld>
+</file>
+
+<file path=ppt/slides/slide15.xml><?xml version="1.0" encoding="utf-8"?>
+<p:sld xmlns:a="http://schemas.openxmlformats.org/drawingml/2006/main" xmlns:r="http://schemas.openxmlformats.org/officeDocument/2006/relationships" xmlns:p="http://schemas.openxmlformats.org/presentationml/2006/main">
+  <p:cSld>
+    <p:spTree>
+      <p:nvGrpSpPr>
+        <p:cNvPr id="1" name=""/>
+        <p:cNvGrpSpPr/>
+        <p:nvPr/>
+      </p:nvGrpSpPr>
+      <p:grpSpPr>
+        <a:xfrm>
+          <a:off x="0" y="0"/>
+          <a:ext cx="0" cy="0"/>
+          <a:chOff x="0" y="0"/>
+          <a:chExt cx="0" cy="0"/>
+        </a:xfrm>
+      </p:grpSpPr>
+      <p:sp>
+        <p:nvSpPr>
+          <p:cNvPr id="2" name="Title 1"/>
+          <p:cNvSpPr>
+            <a:spLocks noGrp="1"/>
+          </p:cNvSpPr>
+          <p:nvPr>
+            <p:ph type="title"/>
+          </p:nvPr>
+        </p:nvSpPr>
+        <p:spPr/>
+        <p:txBody>
+          <a:bodyPr/>
+          <a:lstStyle/>
+          <a:p>
+            <a:r>
+              <a:rPr lang="en-US" dirty="0" smtClean="0"/>
+              <a:t>Exercise 2: Rules</a:t>
+            </a:r>
+            <a:endParaRPr lang="en-US" dirty="0"/>
+          </a:p>
+        </p:txBody>
+      </p:sp>
+      <p:sp>
+        <p:nvSpPr>
+          <p:cNvPr id="3" name="Content Placeholder 2"/>
+          <p:cNvSpPr>
+            <a:spLocks noGrp="1"/>
+          </p:cNvSpPr>
+          <p:nvPr>
+            <p:ph idx="1"/>
+          </p:nvPr>
+        </p:nvSpPr>
+        <p:spPr/>
+        <p:txBody>
+          <a:bodyPr numCol="2">
+            <a:normAutofit fontScale="77500" lnSpcReduction="20000"/>
+          </a:bodyPr>
+          <a:lstStyle/>
+          <a:p>
+            <a:pPr marL="457200" indent="-457200">
+              <a:buFont typeface="+mj-lt"/>
+              <a:buAutoNum type="arabicPeriod"/>
+            </a:pPr>
+            <a:r>
+              <a:rPr lang="en-US" dirty="0" smtClean="0"/>
+              <a:t>Open: !Overpaid and !Cancelled and !Paid</a:t>
+            </a:r>
+            <a:endParaRPr lang="en-US" dirty="0"/>
+          </a:p>
+          <a:p>
+            <a:pPr marL="800100" lvl="1" indent="-342900">
+              <a:buFont typeface="+mj-lt"/>
+              <a:buAutoNum type="alphaLcPeriod"/>
+            </a:pPr>
+            <a:r>
+              <a:rPr lang="en-US" dirty="0"/>
+              <a:t>Can modify items</a:t>
+            </a:r>
+          </a:p>
+          <a:p>
+            <a:pPr marL="800100" lvl="1" indent="-342900">
+              <a:buFont typeface="+mj-lt"/>
+              <a:buAutoNum type="alphaLcPeriod"/>
+            </a:pPr>
+            <a:r>
+              <a:rPr lang="en-US" dirty="0"/>
+              <a:t>If balance &lt; 0, can pay</a:t>
+            </a:r>
+          </a:p>
+          <a:p>
+            <a:pPr marL="800100" lvl="1" indent="-342900">
+              <a:buFont typeface="+mj-lt"/>
+              <a:buAutoNum type="alphaLcPeriod"/>
+            </a:pPr>
+            <a:r>
+              <a:rPr lang="en-US" dirty="0"/>
+              <a:t>If payments = 0, can cancel</a:t>
+            </a:r>
+          </a:p>
+          <a:p>
+            <a:pPr marL="800100" lvl="1" indent="-342900">
+              <a:buFont typeface="+mj-lt"/>
+              <a:buAutoNum type="alphaLcPeriod"/>
+            </a:pPr>
+            <a:r>
+              <a:rPr lang="en-US" dirty="0"/>
+              <a:t>Can give change up to total payment amount</a:t>
+            </a:r>
+          </a:p>
+          <a:p>
+            <a:pPr marL="457200" indent="-457200">
+              <a:buFont typeface="+mj-lt"/>
+              <a:buAutoNum type="arabicPeriod"/>
+            </a:pPr>
+            <a:r>
+              <a:rPr lang="en-US" dirty="0" smtClean="0"/>
+              <a:t>Overpaid: Balance &gt; 0</a:t>
+            </a:r>
+            <a:endParaRPr lang="en-US" dirty="0"/>
+          </a:p>
+          <a:p>
+            <a:pPr marL="800100" lvl="1" indent="-342900">
+              <a:buFont typeface="+mj-lt"/>
+              <a:buAutoNum type="alphaLcPeriod"/>
+            </a:pPr>
+            <a:r>
+              <a:rPr lang="en-US" dirty="0"/>
+              <a:t>Can give change</a:t>
+            </a:r>
+          </a:p>
+          <a:p>
+            <a:pPr marL="800100" lvl="1" indent="-342900">
+              <a:buFont typeface="+mj-lt"/>
+              <a:buAutoNum type="alphaLcPeriod"/>
+            </a:pPr>
+            <a:r>
+              <a:rPr lang="en-US" dirty="0"/>
+              <a:t>Can modify items (possibly add in lieu of change)</a:t>
+            </a:r>
+          </a:p>
+          <a:p>
+            <a:pPr marL="800100" lvl="1" indent="-342900">
+              <a:buFont typeface="+mj-lt"/>
+              <a:buAutoNum type="alphaLcPeriod"/>
+            </a:pPr>
+            <a:r>
+              <a:rPr lang="en-US" dirty="0"/>
+              <a:t>Cannot pay</a:t>
+            </a:r>
+          </a:p>
+          <a:p>
+            <a:pPr marL="800100" lvl="1" indent="-342900">
+              <a:buFont typeface="+mj-lt"/>
+              <a:buAutoNum type="alphaLcPeriod"/>
+            </a:pPr>
+            <a:r>
+              <a:rPr lang="en-US" dirty="0"/>
+              <a:t>Can give change up to previous payments amount, can </a:t>
+            </a:r>
+            <a:r>
+              <a:rPr lang="en-US" dirty="0" smtClean="0"/>
+              <a:t>cancel</a:t>
+            </a:r>
+          </a:p>
+          <a:p>
+            <a:pPr marL="800100" lvl="1" indent="-342900">
+              <a:buFont typeface="+mj-lt"/>
+              <a:buAutoNum type="alphaLcPeriod"/>
+            </a:pPr>
+            <a:endParaRPr lang="en-US" dirty="0"/>
+          </a:p>
+          <a:p>
+            <a:pPr marL="800100" lvl="1" indent="-342900">
+              <a:buFont typeface="+mj-lt"/>
+              <a:buAutoNum type="alphaLcPeriod"/>
+            </a:pPr>
+            <a:endParaRPr lang="en-US" dirty="0" smtClean="0"/>
+          </a:p>
+          <a:p>
+            <a:pPr marL="800100" lvl="1" indent="-342900">
+              <a:buFont typeface="+mj-lt"/>
+              <a:buAutoNum type="alphaLcPeriod"/>
+            </a:pPr>
+            <a:endParaRPr lang="en-US" dirty="0"/>
+          </a:p>
+          <a:p>
+            <a:pPr marL="800100" lvl="1" indent="-342900">
+              <a:buFont typeface="+mj-lt"/>
+              <a:buAutoNum type="alphaLcPeriod"/>
+            </a:pPr>
+            <a:endParaRPr lang="en-US" dirty="0"/>
+          </a:p>
+          <a:p>
+            <a:pPr marL="457200" indent="-457200">
+              <a:buFont typeface="+mj-lt"/>
+              <a:buAutoNum type="arabicPeriod"/>
+            </a:pPr>
+            <a:r>
+              <a:rPr lang="en-US" dirty="0" smtClean="0"/>
+              <a:t>Cancelled: Cancelled successfully executed</a:t>
+            </a:r>
+            <a:endParaRPr lang="en-US" dirty="0"/>
+          </a:p>
+          <a:p>
+            <a:pPr marL="800100" lvl="1" indent="-342900">
+              <a:buFont typeface="+mj-lt"/>
+              <a:buAutoNum type="alphaLcPeriod"/>
+            </a:pPr>
+            <a:r>
+              <a:rPr lang="en-US" dirty="0"/>
+              <a:t>No actions allowed</a:t>
+            </a:r>
+          </a:p>
+          <a:p>
+            <a:pPr marL="457200" indent="-457200">
+              <a:buFont typeface="+mj-lt"/>
+              <a:buAutoNum type="arabicPeriod"/>
+            </a:pPr>
+            <a:r>
+              <a:rPr lang="en-US" dirty="0" smtClean="0"/>
+              <a:t>Paid: Balance = 0, 1+ Items, 1+ Payments</a:t>
+            </a:r>
+            <a:endParaRPr lang="en-US" dirty="0"/>
+          </a:p>
+          <a:p>
+            <a:pPr marL="800100" lvl="1" indent="-342900">
+              <a:buFont typeface="+mj-lt"/>
+              <a:buAutoNum type="alphaLcPeriod"/>
+            </a:pPr>
+            <a:r>
+              <a:rPr lang="en-US" dirty="0"/>
+              <a:t>No actions allowed</a:t>
+            </a:r>
+          </a:p>
+          <a:p>
+            <a:endParaRPr lang="en-US" dirty="0"/>
+          </a:p>
+        </p:txBody>
+      </p:sp>
+    </p:spTree>
+    <p:extLst>
+      <p:ext uri="{BB962C8B-B14F-4D97-AF65-F5344CB8AC3E}">
+        <p14:creationId xmlns:p14="http://schemas.microsoft.com/office/powerpoint/2010/main" val="3712886392"/>
+      </p:ext>
+    </p:extLst>
+  </p:cSld>
+  <p:clrMapOvr>
+    <a:masterClrMapping/>
+  </p:clrMapOvr>
+</p:sld>
+</file>
+
+<file path=ppt/slides/slide16.xml><?xml version="1.0" encoding="utf-8"?>
+<p:sld xmlns:a="http://schemas.openxmlformats.org/drawingml/2006/main" xmlns:r="http://schemas.openxmlformats.org/officeDocument/2006/relationships" xmlns:p="http://schemas.openxmlformats.org/presentationml/2006/main">
+  <p:cSld>
+    <p:spTree>
+      <p:nvGrpSpPr>
+        <p:cNvPr id="1" name=""/>
+        <p:cNvGrpSpPr/>
+        <p:nvPr/>
+      </p:nvGrpSpPr>
+      <p:grpSpPr>
+        <a:xfrm>
+          <a:off x="0" y="0"/>
+          <a:ext cx="0" cy="0"/>
+          <a:chOff x="0" y="0"/>
+          <a:chExt cx="0" cy="0"/>
+        </a:xfrm>
+      </p:grpSpPr>
+      <p:sp>
+        <p:nvSpPr>
+          <p:cNvPr id="2" name="Title 1"/>
+          <p:cNvSpPr>
+            <a:spLocks noGrp="1"/>
+          </p:cNvSpPr>
+          <p:nvPr>
+            <p:ph type="title"/>
+          </p:nvPr>
+        </p:nvSpPr>
+        <p:spPr/>
+        <p:txBody>
+          <a:bodyPr/>
+          <a:lstStyle/>
+          <a:p>
+            <a:r>
+              <a:rPr lang="en-US" dirty="0" smtClean="0"/>
+              <a:t>Exercise 2: Extra credit 1</a:t>
+            </a:r>
+            <a:endParaRPr lang="en-US" dirty="0"/>
+          </a:p>
+        </p:txBody>
+      </p:sp>
+      <p:sp>
+        <p:nvSpPr>
+          <p:cNvPr id="3" name="Content Placeholder 2"/>
+          <p:cNvSpPr>
+            <a:spLocks noGrp="1"/>
+          </p:cNvSpPr>
+          <p:nvPr>
+            <p:ph idx="1"/>
+          </p:nvPr>
+        </p:nvSpPr>
+        <p:spPr/>
+        <p:txBody>
+          <a:bodyPr>
+            <a:normAutofit lnSpcReduction="10000"/>
+          </a:bodyPr>
+          <a:lstStyle/>
+          <a:p>
+            <a:r>
+              <a:rPr lang="en-US" dirty="0" smtClean="0"/>
+              <a:t>Take </a:t>
+            </a:r>
+            <a:r>
+              <a:rPr lang="en-US" dirty="0"/>
+              <a:t>advantage of similarities </a:t>
+            </a:r>
+            <a:r>
+              <a:rPr lang="en-US" dirty="0" smtClean="0"/>
+              <a:t>in states to </a:t>
+            </a:r>
+            <a:r>
+              <a:rPr lang="en-US" dirty="0"/>
+              <a:t>reduce </a:t>
+            </a:r>
+            <a:r>
+              <a:rPr lang="en-US" dirty="0" smtClean="0"/>
+              <a:t>code duplication</a:t>
+            </a:r>
+          </a:p>
+          <a:p>
+            <a:pPr lvl="1"/>
+            <a:r>
+              <a:rPr lang="en-US" dirty="0" smtClean="0"/>
+              <a:t>Open/Overpaid</a:t>
+            </a:r>
+          </a:p>
+          <a:p>
+            <a:pPr lvl="2"/>
+            <a:r>
+              <a:rPr lang="en-US" dirty="0" smtClean="0"/>
+              <a:t>Can </a:t>
+            </a:r>
+            <a:r>
+              <a:rPr lang="en-US" dirty="0"/>
+              <a:t>modify items</a:t>
+            </a:r>
+          </a:p>
+          <a:p>
+            <a:pPr lvl="2"/>
+            <a:r>
+              <a:rPr lang="en-US" dirty="0"/>
+              <a:t>If balance &lt; 0, can pay</a:t>
+            </a:r>
+          </a:p>
+          <a:p>
+            <a:pPr lvl="2"/>
+            <a:r>
+              <a:rPr lang="en-US" dirty="0" smtClean="0"/>
+              <a:t>Can </a:t>
+            </a:r>
+            <a:r>
+              <a:rPr lang="en-US" dirty="0"/>
+              <a:t>give change up to total payment </a:t>
+            </a:r>
+            <a:r>
+              <a:rPr lang="en-US" dirty="0" smtClean="0"/>
+              <a:t>amount</a:t>
+            </a:r>
+          </a:p>
+          <a:p>
+            <a:pPr lvl="1"/>
+            <a:r>
+              <a:rPr lang="en-US" dirty="0" smtClean="0"/>
+              <a:t>Paid/Cancelled</a:t>
+            </a:r>
+          </a:p>
+          <a:p>
+            <a:pPr lvl="2"/>
+            <a:r>
+              <a:rPr lang="en-US" dirty="0" smtClean="0"/>
+              <a:t>No actions allowed</a:t>
+            </a:r>
+          </a:p>
+          <a:p>
+            <a:pPr lvl="2"/>
+            <a:r>
+              <a:rPr lang="en-US" dirty="0" smtClean="0"/>
+              <a:t>Each is just a marker for how it was finalized</a:t>
+            </a:r>
+            <a:endParaRPr lang="en-US" dirty="0"/>
+          </a:p>
+          <a:p>
+            <a:endParaRPr lang="en-US" dirty="0"/>
+          </a:p>
+        </p:txBody>
+      </p:sp>
+    </p:spTree>
+    <p:extLst>
+      <p:ext uri="{BB962C8B-B14F-4D97-AF65-F5344CB8AC3E}">
+        <p14:creationId xmlns:p14="http://schemas.microsoft.com/office/powerpoint/2010/main" val="3100472726"/>
+      </p:ext>
+    </p:extLst>
+  </p:cSld>
+  <p:clrMapOvr>
+    <a:masterClrMapping/>
+  </p:clrMapOvr>
+</p:sld>
+</file>
+
+<file path=ppt/slides/slide17.xml><?xml version="1.0" encoding="utf-8"?>
+<p:sld xmlns:a="http://schemas.openxmlformats.org/drawingml/2006/main" xmlns:r="http://schemas.openxmlformats.org/officeDocument/2006/relationships" xmlns:p="http://schemas.openxmlformats.org/presentationml/2006/main">
+  <p:cSld>
+    <p:spTree>
+      <p:nvGrpSpPr>
+        <p:cNvPr id="1" name=""/>
+        <p:cNvGrpSpPr/>
+        <p:nvPr/>
+      </p:nvGrpSpPr>
+      <p:grpSpPr>
+        <a:xfrm>
+          <a:off x="0" y="0"/>
+          <a:ext cx="0" cy="0"/>
+          <a:chOff x="0" y="0"/>
+          <a:chExt cx="0" cy="0"/>
+        </a:xfrm>
+      </p:grpSpPr>
+      <p:sp>
+        <p:nvSpPr>
+          <p:cNvPr id="2" name="Title 1"/>
+          <p:cNvSpPr>
+            <a:spLocks noGrp="1"/>
+          </p:cNvSpPr>
+          <p:nvPr>
+            <p:ph type="title"/>
+          </p:nvPr>
+        </p:nvSpPr>
+        <p:spPr/>
+        <p:txBody>
+          <a:bodyPr/>
+          <a:lstStyle/>
+          <a:p>
+            <a:r>
+              <a:rPr lang="en-US" dirty="0" smtClean="0"/>
+              <a:t>Exercise 2: Extra credit 2</a:t>
+            </a:r>
+            <a:endParaRPr lang="en-US" dirty="0"/>
+          </a:p>
+        </p:txBody>
+      </p:sp>
+      <p:sp>
+        <p:nvSpPr>
+          <p:cNvPr id="3" name="Content Placeholder 2"/>
+          <p:cNvSpPr>
+            <a:spLocks noGrp="1"/>
+          </p:cNvSpPr>
+          <p:nvPr>
+            <p:ph idx="1"/>
+          </p:nvPr>
+        </p:nvSpPr>
+        <p:spPr/>
+        <p:txBody>
+          <a:bodyPr>
+            <a:normAutofit/>
+          </a:bodyPr>
+          <a:lstStyle/>
+          <a:p>
+            <a:r>
+              <a:rPr lang="en-US" dirty="0" smtClean="0"/>
+              <a:t>Account </a:t>
+            </a:r>
+            <a:r>
+              <a:rPr lang="en-US" dirty="0"/>
+              <a:t>for loading a sale that wasn’t in the initial state when saved</a:t>
+            </a:r>
+          </a:p>
+          <a:p>
+            <a:endParaRPr lang="en-US" dirty="0"/>
+          </a:p>
+        </p:txBody>
+      </p:sp>
+    </p:spTree>
+    <p:extLst>
+      <p:ext uri="{BB962C8B-B14F-4D97-AF65-F5344CB8AC3E}">
+        <p14:creationId xmlns:p14="http://schemas.microsoft.com/office/powerpoint/2010/main" val="2091513166"/>
+      </p:ext>
+    </p:extLst>
+  </p:cSld>
+  <p:clrMapOvr>
+    <a:masterClrMapping/>
+  </p:clrMapOvr>
+</p:sld>
+</file>
+
+<file path=ppt/slides/slide18.xml><?xml version="1.0" encoding="utf-8"?>
+<p:sld xmlns:a="http://schemas.openxmlformats.org/drawingml/2006/main" xmlns:r="http://schemas.openxmlformats.org/officeDocument/2006/relationships" xmlns:p="http://schemas.openxmlformats.org/presentationml/2006/main">
+  <p:cSld>
+    <p:spTree>
+      <p:nvGrpSpPr>
+        <p:cNvPr id="1" name=""/>
+        <p:cNvGrpSpPr/>
+        <p:nvPr/>
+      </p:nvGrpSpPr>
+      <p:grpSpPr>
+        <a:xfrm>
+          <a:off x="0" y="0"/>
+          <a:ext cx="0" cy="0"/>
+          <a:chOff x="0" y="0"/>
+          <a:chExt cx="0" cy="0"/>
+        </a:xfrm>
+      </p:grpSpPr>
+      <p:sp>
+        <p:nvSpPr>
+          <p:cNvPr id="2" name="Title 1"/>
+          <p:cNvSpPr>
+            <a:spLocks noGrp="1"/>
+          </p:cNvSpPr>
+          <p:nvPr>
+            <p:ph type="title"/>
+          </p:nvPr>
+        </p:nvSpPr>
+        <p:spPr/>
+        <p:txBody>
+          <a:bodyPr/>
+          <a:lstStyle/>
+          <a:p>
+            <a:r>
+              <a:rPr lang="en-US" dirty="0" smtClean="0"/>
+              <a:t>Exercise 2: retrospective</a:t>
+            </a:r>
+            <a:endParaRPr lang="en-US" dirty="0"/>
+          </a:p>
+        </p:txBody>
+      </p:sp>
+      <p:sp>
+        <p:nvSpPr>
+          <p:cNvPr id="3" name="Content Placeholder 2"/>
+          <p:cNvSpPr>
+            <a:spLocks noGrp="1"/>
+          </p:cNvSpPr>
+          <p:nvPr>
+            <p:ph idx="1"/>
+          </p:nvPr>
+        </p:nvSpPr>
+        <p:spPr/>
+        <p:txBody>
+          <a:bodyPr>
+            <a:normAutofit fontScale="70000" lnSpcReduction="20000"/>
+          </a:bodyPr>
+          <a:lstStyle/>
+          <a:p>
+            <a:r>
+              <a:rPr lang="en-US" dirty="0" smtClean="0"/>
+              <a:t>Logic organized, componentized, and much cleaner</a:t>
+            </a:r>
+          </a:p>
+          <a:p>
+            <a:pPr lvl="1"/>
+            <a:r>
+              <a:rPr lang="en-US" dirty="0" smtClean="0"/>
+              <a:t>Removes many conditionals and/or switches in most naïve implementations</a:t>
+            </a:r>
+          </a:p>
+          <a:p>
+            <a:r>
+              <a:rPr lang="en-US" dirty="0"/>
+              <a:t>Explicit action defined for every </a:t>
+            </a:r>
+            <a:r>
+              <a:rPr lang="en-US" dirty="0" smtClean="0"/>
+              <a:t>state</a:t>
+            </a:r>
+          </a:p>
+          <a:p>
+            <a:pPr lvl="1"/>
+            <a:r>
+              <a:rPr lang="en-US" dirty="0" smtClean="0"/>
+              <a:t>Can require writing lots code </a:t>
+            </a:r>
+          </a:p>
+          <a:p>
+            <a:pPr lvl="2"/>
+            <a:r>
+              <a:rPr lang="en-US" dirty="0" smtClean="0"/>
+              <a:t>&lt;number of methods&gt; = ~(&lt;number of states&gt; * &lt;number of actions&gt;) + &lt;number of transitions&gt;</a:t>
+            </a:r>
+          </a:p>
+          <a:p>
+            <a:pPr lvl="1"/>
+            <a:r>
+              <a:rPr lang="en-US" dirty="0" smtClean="0"/>
+              <a:t>Without care, can lead to code duplication</a:t>
+            </a:r>
+            <a:endParaRPr lang="en-US" dirty="0"/>
+          </a:p>
+          <a:p>
+            <a:r>
+              <a:rPr lang="en-US" dirty="0" smtClean="0"/>
+              <a:t>SOLID design principles alignment</a:t>
+            </a:r>
+          </a:p>
+          <a:p>
+            <a:pPr lvl="1"/>
+            <a:r>
+              <a:rPr lang="en-US" i="1" dirty="0"/>
+              <a:t>single responsibility principle </a:t>
+            </a:r>
+            <a:r>
+              <a:rPr lang="en-US" i="1" dirty="0" smtClean="0"/>
+              <a:t>: </a:t>
+            </a:r>
+            <a:r>
+              <a:rPr lang="en-US" dirty="0" smtClean="0"/>
+              <a:t>Concrete states manage actions and transitions</a:t>
+            </a:r>
+          </a:p>
+          <a:p>
+            <a:pPr lvl="1"/>
+            <a:r>
+              <a:rPr lang="en-US" i="1" dirty="0" smtClean="0"/>
+              <a:t>open/closed principle: </a:t>
+            </a:r>
+            <a:r>
+              <a:rPr lang="en-US" dirty="0" smtClean="0"/>
+              <a:t>adding new states can require changes to existing states</a:t>
+            </a:r>
+            <a:endParaRPr lang="en-US" i="1" dirty="0" smtClean="0"/>
+          </a:p>
+          <a:p>
+            <a:r>
+              <a:rPr lang="en-US" dirty="0" smtClean="0"/>
+              <a:t>Can take some work to derive overall workflow from concrete states</a:t>
+            </a:r>
+          </a:p>
+          <a:p>
+            <a:r>
+              <a:rPr lang="en-US" dirty="0" smtClean="0"/>
+              <a:t>Exercise2_Final\PointOfSaleStateManagement.sln </a:t>
+            </a:r>
+            <a:r>
+              <a:rPr lang="en-US" dirty="0"/>
+              <a:t>is my version of this </a:t>
+            </a:r>
+            <a:r>
+              <a:rPr lang="en-US" dirty="0" smtClean="0"/>
+              <a:t>exercise</a:t>
+            </a:r>
+            <a:endParaRPr lang="en-US" dirty="0"/>
+          </a:p>
+        </p:txBody>
+      </p:sp>
+    </p:spTree>
+    <p:extLst>
+      <p:ext uri="{BB962C8B-B14F-4D97-AF65-F5344CB8AC3E}">
+        <p14:creationId xmlns:p14="http://schemas.microsoft.com/office/powerpoint/2010/main" val="1829763881"/>
+      </p:ext>
+    </p:extLst>
+  </p:cSld>
+  <p:clrMapOvr>
+    <a:masterClrMapping/>
+  </p:clrMapOvr>
+</p:sld>
+</file>
+
+<file path=ppt/slides/slide19.xml><?xml version="1.0" encoding="utf-8"?>
+<p:sld xmlns:a="http://schemas.openxmlformats.org/drawingml/2006/main" xmlns:r="http://schemas.openxmlformats.org/officeDocument/2006/relationships" xmlns:p="http://schemas.openxmlformats.org/presentationml/2006/main">
+  <p:cSld>
+    <p:spTree>
+      <p:nvGrpSpPr>
+        <p:cNvPr id="1" name=""/>
+        <p:cNvGrpSpPr/>
+        <p:nvPr/>
+      </p:nvGrpSpPr>
+      <p:grpSpPr>
+        <a:xfrm>
+          <a:off x="0" y="0"/>
+          <a:ext cx="0" cy="0"/>
+          <a:chOff x="0" y="0"/>
+          <a:chExt cx="0" cy="0"/>
+        </a:xfrm>
+      </p:grpSpPr>
+      <p:sp>
+        <p:nvSpPr>
+          <p:cNvPr id="2" name="Title 1"/>
+          <p:cNvSpPr>
+            <a:spLocks noGrp="1"/>
+          </p:cNvSpPr>
+          <p:nvPr>
+            <p:ph type="title"/>
+          </p:nvPr>
+        </p:nvSpPr>
+        <p:spPr/>
+        <p:txBody>
+          <a:bodyPr/>
+          <a:lstStyle/>
+          <a:p>
+            <a:r>
+              <a:rPr lang="en-US" dirty="0" smtClean="0"/>
+              <a:t>Improving upon the state design pattern</a:t>
+            </a:r>
+            <a:endParaRPr lang="en-US" dirty="0"/>
+          </a:p>
+        </p:txBody>
+      </p:sp>
+      <p:sp>
+        <p:nvSpPr>
+          <p:cNvPr id="3" name="Content Placeholder 2"/>
+          <p:cNvSpPr>
+            <a:spLocks noGrp="1"/>
+          </p:cNvSpPr>
+          <p:nvPr>
+            <p:ph idx="1"/>
+          </p:nvPr>
+        </p:nvSpPr>
+        <p:spPr/>
+        <p:txBody>
+          <a:bodyPr/>
+          <a:lstStyle/>
+          <a:p>
+            <a:r>
+              <a:rPr lang="en-US" dirty="0" smtClean="0"/>
+              <a:t>What if we could…</a:t>
+            </a:r>
+          </a:p>
+          <a:p>
+            <a:pPr lvl="1"/>
+            <a:r>
+              <a:rPr lang="en-US" dirty="0" smtClean="0"/>
+              <a:t>Reduce the amount of code required by the state design pattern?</a:t>
+            </a:r>
+          </a:p>
+          <a:p>
+            <a:pPr lvl="2"/>
+            <a:r>
+              <a:rPr lang="en-US" dirty="0" smtClean="0"/>
+              <a:t>Including the likelihood of duplicate code</a:t>
+            </a:r>
+          </a:p>
+          <a:p>
+            <a:pPr lvl="1"/>
+            <a:r>
+              <a:rPr lang="en-US" dirty="0" smtClean="0"/>
+              <a:t>Better align with SOLID principles?</a:t>
+            </a:r>
+          </a:p>
+          <a:p>
+            <a:pPr lvl="1"/>
+            <a:r>
+              <a:rPr lang="en-US" dirty="0" smtClean="0"/>
+              <a:t>Make it easy to derive workflow from state machine implementation?</a:t>
+            </a:r>
+          </a:p>
+          <a:p>
+            <a:pPr lvl="1"/>
+            <a:endParaRPr lang="en-US" dirty="0" smtClean="0"/>
+          </a:p>
+          <a:p>
+            <a:pPr lvl="2"/>
+            <a:endParaRPr lang="en-US" dirty="0" smtClean="0"/>
+          </a:p>
+          <a:p>
+            <a:pPr lvl="1"/>
+            <a:endParaRPr lang="en-US" dirty="0" smtClean="0"/>
+          </a:p>
+          <a:p>
+            <a:pPr lvl="1"/>
+            <a:endParaRPr lang="en-US" dirty="0"/>
+          </a:p>
+        </p:txBody>
+      </p:sp>
+    </p:spTree>
+    <p:extLst>
+      <p:ext uri="{BB962C8B-B14F-4D97-AF65-F5344CB8AC3E}">
+        <p14:creationId xmlns:p14="http://schemas.microsoft.com/office/powerpoint/2010/main" val="556216006"/>
+      </p:ext>
+    </p:extLst>
+  </p:cSld>
+  <p:clrMapOvr>
+    <a:masterClrMapping/>
+  </p:clrMapOvr>
+</p:sld>
+</file>
+
 <file path=ppt/slides/slide2.xml><?xml version="1.0" encoding="utf-8"?>
 <p:sld xmlns:a="http://schemas.openxmlformats.org/drawingml/2006/main" xmlns:r="http://schemas.openxmlformats.org/officeDocument/2006/relationships" xmlns:p="http://schemas.openxmlformats.org/presentationml/2006/main">
   <p:cSld>
@@ -5758,7 +7231,11 @@
           <a:bodyPr/>
           <a:lstStyle/>
           <a:p>
-            <a:endParaRPr lang="en-US"/>
+            <a:r>
+              <a:rPr lang="en-US" dirty="0" smtClean="0"/>
+              <a:t>Overview</a:t>
+            </a:r>
+            <a:endParaRPr lang="en-US" dirty="0"/>
           </a:p>
         </p:txBody>
       </p:sp>
@@ -5779,22 +7256,34 @@
           <a:p>
             <a:r>
               <a:rPr lang="en-US" dirty="0" smtClean="0"/>
-              <a:t>Visual Studio 2019</a:t>
+              <a:t>Me</a:t>
+            </a:r>
+          </a:p>
+          <a:p>
+            <a:r>
+              <a:rPr lang="en-US" dirty="0" smtClean="0"/>
+              <a:t>Workshop to understand</a:t>
             </a:r>
           </a:p>
           <a:p>
             <a:pPr lvl="1"/>
             <a:r>
               <a:rPr lang="en-US" dirty="0" smtClean="0"/>
-              <a:t>???Need add in for </a:t>
-            </a:r>
-            <a:r>
-              <a:rPr lang="en-US" dirty="0" err="1" smtClean="0"/>
-              <a:t>Blazor</a:t>
-            </a:r>
-            <a:r>
-              <a:rPr lang="en-US" dirty="0" smtClean="0"/>
-              <a:t>?</a:t>
+              <a:t>what finite state machines are</a:t>
+            </a:r>
+          </a:p>
+          <a:p>
+            <a:pPr lvl="1"/>
+            <a:r>
+              <a:rPr lang="en-US" dirty="0" smtClean="0"/>
+              <a:t>when state machine are needed</a:t>
+            </a:r>
+          </a:p>
+          <a:p>
+            <a:pPr lvl="1"/>
+            <a:r>
+              <a:rPr lang="en-US" dirty="0" smtClean="0"/>
+              <a:t>naïve, standard, and advanced state machines implementations</a:t>
             </a:r>
             <a:endParaRPr lang="en-US" dirty="0"/>
           </a:p>
@@ -5803,7 +7292,549 @@
     </p:spTree>
     <p:extLst>
       <p:ext uri="{BB962C8B-B14F-4D97-AF65-F5344CB8AC3E}">
-        <p14:creationId xmlns:p14="http://schemas.microsoft.com/office/powerpoint/2010/main" val="3649181522"/>
+        <p14:creationId xmlns:p14="http://schemas.microsoft.com/office/powerpoint/2010/main" val="1551687372"/>
+      </p:ext>
+    </p:extLst>
+  </p:cSld>
+  <p:clrMapOvr>
+    <a:masterClrMapping/>
+  </p:clrMapOvr>
+</p:sld>
+</file>
+
+<file path=ppt/slides/slide20.xml><?xml version="1.0" encoding="utf-8"?>
+<p:sld xmlns:a="http://schemas.openxmlformats.org/drawingml/2006/main" xmlns:r="http://schemas.openxmlformats.org/officeDocument/2006/relationships" xmlns:p="http://schemas.openxmlformats.org/presentationml/2006/main">
+  <p:cSld>
+    <p:spTree>
+      <p:nvGrpSpPr>
+        <p:cNvPr id="1" name=""/>
+        <p:cNvGrpSpPr/>
+        <p:nvPr/>
+      </p:nvGrpSpPr>
+      <p:grpSpPr>
+        <a:xfrm>
+          <a:off x="0" y="0"/>
+          <a:ext cx="0" cy="0"/>
+          <a:chOff x="0" y="0"/>
+          <a:chExt cx="0" cy="0"/>
+        </a:xfrm>
+      </p:grpSpPr>
+      <p:sp>
+        <p:nvSpPr>
+          <p:cNvPr id="2" name="Title 1"/>
+          <p:cNvSpPr>
+            <a:spLocks noGrp="1"/>
+          </p:cNvSpPr>
+          <p:nvPr>
+            <p:ph type="title"/>
+          </p:nvPr>
+        </p:nvSpPr>
+        <p:spPr/>
+        <p:txBody>
+          <a:bodyPr/>
+          <a:lstStyle/>
+          <a:p>
+            <a:r>
+              <a:rPr lang="en-US" dirty="0" smtClean="0"/>
+              <a:t>Lesson 3: State management libraries</a:t>
+            </a:r>
+            <a:endParaRPr lang="en-US" dirty="0"/>
+          </a:p>
+        </p:txBody>
+      </p:sp>
+      <p:sp>
+        <p:nvSpPr>
+          <p:cNvPr id="3" name="Content Placeholder 2"/>
+          <p:cNvSpPr>
+            <a:spLocks noGrp="1"/>
+          </p:cNvSpPr>
+          <p:nvPr>
+            <p:ph idx="1"/>
+          </p:nvPr>
+        </p:nvSpPr>
+        <p:spPr/>
+        <p:txBody>
+          <a:bodyPr>
+            <a:normAutofit fontScale="47500" lnSpcReduction="20000"/>
+          </a:bodyPr>
+          <a:lstStyle/>
+          <a:p>
+            <a:r>
+              <a:rPr lang="en-US" dirty="0" smtClean="0"/>
+              <a:t>Define and configure states in a simple format</a:t>
+            </a:r>
+          </a:p>
+          <a:p>
+            <a:pPr lvl="1"/>
+            <a:r>
+              <a:rPr lang="en-US" dirty="0" smtClean="0"/>
+              <a:t>Transitions and conditions</a:t>
+            </a:r>
+          </a:p>
+          <a:p>
+            <a:pPr lvl="1"/>
+            <a:r>
+              <a:rPr lang="en-US" dirty="0" err="1" smtClean="0"/>
+              <a:t>Substates</a:t>
+            </a:r>
+            <a:endParaRPr lang="en-US" dirty="0" smtClean="0"/>
+          </a:p>
+          <a:p>
+            <a:pPr lvl="1"/>
+            <a:r>
+              <a:rPr lang="en-US" dirty="0" smtClean="0"/>
+              <a:t>Shortcuts for common transition patterns</a:t>
+            </a:r>
+          </a:p>
+          <a:p>
+            <a:r>
+              <a:rPr lang="en-US" dirty="0" smtClean="0"/>
+              <a:t>Define actions on state transition events</a:t>
+            </a:r>
+          </a:p>
+          <a:p>
+            <a:pPr lvl="1"/>
+            <a:r>
+              <a:rPr lang="en-US" dirty="0" smtClean="0"/>
+              <a:t>Entry, Exit, Reenter</a:t>
+            </a:r>
+          </a:p>
+          <a:p>
+            <a:r>
+              <a:rPr lang="en-US" dirty="0" smtClean="0"/>
+              <a:t>Automatically transition after an action</a:t>
+            </a:r>
+          </a:p>
+          <a:p>
+            <a:pPr lvl="1"/>
+            <a:r>
+              <a:rPr lang="en-US" dirty="0" err="1" smtClean="0"/>
+              <a:t>AutoForward</a:t>
+            </a:r>
+            <a:r>
+              <a:rPr lang="en-US" dirty="0" smtClean="0"/>
+              <a:t>/Fallback</a:t>
+            </a:r>
+          </a:p>
+          <a:p>
+            <a:r>
+              <a:rPr lang="en-US" dirty="0" smtClean="0"/>
+              <a:t>Dynamically define transitions at run time</a:t>
+            </a:r>
+          </a:p>
+          <a:p>
+            <a:r>
+              <a:rPr lang="en-US" dirty="0" smtClean="0"/>
+              <a:t>Derive workflow from code</a:t>
+            </a:r>
+          </a:p>
+          <a:p>
+            <a:pPr lvl="1"/>
+            <a:r>
+              <a:rPr lang="en-US" dirty="0" smtClean="0"/>
+              <a:t>Excel table</a:t>
+            </a:r>
+          </a:p>
+          <a:p>
+            <a:pPr lvl="1"/>
+            <a:r>
+              <a:rPr lang="en-US" dirty="0" smtClean="0"/>
+              <a:t>State diagram</a:t>
+            </a:r>
+          </a:p>
+          <a:p>
+            <a:r>
+              <a:rPr lang="en-US" dirty="0" smtClean="0"/>
+              <a:t>Available libraries…</a:t>
+            </a:r>
+          </a:p>
+          <a:p>
+            <a:r>
+              <a:rPr lang="en-US" dirty="0" smtClean="0"/>
+              <a:t>Note that “Actions” are frequently referred to as “triggers”, “events”, or “trigger events”</a:t>
+            </a:r>
+            <a:endParaRPr lang="en-US" dirty="0"/>
+          </a:p>
+        </p:txBody>
+      </p:sp>
+    </p:spTree>
+    <p:extLst>
+      <p:ext uri="{BB962C8B-B14F-4D97-AF65-F5344CB8AC3E}">
+        <p14:creationId xmlns:p14="http://schemas.microsoft.com/office/powerpoint/2010/main" val="3809142904"/>
+      </p:ext>
+    </p:extLst>
+  </p:cSld>
+  <p:clrMapOvr>
+    <a:masterClrMapping/>
+  </p:clrMapOvr>
+</p:sld>
+</file>
+
+<file path=ppt/slides/slide21.xml><?xml version="1.0" encoding="utf-8"?>
+<p:sld xmlns:a="http://schemas.openxmlformats.org/drawingml/2006/main" xmlns:r="http://schemas.openxmlformats.org/officeDocument/2006/relationships" xmlns:p="http://schemas.openxmlformats.org/presentationml/2006/main">
+  <p:cSld>
+    <p:spTree>
+      <p:nvGrpSpPr>
+        <p:cNvPr id="1" name=""/>
+        <p:cNvGrpSpPr/>
+        <p:nvPr/>
+      </p:nvGrpSpPr>
+      <p:grpSpPr>
+        <a:xfrm>
+          <a:off x="0" y="0"/>
+          <a:ext cx="0" cy="0"/>
+          <a:chOff x="0" y="0"/>
+          <a:chExt cx="0" cy="0"/>
+        </a:xfrm>
+      </p:grpSpPr>
+      <p:sp>
+        <p:nvSpPr>
+          <p:cNvPr id="2" name="Title 1"/>
+          <p:cNvSpPr>
+            <a:spLocks noGrp="1"/>
+          </p:cNvSpPr>
+          <p:nvPr>
+            <p:ph type="title"/>
+          </p:nvPr>
+        </p:nvSpPr>
+        <p:spPr/>
+        <p:txBody>
+          <a:bodyPr/>
+          <a:lstStyle/>
+          <a:p>
+            <a:r>
+              <a:rPr lang="en-US" dirty="0" smtClean="0"/>
+              <a:t>Exercise 3: sale state machine with library </a:t>
+            </a:r>
+            <a:endParaRPr lang="en-US" dirty="0"/>
+          </a:p>
+        </p:txBody>
+      </p:sp>
+      <p:sp>
+        <p:nvSpPr>
+          <p:cNvPr id="3" name="Content Placeholder 2"/>
+          <p:cNvSpPr>
+            <a:spLocks noGrp="1"/>
+          </p:cNvSpPr>
+          <p:nvPr>
+            <p:ph idx="1"/>
+          </p:nvPr>
+        </p:nvSpPr>
+        <p:spPr/>
+        <p:txBody>
+          <a:bodyPr/>
+          <a:lstStyle/>
+          <a:p>
+            <a:r>
+              <a:rPr lang="en-US" dirty="0"/>
+              <a:t>Start from </a:t>
+            </a:r>
+            <a:r>
+              <a:rPr lang="en-US" dirty="0" smtClean="0"/>
+              <a:t>Exercise3_Initial\PointOfSaleStateManagement.sln</a:t>
+            </a:r>
+            <a:endParaRPr lang="en-US" dirty="0"/>
+          </a:p>
+          <a:p>
+            <a:pPr lvl="1"/>
+            <a:r>
+              <a:rPr lang="en-US" dirty="0" err="1" smtClean="0"/>
+              <a:t>NStateManager</a:t>
+            </a:r>
+            <a:r>
+              <a:rPr lang="en-US" dirty="0" smtClean="0"/>
+              <a:t> already loaded</a:t>
+            </a:r>
+          </a:p>
+          <a:p>
+            <a:r>
+              <a:rPr lang="en-US" dirty="0" smtClean="0"/>
+              <a:t>???Only </a:t>
+            </a:r>
+            <a:r>
+              <a:rPr lang="en-US" dirty="0"/>
+              <a:t>make changes to </a:t>
+            </a:r>
+            <a:r>
+              <a:rPr lang="en-US" dirty="0" err="1"/>
+              <a:t>Sale.cs</a:t>
+            </a:r>
+            <a:endParaRPr lang="en-US" dirty="0"/>
+          </a:p>
+          <a:p>
+            <a:pPr lvl="1"/>
+            <a:r>
+              <a:rPr lang="en-US" dirty="0"/>
+              <a:t>Skip the UI constraints</a:t>
+            </a:r>
+          </a:p>
+          <a:p>
+            <a:r>
+              <a:rPr lang="en-US" dirty="0"/>
+              <a:t>unit tests should pass when new rules implemented</a:t>
+            </a:r>
+          </a:p>
+          <a:p>
+            <a:endParaRPr lang="en-US" dirty="0"/>
+          </a:p>
+        </p:txBody>
+      </p:sp>
+    </p:spTree>
+    <p:extLst>
+      <p:ext uri="{BB962C8B-B14F-4D97-AF65-F5344CB8AC3E}">
+        <p14:creationId xmlns:p14="http://schemas.microsoft.com/office/powerpoint/2010/main" val="1352888777"/>
+      </p:ext>
+    </p:extLst>
+  </p:cSld>
+  <p:clrMapOvr>
+    <a:masterClrMapping/>
+  </p:clrMapOvr>
+</p:sld>
+</file>
+
+<file path=ppt/slides/slide22.xml><?xml version="1.0" encoding="utf-8"?>
+<p:sld xmlns:a="http://schemas.openxmlformats.org/drawingml/2006/main" xmlns:r="http://schemas.openxmlformats.org/officeDocument/2006/relationships" xmlns:p="http://schemas.openxmlformats.org/presentationml/2006/main">
+  <p:cSld>
+    <p:spTree>
+      <p:nvGrpSpPr>
+        <p:cNvPr id="1" name=""/>
+        <p:cNvGrpSpPr/>
+        <p:nvPr/>
+      </p:nvGrpSpPr>
+      <p:grpSpPr>
+        <a:xfrm>
+          <a:off x="0" y="0"/>
+          <a:ext cx="0" cy="0"/>
+          <a:chOff x="0" y="0"/>
+          <a:chExt cx="0" cy="0"/>
+        </a:xfrm>
+      </p:grpSpPr>
+      <p:sp>
+        <p:nvSpPr>
+          <p:cNvPr id="2" name="Title 1"/>
+          <p:cNvSpPr>
+            <a:spLocks noGrp="1"/>
+          </p:cNvSpPr>
+          <p:nvPr>
+            <p:ph type="title"/>
+          </p:nvPr>
+        </p:nvSpPr>
+        <p:spPr/>
+        <p:txBody>
+          <a:bodyPr/>
+          <a:lstStyle/>
+          <a:p>
+            <a:r>
+              <a:rPr lang="en-US" dirty="0" smtClean="0"/>
+              <a:t>Exercise 3: implementation details</a:t>
+            </a:r>
+            <a:endParaRPr lang="en-US" dirty="0"/>
+          </a:p>
+        </p:txBody>
+      </p:sp>
+      <p:sp>
+        <p:nvSpPr>
+          <p:cNvPr id="3" name="Content Placeholder 2"/>
+          <p:cNvSpPr>
+            <a:spLocks noGrp="1"/>
+          </p:cNvSpPr>
+          <p:nvPr>
+            <p:ph idx="1"/>
+          </p:nvPr>
+        </p:nvSpPr>
+        <p:spPr/>
+        <p:txBody>
+          <a:bodyPr/>
+          <a:lstStyle/>
+          <a:p>
+            <a:endParaRPr lang="en-US"/>
+          </a:p>
+        </p:txBody>
+      </p:sp>
+    </p:spTree>
+    <p:extLst>
+      <p:ext uri="{BB962C8B-B14F-4D97-AF65-F5344CB8AC3E}">
+        <p14:creationId xmlns:p14="http://schemas.microsoft.com/office/powerpoint/2010/main" val="3948845357"/>
+      </p:ext>
+    </p:extLst>
+  </p:cSld>
+  <p:clrMapOvr>
+    <a:masterClrMapping/>
+  </p:clrMapOvr>
+</p:sld>
+</file>
+
+<file path=ppt/slides/slide23.xml><?xml version="1.0" encoding="utf-8"?>
+<p:sld xmlns:a="http://schemas.openxmlformats.org/drawingml/2006/main" xmlns:r="http://schemas.openxmlformats.org/officeDocument/2006/relationships" xmlns:p="http://schemas.openxmlformats.org/presentationml/2006/main">
+  <p:cSld>
+    <p:spTree>
+      <p:nvGrpSpPr>
+        <p:cNvPr id="1" name=""/>
+        <p:cNvGrpSpPr/>
+        <p:nvPr/>
+      </p:nvGrpSpPr>
+      <p:grpSpPr>
+        <a:xfrm>
+          <a:off x="0" y="0"/>
+          <a:ext cx="0" cy="0"/>
+          <a:chOff x="0" y="0"/>
+          <a:chExt cx="0" cy="0"/>
+        </a:xfrm>
+      </p:grpSpPr>
+      <p:sp>
+        <p:nvSpPr>
+          <p:cNvPr id="2" name="Title 1"/>
+          <p:cNvSpPr>
+            <a:spLocks noGrp="1"/>
+          </p:cNvSpPr>
+          <p:nvPr>
+            <p:ph type="title"/>
+          </p:nvPr>
+        </p:nvSpPr>
+        <p:spPr/>
+        <p:txBody>
+          <a:bodyPr/>
+          <a:lstStyle/>
+          <a:p>
+            <a:r>
+              <a:rPr lang="en-US" dirty="0" smtClean="0"/>
+              <a:t>Exercise 3: retrospective</a:t>
+            </a:r>
+            <a:endParaRPr lang="en-US" dirty="0"/>
+          </a:p>
+        </p:txBody>
+      </p:sp>
+      <p:sp>
+        <p:nvSpPr>
+          <p:cNvPr id="3" name="Content Placeholder 2"/>
+          <p:cNvSpPr>
+            <a:spLocks noGrp="1"/>
+          </p:cNvSpPr>
+          <p:nvPr>
+            <p:ph idx="1"/>
+          </p:nvPr>
+        </p:nvSpPr>
+        <p:spPr/>
+        <p:txBody>
+          <a:bodyPr/>
+          <a:lstStyle/>
+          <a:p>
+            <a:r>
+              <a:rPr lang="en-US" dirty="0" smtClean="0"/>
+              <a:t>Exercise3_Final\PointOfSaleStateManagement.sln </a:t>
+            </a:r>
+            <a:r>
+              <a:rPr lang="en-US" dirty="0"/>
+              <a:t>is my version of this exercise</a:t>
+            </a:r>
+          </a:p>
+          <a:p>
+            <a:endParaRPr lang="en-US" dirty="0"/>
+          </a:p>
+        </p:txBody>
+      </p:sp>
+    </p:spTree>
+    <p:extLst>
+      <p:ext uri="{BB962C8B-B14F-4D97-AF65-F5344CB8AC3E}">
+        <p14:creationId xmlns:p14="http://schemas.microsoft.com/office/powerpoint/2010/main" val="758800806"/>
+      </p:ext>
+    </p:extLst>
+  </p:cSld>
+  <p:clrMapOvr>
+    <a:masterClrMapping/>
+  </p:clrMapOvr>
+</p:sld>
+</file>
+
+<file path=ppt/slides/slide24.xml><?xml version="1.0" encoding="utf-8"?>
+<p:sld xmlns:a="http://schemas.openxmlformats.org/drawingml/2006/main" xmlns:r="http://schemas.openxmlformats.org/officeDocument/2006/relationships" xmlns:p="http://schemas.openxmlformats.org/presentationml/2006/main">
+  <p:cSld>
+    <p:spTree>
+      <p:nvGrpSpPr>
+        <p:cNvPr id="1" name=""/>
+        <p:cNvGrpSpPr/>
+        <p:nvPr/>
+      </p:nvGrpSpPr>
+      <p:grpSpPr>
+        <a:xfrm>
+          <a:off x="0" y="0"/>
+          <a:ext cx="0" cy="0"/>
+          <a:chOff x="0" y="0"/>
+          <a:chExt cx="0" cy="0"/>
+        </a:xfrm>
+      </p:grpSpPr>
+      <p:sp>
+        <p:nvSpPr>
+          <p:cNvPr id="2" name="Title 1"/>
+          <p:cNvSpPr>
+            <a:spLocks noGrp="1"/>
+          </p:cNvSpPr>
+          <p:nvPr>
+            <p:ph type="title"/>
+          </p:nvPr>
+        </p:nvSpPr>
+        <p:spPr/>
+        <p:txBody>
+          <a:bodyPr/>
+          <a:lstStyle/>
+          <a:p>
+            <a:r>
+              <a:rPr lang="en-US" dirty="0" smtClean="0"/>
+              <a:t>summary</a:t>
+            </a:r>
+            <a:endParaRPr lang="en-US" dirty="0"/>
+          </a:p>
+        </p:txBody>
+      </p:sp>
+      <p:sp>
+        <p:nvSpPr>
+          <p:cNvPr id="3" name="Content Placeholder 2"/>
+          <p:cNvSpPr>
+            <a:spLocks noGrp="1"/>
+          </p:cNvSpPr>
+          <p:nvPr>
+            <p:ph idx="1"/>
+          </p:nvPr>
+        </p:nvSpPr>
+        <p:spPr/>
+        <p:txBody>
+          <a:bodyPr/>
+          <a:lstStyle/>
+          <a:p>
+            <a:r>
+              <a:rPr lang="en-US" dirty="0" smtClean="0"/>
+              <a:t>recognize need manage state</a:t>
+            </a:r>
+          </a:p>
+          <a:p>
+            <a:pPr lvl="1"/>
+            <a:r>
+              <a:rPr lang="en-US" dirty="0" smtClean="0"/>
+              <a:t>More of a technical responsibility than business/product owner</a:t>
+            </a:r>
+          </a:p>
+          <a:p>
+            <a:pPr lvl="1"/>
+            <a:r>
+              <a:rPr lang="en-US" dirty="0" smtClean="0"/>
+              <a:t>Avoid managing multiple state flags, confusing if blocks, and lengthy switch statements</a:t>
+            </a:r>
+          </a:p>
+          <a:p>
+            <a:r>
+              <a:rPr lang="en-US" dirty="0" smtClean="0"/>
+              <a:t>Understand the state design, consider using one of the available libraries to overcome its anti-patterns</a:t>
+            </a:r>
+          </a:p>
+          <a:p>
+            <a:endParaRPr lang="en-US" dirty="0"/>
+          </a:p>
+        </p:txBody>
+      </p:sp>
+    </p:spTree>
+    <p:extLst>
+      <p:ext uri="{BB962C8B-B14F-4D97-AF65-F5344CB8AC3E}">
+        <p14:creationId xmlns:p14="http://schemas.microsoft.com/office/powerpoint/2010/main" val="54891806"/>
       </p:ext>
     </p:extLst>
   </p:cSld>
@@ -5847,7 +7878,7 @@
           <a:p>
             <a:r>
               <a:rPr lang="en-US" dirty="0" smtClean="0"/>
-              <a:t>POS Rules</a:t>
+              <a:t>Getting started</a:t>
             </a:r>
             <a:endParaRPr lang="en-US" dirty="0"/>
           </a:p>
@@ -5870,51 +7901,32 @@
           <a:p>
             <a:r>
               <a:rPr lang="en-US" dirty="0" smtClean="0"/>
-              <a:t>Items can be modified until balance is 0 or cancelled</a:t>
-            </a:r>
-          </a:p>
-          <a:p>
-            <a:r>
-              <a:rPr lang="en-US" dirty="0" smtClean="0"/>
-              <a:t>Can only accept payment if balance &lt; 0 and not cancelled</a:t>
-            </a:r>
-          </a:p>
-          <a:p>
-            <a:r>
-              <a:rPr lang="en-US" dirty="0" smtClean="0"/>
-              <a:t>If customer overpays (Balance &gt; 0), can only give change or cancel the sale</a:t>
-            </a:r>
-          </a:p>
-          <a:p>
-            <a:r>
-              <a:rPr lang="en-US" dirty="0" smtClean="0"/>
-              <a:t>Can’t give change  if balance &lt;= 0</a:t>
-            </a:r>
-          </a:p>
-          <a:p>
-            <a:r>
-              <a:rPr lang="en-US" dirty="0" smtClean="0"/>
-              <a:t>No changes to sales that have been paid or cancelled</a:t>
-            </a:r>
-          </a:p>
-          <a:p>
-            <a:r>
-              <a:rPr lang="en-US" dirty="0" smtClean="0"/>
-              <a:t>Can’t cancel a sale that’s been completed</a:t>
-            </a:r>
-          </a:p>
-          <a:p>
+              <a:t>Latest Visual </a:t>
+            </a:r>
+            <a:r>
+              <a:rPr lang="en-US" dirty="0" smtClean="0"/>
+              <a:t>Studio 2019</a:t>
+            </a:r>
+          </a:p>
+          <a:p>
+            <a:r>
+              <a:rPr lang="en-US" dirty="0" smtClean="0"/>
+              <a:t>Clone repo: </a:t>
+            </a:r>
+            <a:r>
+              <a:rPr lang="en-US" dirty="0">
+                <a:hlinkClick r:id="rId2"/>
+              </a:rPr>
+              <a:t>https://github.com/scottctr/StateMachineWorkshop</a:t>
+            </a:r>
             <a:endParaRPr lang="en-US" dirty="0" smtClean="0"/>
-          </a:p>
-          <a:p>
-            <a:endParaRPr lang="en-US" dirty="0"/>
           </a:p>
         </p:txBody>
       </p:sp>
     </p:spTree>
     <p:extLst>
       <p:ext uri="{BB962C8B-B14F-4D97-AF65-F5344CB8AC3E}">
-        <p14:creationId xmlns:p14="http://schemas.microsoft.com/office/powerpoint/2010/main" val="656665659"/>
+        <p14:creationId xmlns:p14="http://schemas.microsoft.com/office/powerpoint/2010/main" val="3649181522"/>
       </p:ext>
     </p:extLst>
   </p:cSld>
@@ -5958,7 +7970,7 @@
           <a:p>
             <a:r>
               <a:rPr lang="en-US" dirty="0" smtClean="0"/>
-              <a:t>Logging</a:t>
+              <a:t>Exercise 1: intro</a:t>
             </a:r>
             <a:endParaRPr lang="en-US" dirty="0"/>
           </a:p>
@@ -5976,51 +7988,882 @@
         </p:nvSpPr>
         <p:spPr/>
         <p:txBody>
-          <a:bodyPr/>
-          <a:lstStyle/>
-          <a:p>
-            <a:r>
-              <a:rPr lang="en-US" dirty="0" smtClean="0"/>
-              <a:t>New sale</a:t>
-            </a:r>
-          </a:p>
-          <a:p>
-            <a:r>
-              <a:rPr lang="en-US" dirty="0" smtClean="0"/>
-              <a:t>Changes to items</a:t>
-            </a:r>
-          </a:p>
-          <a:p>
-            <a:r>
-              <a:rPr lang="en-US" dirty="0" smtClean="0"/>
-              <a:t>Payment received</a:t>
-            </a:r>
-          </a:p>
-          <a:p>
-            <a:r>
-              <a:rPr lang="en-US" dirty="0" smtClean="0"/>
-              <a:t>Change given</a:t>
-            </a:r>
-          </a:p>
-          <a:p>
-            <a:r>
-              <a:rPr lang="en-US" dirty="0" smtClean="0"/>
-              <a:t>Balance = 0 / sale complete</a:t>
-            </a:r>
-          </a:p>
-          <a:p>
-            <a:r>
-              <a:rPr lang="en-US" dirty="0" smtClean="0"/>
-              <a:t>Sale cancelled</a:t>
-            </a:r>
-            <a:endParaRPr lang="en-US" dirty="0"/>
+          <a:bodyPr>
+            <a:normAutofit fontScale="92500" lnSpcReduction="10000"/>
+          </a:bodyPr>
+          <a:lstStyle/>
+          <a:p>
+            <a:r>
+              <a:rPr lang="en-US" dirty="0" smtClean="0"/>
+              <a:t>Pop sells gas, oil, and snacks</a:t>
+            </a:r>
+          </a:p>
+          <a:p>
+            <a:r>
+              <a:rPr lang="en-US" dirty="0" smtClean="0"/>
+              <a:t>Has point of sale that works – needs new constraints for new employees</a:t>
+            </a:r>
+          </a:p>
+          <a:p>
+            <a:r>
+              <a:rPr lang="en-US" dirty="0" smtClean="0"/>
+              <a:t>Current functionality</a:t>
+            </a:r>
+          </a:p>
+          <a:p>
+            <a:pPr lvl="1"/>
+            <a:r>
+              <a:rPr lang="en-US" dirty="0" smtClean="0"/>
+              <a:t>Modify items: add, change quantity, delete</a:t>
+            </a:r>
+          </a:p>
+          <a:p>
+            <a:pPr lvl="1"/>
+            <a:r>
+              <a:rPr lang="en-US" dirty="0" smtClean="0"/>
+              <a:t>Accept payment</a:t>
+            </a:r>
+          </a:p>
+          <a:p>
+            <a:pPr lvl="1"/>
+            <a:r>
+              <a:rPr lang="en-US" dirty="0" smtClean="0"/>
+              <a:t>Give change</a:t>
+            </a:r>
+          </a:p>
+          <a:p>
+            <a:r>
+              <a:rPr lang="en-US" dirty="0" smtClean="0"/>
+              <a:t>Demo…</a:t>
+            </a:r>
+          </a:p>
+          <a:p>
+            <a:r>
+              <a:rPr lang="en-US" dirty="0" smtClean="0"/>
+              <a:t>Review solution structure…</a:t>
+            </a:r>
           </a:p>
         </p:txBody>
       </p:sp>
     </p:spTree>
     <p:extLst>
       <p:ext uri="{BB962C8B-B14F-4D97-AF65-F5344CB8AC3E}">
-        <p14:creationId xmlns:p14="http://schemas.microsoft.com/office/powerpoint/2010/main" val="1828810255"/>
+        <p14:creationId xmlns:p14="http://schemas.microsoft.com/office/powerpoint/2010/main" val="756108408"/>
+      </p:ext>
+    </p:extLst>
+  </p:cSld>
+  <p:clrMapOvr>
+    <a:masterClrMapping/>
+  </p:clrMapOvr>
+</p:sld>
+</file>
+
+<file path=ppt/slides/slide5.xml><?xml version="1.0" encoding="utf-8"?>
+<p:sld xmlns:a="http://schemas.openxmlformats.org/drawingml/2006/main" xmlns:r="http://schemas.openxmlformats.org/officeDocument/2006/relationships" xmlns:p="http://schemas.openxmlformats.org/presentationml/2006/main">
+  <p:cSld>
+    <p:spTree>
+      <p:nvGrpSpPr>
+        <p:cNvPr id="1" name=""/>
+        <p:cNvGrpSpPr/>
+        <p:nvPr/>
+      </p:nvGrpSpPr>
+      <p:grpSpPr>
+        <a:xfrm>
+          <a:off x="0" y="0"/>
+          <a:ext cx="0" cy="0"/>
+          <a:chOff x="0" y="0"/>
+          <a:chExt cx="0" cy="0"/>
+        </a:xfrm>
+      </p:grpSpPr>
+      <p:sp>
+        <p:nvSpPr>
+          <p:cNvPr id="2" name="Title 1"/>
+          <p:cNvSpPr>
+            <a:spLocks noGrp="1"/>
+          </p:cNvSpPr>
+          <p:nvPr>
+            <p:ph type="title"/>
+          </p:nvPr>
+        </p:nvSpPr>
+        <p:spPr/>
+        <p:txBody>
+          <a:bodyPr/>
+          <a:lstStyle/>
+          <a:p>
+            <a:r>
+              <a:rPr lang="en-US" dirty="0" smtClean="0"/>
+              <a:t>Exercise 1: new rules</a:t>
+            </a:r>
+            <a:endParaRPr lang="en-US" dirty="0"/>
+          </a:p>
+        </p:txBody>
+      </p:sp>
+      <p:sp>
+        <p:nvSpPr>
+          <p:cNvPr id="3" name="Content Placeholder 2"/>
+          <p:cNvSpPr>
+            <a:spLocks noGrp="1"/>
+          </p:cNvSpPr>
+          <p:nvPr>
+            <p:ph idx="1"/>
+          </p:nvPr>
+        </p:nvSpPr>
+        <p:spPr/>
+        <p:txBody>
+          <a:bodyPr>
+            <a:normAutofit/>
+          </a:bodyPr>
+          <a:lstStyle/>
+          <a:p>
+            <a:pPr marL="457200" indent="-457200">
+              <a:buFont typeface="+mj-lt"/>
+              <a:buAutoNum type="arabicPeriod"/>
+            </a:pPr>
+            <a:r>
+              <a:rPr lang="en-US" dirty="0" smtClean="0"/>
+              <a:t>Can </a:t>
+            </a:r>
+            <a:r>
+              <a:rPr lang="en-US" dirty="0"/>
+              <a:t>only accept payment if balance &lt; </a:t>
+            </a:r>
+            <a:r>
+              <a:rPr lang="en-US" dirty="0" smtClean="0"/>
+              <a:t>0</a:t>
+            </a:r>
+          </a:p>
+          <a:p>
+            <a:pPr marL="457200" indent="-457200">
+              <a:buFont typeface="+mj-lt"/>
+              <a:buAutoNum type="arabicPeriod"/>
+            </a:pPr>
+            <a:r>
+              <a:rPr lang="en-US" dirty="0" smtClean="0"/>
+              <a:t>Can </a:t>
+            </a:r>
+            <a:r>
+              <a:rPr lang="en-US" dirty="0"/>
+              <a:t>only give change </a:t>
+            </a:r>
+            <a:r>
+              <a:rPr lang="en-US" dirty="0" smtClean="0"/>
+              <a:t>when balance &gt; 0</a:t>
+            </a:r>
+          </a:p>
+          <a:p>
+            <a:pPr marL="457200" indent="-457200">
+              <a:buFont typeface="+mj-lt"/>
+              <a:buAutoNum type="arabicPeriod"/>
+            </a:pPr>
+            <a:r>
+              <a:rPr lang="en-US" dirty="0" smtClean="0"/>
+              <a:t>No </a:t>
+            </a:r>
+            <a:r>
+              <a:rPr lang="en-US" dirty="0"/>
+              <a:t>changes </a:t>
+            </a:r>
+            <a:r>
+              <a:rPr lang="en-US" dirty="0" smtClean="0"/>
+              <a:t>to paid sales</a:t>
+            </a:r>
+          </a:p>
+          <a:p>
+            <a:pPr lvl="1">
+              <a:buFont typeface="Wingdings" panose="05000000000000000000" pitchFamily="2" charset="2"/>
+              <a:buChar char="Ø"/>
+            </a:pPr>
+            <a:r>
+              <a:rPr lang="en-US" dirty="0" smtClean="0"/>
+              <a:t>Paid = 0 </a:t>
+            </a:r>
+            <a:r>
+              <a:rPr lang="en-US" dirty="0"/>
+              <a:t>balance, 1+ items, 1+ </a:t>
+            </a:r>
+            <a:r>
+              <a:rPr lang="en-US" dirty="0" smtClean="0"/>
+              <a:t>payments</a:t>
+            </a:r>
+          </a:p>
+        </p:txBody>
+      </p:sp>
+    </p:spTree>
+    <p:extLst>
+      <p:ext uri="{BB962C8B-B14F-4D97-AF65-F5344CB8AC3E}">
+        <p14:creationId xmlns:p14="http://schemas.microsoft.com/office/powerpoint/2010/main" val="1387114179"/>
+      </p:ext>
+    </p:extLst>
+  </p:cSld>
+  <p:clrMapOvr>
+    <a:masterClrMapping/>
+  </p:clrMapOvr>
+</p:sld>
+</file>
+
+<file path=ppt/slides/slide6.xml><?xml version="1.0" encoding="utf-8"?>
+<p:sld xmlns:a="http://schemas.openxmlformats.org/drawingml/2006/main" xmlns:r="http://schemas.openxmlformats.org/officeDocument/2006/relationships" xmlns:p="http://schemas.openxmlformats.org/presentationml/2006/main">
+  <p:cSld>
+    <p:spTree>
+      <p:nvGrpSpPr>
+        <p:cNvPr id="1" name=""/>
+        <p:cNvGrpSpPr/>
+        <p:nvPr/>
+      </p:nvGrpSpPr>
+      <p:grpSpPr>
+        <a:xfrm>
+          <a:off x="0" y="0"/>
+          <a:ext cx="0" cy="0"/>
+          <a:chOff x="0" y="0"/>
+          <a:chExt cx="0" cy="0"/>
+        </a:xfrm>
+      </p:grpSpPr>
+      <p:sp>
+        <p:nvSpPr>
+          <p:cNvPr id="2" name="Title 1"/>
+          <p:cNvSpPr>
+            <a:spLocks noGrp="1"/>
+          </p:cNvSpPr>
+          <p:nvPr>
+            <p:ph type="title"/>
+          </p:nvPr>
+        </p:nvSpPr>
+        <p:spPr/>
+        <p:txBody>
+          <a:bodyPr/>
+          <a:lstStyle/>
+          <a:p>
+            <a:r>
+              <a:rPr lang="en-US" dirty="0" smtClean="0"/>
+              <a:t>Exercise 1: implementation details</a:t>
+            </a:r>
+            <a:endParaRPr lang="en-US" dirty="0"/>
+          </a:p>
+        </p:txBody>
+      </p:sp>
+      <p:sp>
+        <p:nvSpPr>
+          <p:cNvPr id="3" name="Content Placeholder 2"/>
+          <p:cNvSpPr>
+            <a:spLocks noGrp="1"/>
+          </p:cNvSpPr>
+          <p:nvPr>
+            <p:ph idx="1"/>
+          </p:nvPr>
+        </p:nvSpPr>
+        <p:spPr/>
+        <p:txBody>
+          <a:bodyPr/>
+          <a:lstStyle/>
+          <a:p>
+            <a:r>
+              <a:rPr lang="en-US" dirty="0" smtClean="0"/>
+              <a:t>Use Exercise1_Initial\PointOfSaleStateManagement.sln</a:t>
+            </a:r>
+          </a:p>
+          <a:p>
+            <a:r>
+              <a:rPr lang="en-US" dirty="0" smtClean="0"/>
+              <a:t>Changes should go in Data\</a:t>
+            </a:r>
+            <a:r>
+              <a:rPr lang="en-US" dirty="0" err="1" smtClean="0"/>
+              <a:t>Sale.cs</a:t>
+            </a:r>
+            <a:r>
+              <a:rPr lang="en-US" dirty="0" smtClean="0"/>
+              <a:t> or create new classes to be used by </a:t>
+            </a:r>
+            <a:r>
+              <a:rPr lang="en-US" dirty="0" err="1" smtClean="0"/>
+              <a:t>Sale.cs</a:t>
+            </a:r>
+            <a:endParaRPr lang="en-US" dirty="0" smtClean="0"/>
+          </a:p>
+          <a:p>
+            <a:pPr lvl="1"/>
+            <a:r>
+              <a:rPr lang="en-US" dirty="0" smtClean="0"/>
+              <a:t>i.e. don’t </a:t>
+            </a:r>
+            <a:r>
+              <a:rPr lang="en-US" dirty="0"/>
+              <a:t>implement rules in </a:t>
+            </a:r>
+            <a:r>
+              <a:rPr lang="en-US" dirty="0" smtClean="0"/>
+              <a:t>UI</a:t>
+            </a:r>
+          </a:p>
+          <a:p>
+            <a:r>
+              <a:rPr lang="en-US" dirty="0" smtClean="0"/>
+              <a:t>When rules are violated, return appropriate </a:t>
+            </a:r>
+            <a:r>
+              <a:rPr lang="en-US" dirty="0" err="1" smtClean="0"/>
+              <a:t>ActionResult</a:t>
+            </a:r>
+            <a:r>
+              <a:rPr lang="en-US" dirty="0" smtClean="0"/>
+              <a:t> </a:t>
+            </a:r>
+          </a:p>
+          <a:p>
+            <a:pPr lvl="1"/>
+            <a:r>
+              <a:rPr lang="en-US" dirty="0" err="1" smtClean="0"/>
+              <a:t>WasSuccess</a:t>
+            </a:r>
+            <a:r>
+              <a:rPr lang="en-US" dirty="0" smtClean="0"/>
+              <a:t> = false and an error message</a:t>
+            </a:r>
+          </a:p>
+          <a:p>
+            <a:r>
+              <a:rPr lang="en-US" dirty="0" smtClean="0"/>
+              <a:t>All unit tests should pass when new rules implemented</a:t>
+            </a:r>
+            <a:endParaRPr lang="en-US" dirty="0"/>
+          </a:p>
+        </p:txBody>
+      </p:sp>
+    </p:spTree>
+    <p:extLst>
+      <p:ext uri="{BB962C8B-B14F-4D97-AF65-F5344CB8AC3E}">
+        <p14:creationId xmlns:p14="http://schemas.microsoft.com/office/powerpoint/2010/main" val="1609853759"/>
+      </p:ext>
+    </p:extLst>
+  </p:cSld>
+  <p:clrMapOvr>
+    <a:masterClrMapping/>
+  </p:clrMapOvr>
+</p:sld>
+</file>
+
+<file path=ppt/slides/slide7.xml><?xml version="1.0" encoding="utf-8"?>
+<p:sld xmlns:a="http://schemas.openxmlformats.org/drawingml/2006/main" xmlns:r="http://schemas.openxmlformats.org/officeDocument/2006/relationships" xmlns:p="http://schemas.openxmlformats.org/presentationml/2006/main">
+  <p:cSld>
+    <p:spTree>
+      <p:nvGrpSpPr>
+        <p:cNvPr id="1" name=""/>
+        <p:cNvGrpSpPr/>
+        <p:nvPr/>
+      </p:nvGrpSpPr>
+      <p:grpSpPr>
+        <a:xfrm>
+          <a:off x="0" y="0"/>
+          <a:ext cx="0" cy="0"/>
+          <a:chOff x="0" y="0"/>
+          <a:chExt cx="0" cy="0"/>
+        </a:xfrm>
+      </p:grpSpPr>
+      <p:sp>
+        <p:nvSpPr>
+          <p:cNvPr id="2" name="Title 1"/>
+          <p:cNvSpPr>
+            <a:spLocks noGrp="1"/>
+          </p:cNvSpPr>
+          <p:nvPr>
+            <p:ph type="title"/>
+          </p:nvPr>
+        </p:nvSpPr>
+        <p:spPr/>
+        <p:txBody>
+          <a:bodyPr/>
+          <a:lstStyle/>
+          <a:p>
+            <a:r>
+              <a:rPr lang="en-US" dirty="0" smtClean="0"/>
+              <a:t>Exercise 1: new rules II</a:t>
+            </a:r>
+            <a:endParaRPr lang="en-US" dirty="0"/>
+          </a:p>
+        </p:txBody>
+      </p:sp>
+      <p:sp>
+        <p:nvSpPr>
+          <p:cNvPr id="3" name="Content Placeholder 2"/>
+          <p:cNvSpPr>
+            <a:spLocks noGrp="1"/>
+          </p:cNvSpPr>
+          <p:nvPr>
+            <p:ph idx="1"/>
+          </p:nvPr>
+        </p:nvSpPr>
+        <p:spPr/>
+        <p:txBody>
+          <a:bodyPr>
+            <a:normAutofit/>
+          </a:bodyPr>
+          <a:lstStyle/>
+          <a:p>
+            <a:pPr marL="457200" indent="-457200">
+              <a:buFont typeface="+mj-lt"/>
+              <a:buAutoNum type="arabicPeriod" startAt="4"/>
+            </a:pPr>
+            <a:r>
+              <a:rPr lang="en-US" dirty="0" smtClean="0"/>
+              <a:t>Need to be able to cancel a sale</a:t>
+            </a:r>
+          </a:p>
+          <a:p>
+            <a:pPr marL="800100" lvl="1" indent="-342900">
+              <a:buFont typeface="+mj-lt"/>
+              <a:buAutoNum type="alphaLcPeriod"/>
+            </a:pPr>
+            <a:r>
+              <a:rPr lang="en-US" dirty="0" smtClean="0"/>
+              <a:t>If payments on sale, must give change for total payment amounts before cancelling</a:t>
+            </a:r>
+          </a:p>
+          <a:p>
+            <a:pPr lvl="2">
+              <a:buFont typeface="Wingdings" panose="05000000000000000000" pitchFamily="2" charset="2"/>
+              <a:buChar char="Ø"/>
+            </a:pPr>
+            <a:r>
+              <a:rPr lang="en-US" dirty="0" smtClean="0"/>
+              <a:t>This negates rule 2: “</a:t>
+            </a:r>
+            <a:r>
+              <a:rPr lang="en-US" dirty="0"/>
+              <a:t>Can only give change when balance &gt; </a:t>
+            </a:r>
+            <a:r>
+              <a:rPr lang="en-US" dirty="0" smtClean="0"/>
+              <a:t>0”</a:t>
+            </a:r>
+          </a:p>
+          <a:p>
+            <a:pPr marL="800100" lvl="1" indent="-342900">
+              <a:buFont typeface="+mj-lt"/>
+              <a:buAutoNum type="alphaLcPeriod"/>
+            </a:pPr>
+            <a:r>
+              <a:rPr lang="en-US" dirty="0" smtClean="0"/>
+              <a:t>No </a:t>
+            </a:r>
+            <a:r>
+              <a:rPr lang="en-US" dirty="0"/>
+              <a:t>changes to cancelled </a:t>
+            </a:r>
+            <a:r>
+              <a:rPr lang="en-US" dirty="0" smtClean="0"/>
+              <a:t>sales</a:t>
+            </a:r>
+          </a:p>
+          <a:p>
+            <a:pPr lvl="2">
+              <a:buFont typeface="Wingdings" panose="05000000000000000000" pitchFamily="2" charset="2"/>
+              <a:buChar char="Ø"/>
+            </a:pPr>
+            <a:r>
+              <a:rPr lang="en-US" dirty="0" smtClean="0"/>
+              <a:t>Can’t modify items, add payments, give change, or cancel</a:t>
+            </a:r>
+          </a:p>
+          <a:p>
+            <a:pPr marL="342900" indent="-342900">
+              <a:buFont typeface="+mj-lt"/>
+              <a:buAutoNum type="arabicPeriod" startAt="4"/>
+            </a:pPr>
+            <a:r>
+              <a:rPr lang="en-US" dirty="0" smtClean="0"/>
+              <a:t>Can’t create a new sale until current sale is paid or cancelled</a:t>
+            </a:r>
+          </a:p>
+        </p:txBody>
+      </p:sp>
+    </p:spTree>
+    <p:extLst>
+      <p:ext uri="{BB962C8B-B14F-4D97-AF65-F5344CB8AC3E}">
+        <p14:creationId xmlns:p14="http://schemas.microsoft.com/office/powerpoint/2010/main" val="2363280830"/>
+      </p:ext>
+    </p:extLst>
+  </p:cSld>
+  <p:clrMapOvr>
+    <a:masterClrMapping/>
+  </p:clrMapOvr>
+</p:sld>
+</file>
+
+<file path=ppt/slides/slide8.xml><?xml version="1.0" encoding="utf-8"?>
+<p:sld xmlns:a="http://schemas.openxmlformats.org/drawingml/2006/main" xmlns:r="http://schemas.openxmlformats.org/officeDocument/2006/relationships" xmlns:p="http://schemas.openxmlformats.org/presentationml/2006/main">
+  <p:cSld>
+    <p:spTree>
+      <p:nvGrpSpPr>
+        <p:cNvPr id="1" name=""/>
+        <p:cNvGrpSpPr/>
+        <p:nvPr/>
+      </p:nvGrpSpPr>
+      <p:grpSpPr>
+        <a:xfrm>
+          <a:off x="0" y="0"/>
+          <a:ext cx="0" cy="0"/>
+          <a:chOff x="0" y="0"/>
+          <a:chExt cx="0" cy="0"/>
+        </a:xfrm>
+      </p:grpSpPr>
+      <p:sp>
+        <p:nvSpPr>
+          <p:cNvPr id="2" name="Title 1"/>
+          <p:cNvSpPr>
+            <a:spLocks noGrp="1"/>
+          </p:cNvSpPr>
+          <p:nvPr>
+            <p:ph type="title"/>
+          </p:nvPr>
+        </p:nvSpPr>
+        <p:spPr/>
+        <p:txBody>
+          <a:bodyPr/>
+          <a:lstStyle/>
+          <a:p>
+            <a:r>
+              <a:rPr lang="en-US" dirty="0" smtClean="0"/>
+              <a:t>Exercise 1: Retrospective</a:t>
+            </a:r>
+            <a:endParaRPr lang="en-US" dirty="0"/>
+          </a:p>
+        </p:txBody>
+      </p:sp>
+      <p:sp>
+        <p:nvSpPr>
+          <p:cNvPr id="3" name="Content Placeholder 2"/>
+          <p:cNvSpPr>
+            <a:spLocks noGrp="1"/>
+          </p:cNvSpPr>
+          <p:nvPr>
+            <p:ph idx="1"/>
+          </p:nvPr>
+        </p:nvSpPr>
+        <p:spPr/>
+        <p:txBody>
+          <a:bodyPr>
+            <a:normAutofit lnSpcReduction="10000"/>
+          </a:bodyPr>
+          <a:lstStyle/>
+          <a:p>
+            <a:r>
+              <a:rPr lang="en-US" dirty="0"/>
+              <a:t>Need to </a:t>
+            </a:r>
+            <a:r>
+              <a:rPr lang="en-US" dirty="0" smtClean="0"/>
+              <a:t>recognize when state machine is needed</a:t>
+            </a:r>
+          </a:p>
+          <a:p>
+            <a:pPr lvl="1"/>
+            <a:r>
+              <a:rPr lang="en-US" dirty="0" smtClean="0"/>
+              <a:t>i.e. managing behavior/actions based on current state</a:t>
+            </a:r>
+          </a:p>
+          <a:p>
+            <a:pPr lvl="1"/>
+            <a:r>
+              <a:rPr lang="en-US" dirty="0" smtClean="0"/>
+              <a:t>Usually not presented as state management by product owners</a:t>
+            </a:r>
+          </a:p>
+          <a:p>
+            <a:pPr lvl="1"/>
+            <a:r>
+              <a:rPr lang="en-US" dirty="0" smtClean="0"/>
+              <a:t>Initially simple rules frequently grow complex over time</a:t>
+            </a:r>
+          </a:p>
+          <a:p>
+            <a:r>
+              <a:rPr lang="en-US" dirty="0" smtClean="0"/>
+              <a:t>Naïve </a:t>
+            </a:r>
+            <a:r>
+              <a:rPr lang="en-US" dirty="0"/>
+              <a:t>state machine implementations can become </a:t>
+            </a:r>
+            <a:r>
+              <a:rPr lang="en-US" dirty="0" smtClean="0"/>
+              <a:t>complex</a:t>
+            </a:r>
+          </a:p>
+          <a:p>
+            <a:pPr lvl="1"/>
+            <a:r>
+              <a:rPr lang="en-US" dirty="0" smtClean="0"/>
+              <a:t>Multiple Boolean flags, IF (&lt;</a:t>
+            </a:r>
+            <a:r>
+              <a:rPr lang="en-US" dirty="0" err="1" smtClean="0"/>
+              <a:t>currentState</a:t>
+            </a:r>
+            <a:r>
+              <a:rPr lang="en-US" dirty="0" smtClean="0"/>
+              <a:t>&gt;) {…}, switch statements, etc.</a:t>
+            </a:r>
+          </a:p>
+          <a:p>
+            <a:pPr lvl="1"/>
+            <a:r>
+              <a:rPr lang="en-US" dirty="0" smtClean="0"/>
+              <a:t>Frequently violate Single Responsibility and Open/Closed principles</a:t>
+            </a:r>
+          </a:p>
+          <a:p>
+            <a:r>
+              <a:rPr lang="en-US" dirty="0" smtClean="0"/>
+              <a:t>Exercise1_Final\PointOfSaleStateManagement.sln is my version of this exercise</a:t>
+            </a:r>
+            <a:endParaRPr lang="en-US" dirty="0"/>
+          </a:p>
+        </p:txBody>
+      </p:sp>
+    </p:spTree>
+    <p:extLst>
+      <p:ext uri="{BB962C8B-B14F-4D97-AF65-F5344CB8AC3E}">
+        <p14:creationId xmlns:p14="http://schemas.microsoft.com/office/powerpoint/2010/main" val="2941040360"/>
+      </p:ext>
+    </p:extLst>
+  </p:cSld>
+  <p:clrMapOvr>
+    <a:masterClrMapping/>
+  </p:clrMapOvr>
+</p:sld>
+</file>
+
+<file path=ppt/slides/slide9.xml><?xml version="1.0" encoding="utf-8"?>
+<p:sld xmlns:a="http://schemas.openxmlformats.org/drawingml/2006/main" xmlns:r="http://schemas.openxmlformats.org/officeDocument/2006/relationships" xmlns:p="http://schemas.openxmlformats.org/presentationml/2006/main">
+  <p:cSld>
+    <p:spTree>
+      <p:nvGrpSpPr>
+        <p:cNvPr id="1" name=""/>
+        <p:cNvGrpSpPr/>
+        <p:nvPr/>
+      </p:nvGrpSpPr>
+      <p:grpSpPr>
+        <a:xfrm>
+          <a:off x="0" y="0"/>
+          <a:ext cx="0" cy="0"/>
+          <a:chOff x="0" y="0"/>
+          <a:chExt cx="0" cy="0"/>
+        </a:xfrm>
+      </p:grpSpPr>
+      <p:sp>
+        <p:nvSpPr>
+          <p:cNvPr id="2" name="Title 1"/>
+          <p:cNvSpPr>
+            <a:spLocks noGrp="1"/>
+          </p:cNvSpPr>
+          <p:nvPr>
+            <p:ph type="title"/>
+          </p:nvPr>
+        </p:nvSpPr>
+        <p:spPr/>
+        <p:txBody>
+          <a:bodyPr/>
+          <a:lstStyle/>
+          <a:p>
+            <a:r>
+              <a:rPr lang="en-US" dirty="0" smtClean="0"/>
+              <a:t>Lesson 1: recognize state based behavior</a:t>
+            </a:r>
+            <a:endParaRPr lang="en-US" dirty="0"/>
+          </a:p>
+        </p:txBody>
+      </p:sp>
+      <p:sp>
+        <p:nvSpPr>
+          <p:cNvPr id="3" name="Content Placeholder 2"/>
+          <p:cNvSpPr>
+            <a:spLocks noGrp="1"/>
+          </p:cNvSpPr>
+          <p:nvPr>
+            <p:ph idx="1"/>
+          </p:nvPr>
+        </p:nvSpPr>
+        <p:spPr/>
+        <p:txBody>
+          <a:bodyPr>
+            <a:normAutofit fontScale="40000" lnSpcReduction="20000"/>
+          </a:bodyPr>
+          <a:lstStyle/>
+          <a:p>
+            <a:r>
+              <a:rPr lang="en-US" dirty="0" smtClean="0"/>
+              <a:t>Very frequent pattern</a:t>
+            </a:r>
+          </a:p>
+          <a:p>
+            <a:r>
+              <a:rPr lang="en-US" dirty="0" smtClean="0"/>
+              <a:t>Requirement/story language</a:t>
+            </a:r>
+          </a:p>
+          <a:p>
+            <a:pPr lvl="1"/>
+            <a:r>
+              <a:rPr lang="en-US" dirty="0" smtClean="0"/>
+              <a:t>“Only accept </a:t>
+            </a:r>
+            <a:r>
+              <a:rPr lang="en-US" dirty="0"/>
+              <a:t>payment if balance &lt; </a:t>
+            </a:r>
+            <a:r>
+              <a:rPr lang="en-US" dirty="0" smtClean="0"/>
+              <a:t>0”</a:t>
+            </a:r>
+          </a:p>
+          <a:p>
+            <a:pPr lvl="1"/>
+            <a:r>
+              <a:rPr lang="en-US" dirty="0" smtClean="0"/>
+              <a:t>“</a:t>
+            </a:r>
+            <a:r>
+              <a:rPr lang="en-US" dirty="0"/>
+              <a:t>only give change when balance &gt; </a:t>
+            </a:r>
+            <a:r>
+              <a:rPr lang="en-US" dirty="0" smtClean="0"/>
+              <a:t>0”</a:t>
+            </a:r>
+          </a:p>
+          <a:p>
+            <a:pPr lvl="1"/>
+            <a:r>
+              <a:rPr lang="en-US" dirty="0" smtClean="0"/>
+              <a:t>“</a:t>
+            </a:r>
+            <a:r>
+              <a:rPr lang="en-US" dirty="0"/>
+              <a:t>No changes to </a:t>
+            </a:r>
+            <a:r>
+              <a:rPr lang="en-US" dirty="0" smtClean="0"/>
+              <a:t>paid sales”</a:t>
+            </a:r>
+          </a:p>
+          <a:p>
+            <a:pPr lvl="1"/>
+            <a:r>
+              <a:rPr lang="en-US" dirty="0" smtClean="0"/>
+              <a:t>“</a:t>
+            </a:r>
+            <a:r>
+              <a:rPr lang="en-US" dirty="0"/>
+              <a:t>No changes to cancelled </a:t>
+            </a:r>
+            <a:r>
+              <a:rPr lang="en-US" dirty="0" smtClean="0"/>
+              <a:t>sale”</a:t>
+            </a:r>
+          </a:p>
+          <a:p>
+            <a:r>
+              <a:rPr lang="en-US" dirty="0" smtClean="0"/>
+              <a:t>Code</a:t>
+            </a:r>
+          </a:p>
+          <a:p>
+            <a:pPr lvl="1"/>
+            <a:r>
+              <a:rPr lang="en-US" dirty="0" smtClean="0"/>
+              <a:t>Mutually exclusive Boolean flags</a:t>
+            </a:r>
+          </a:p>
+          <a:p>
+            <a:pPr lvl="2"/>
+            <a:r>
+              <a:rPr lang="en-US" dirty="0" err="1" smtClean="0"/>
+              <a:t>isOpen</a:t>
+            </a:r>
+            <a:endParaRPr lang="en-US" dirty="0" smtClean="0"/>
+          </a:p>
+          <a:p>
+            <a:pPr lvl="2"/>
+            <a:r>
+              <a:rPr lang="en-US" dirty="0" err="1" smtClean="0"/>
+              <a:t>isOverpaid</a:t>
+            </a:r>
+            <a:endParaRPr lang="en-US" dirty="0" smtClean="0"/>
+          </a:p>
+          <a:p>
+            <a:pPr lvl="2"/>
+            <a:r>
+              <a:rPr lang="en-US" dirty="0" err="1" smtClean="0"/>
+              <a:t>IsPaid</a:t>
+            </a:r>
+            <a:endParaRPr lang="en-US" dirty="0" smtClean="0"/>
+          </a:p>
+          <a:p>
+            <a:pPr lvl="2"/>
+            <a:r>
+              <a:rPr lang="en-US" dirty="0" err="1" smtClean="0"/>
+              <a:t>isCancelled</a:t>
+            </a:r>
+            <a:endParaRPr lang="en-US" dirty="0" smtClean="0"/>
+          </a:p>
+          <a:p>
+            <a:pPr lvl="1"/>
+            <a:r>
+              <a:rPr lang="en-US" dirty="0" smtClean="0"/>
+              <a:t>Repeated checks for state before actions</a:t>
+            </a:r>
+          </a:p>
+          <a:p>
+            <a:pPr lvl="2"/>
+            <a:r>
+              <a:rPr lang="en-US" dirty="0" smtClean="0"/>
+              <a:t>If (&lt;</a:t>
+            </a:r>
+            <a:r>
+              <a:rPr lang="en-US" dirty="0" err="1" smtClean="0"/>
+              <a:t>objectState</a:t>
+            </a:r>
+            <a:r>
+              <a:rPr lang="en-US" dirty="0" smtClean="0"/>
+              <a:t>&gt;) {…}</a:t>
+            </a:r>
+          </a:p>
+          <a:p>
+            <a:pPr lvl="2"/>
+            <a:r>
+              <a:rPr lang="en-US" dirty="0" smtClean="0"/>
+              <a:t>Switch (&lt;</a:t>
+            </a:r>
+            <a:r>
+              <a:rPr lang="en-US" dirty="0" err="1" smtClean="0"/>
+              <a:t>objectState</a:t>
+            </a:r>
+            <a:r>
+              <a:rPr lang="en-US" dirty="0" smtClean="0"/>
+              <a:t>&gt;) {...&lt;</a:t>
+            </a:r>
+            <a:r>
+              <a:rPr lang="en-US" dirty="0" err="1" smtClean="0"/>
+              <a:t>doSomething</a:t>
+            </a:r>
+            <a:r>
+              <a:rPr lang="en-US" dirty="0" smtClean="0"/>
+              <a:t>&gt;…}</a:t>
+            </a:r>
+          </a:p>
+          <a:p>
+            <a:r>
+              <a:rPr lang="en-US" dirty="0" smtClean="0"/>
+              <a:t>Once you realize you need a state machine, next step is to create a state diagram</a:t>
+            </a:r>
+          </a:p>
+        </p:txBody>
+      </p:sp>
+    </p:spTree>
+    <p:extLst>
+      <p:ext uri="{BB962C8B-B14F-4D97-AF65-F5344CB8AC3E}">
+        <p14:creationId xmlns:p14="http://schemas.microsoft.com/office/powerpoint/2010/main" val="2544707152"/>
       </p:ext>
     </p:extLst>
   </p:cSld>

</xml_diff>

<commit_message>
Removed state flags. Updated unit tests.
</commit_message>
<xml_diff>
--- a/DotNetStateMachines.pptx
+++ b/DotNetStateMachines.pptx
@@ -9,26 +9,27 @@
     <p:sldId id="261" r:id="rId3"/>
     <p:sldId id="257" r:id="rId4"/>
     <p:sldId id="262" r:id="rId5"/>
-    <p:sldId id="263" r:id="rId6"/>
-    <p:sldId id="265" r:id="rId7"/>
-    <p:sldId id="264" r:id="rId8"/>
-    <p:sldId id="266" r:id="rId9"/>
-    <p:sldId id="268" r:id="rId10"/>
-    <p:sldId id="267" r:id="rId11"/>
-    <p:sldId id="279" r:id="rId12"/>
-    <p:sldId id="270" r:id="rId13"/>
-    <p:sldId id="271" r:id="rId14"/>
-    <p:sldId id="272" r:id="rId15"/>
-    <p:sldId id="273" r:id="rId16"/>
-    <p:sldId id="275" r:id="rId17"/>
-    <p:sldId id="276" r:id="rId18"/>
-    <p:sldId id="274" r:id="rId19"/>
-    <p:sldId id="278" r:id="rId20"/>
-    <p:sldId id="277" r:id="rId21"/>
-    <p:sldId id="281" r:id="rId22"/>
-    <p:sldId id="282" r:id="rId23"/>
-    <p:sldId id="283" r:id="rId24"/>
-    <p:sldId id="280" r:id="rId25"/>
+    <p:sldId id="284" r:id="rId6"/>
+    <p:sldId id="263" r:id="rId7"/>
+    <p:sldId id="265" r:id="rId8"/>
+    <p:sldId id="264" r:id="rId9"/>
+    <p:sldId id="266" r:id="rId10"/>
+    <p:sldId id="268" r:id="rId11"/>
+    <p:sldId id="267" r:id="rId12"/>
+    <p:sldId id="279" r:id="rId13"/>
+    <p:sldId id="270" r:id="rId14"/>
+    <p:sldId id="271" r:id="rId15"/>
+    <p:sldId id="272" r:id="rId16"/>
+    <p:sldId id="273" r:id="rId17"/>
+    <p:sldId id="275" r:id="rId18"/>
+    <p:sldId id="276" r:id="rId19"/>
+    <p:sldId id="274" r:id="rId20"/>
+    <p:sldId id="278" r:id="rId21"/>
+    <p:sldId id="277" r:id="rId22"/>
+    <p:sldId id="281" r:id="rId23"/>
+    <p:sldId id="282" r:id="rId24"/>
+    <p:sldId id="283" r:id="rId25"/>
+    <p:sldId id="280" r:id="rId26"/>
   </p:sldIdLst>
   <p:sldSz cx="12192000" cy="6858000"/>
   <p:notesSz cx="6858000" cy="9144000"/>
@@ -349,7 +350,7 @@
             <a:fld id="{B61BEF0D-F0BB-DE4B-95CE-6DB70DBA9567}" type="datetimeFigureOut">
               <a:rPr lang="en-US" dirty="0"/>
               <a:pPr/>
-              <a:t>8/25/2020</a:t>
+              <a:t>8/28/2020</a:t>
             </a:fld>
             <a:endParaRPr lang="en-US" dirty="0"/>
           </a:p>
@@ -637,7 +638,7 @@
             <a:fld id="{B61BEF0D-F0BB-DE4B-95CE-6DB70DBA9567}" type="datetimeFigureOut">
               <a:rPr lang="en-US" dirty="0"/>
               <a:pPr/>
-              <a:t>8/25/2020</a:t>
+              <a:t>8/28/2020</a:t>
             </a:fld>
             <a:endParaRPr lang="en-US" dirty="0"/>
           </a:p>
@@ -893,7 +894,7 @@
             <a:fld id="{B61BEF0D-F0BB-DE4B-95CE-6DB70DBA9567}" type="datetimeFigureOut">
               <a:rPr lang="en-US" dirty="0"/>
               <a:pPr/>
-              <a:t>8/25/2020</a:t>
+              <a:t>8/28/2020</a:t>
             </a:fld>
             <a:endParaRPr lang="en-US" dirty="0"/>
           </a:p>
@@ -1359,7 +1360,7 @@
             <a:fld id="{B61BEF0D-F0BB-DE4B-95CE-6DB70DBA9567}" type="datetimeFigureOut">
               <a:rPr lang="en-US" dirty="0"/>
               <a:pPr/>
-              <a:t>8/25/2020</a:t>
+              <a:t>8/28/2020</a:t>
             </a:fld>
             <a:endParaRPr lang="en-US" dirty="0"/>
           </a:p>
@@ -1536,7 +1537,7 @@
             <a:fld id="{B61BEF0D-F0BB-DE4B-95CE-6DB70DBA9567}" type="datetimeFigureOut">
               <a:rPr lang="en-US" dirty="0"/>
               <a:pPr/>
-              <a:t>8/25/2020</a:t>
+              <a:t>8/28/2020</a:t>
             </a:fld>
             <a:endParaRPr lang="en-US" dirty="0"/>
           </a:p>
@@ -2109,7 +2110,7 @@
             <a:fld id="{B61BEF0D-F0BB-DE4B-95CE-6DB70DBA9567}" type="datetimeFigureOut">
               <a:rPr lang="en-US" dirty="0"/>
               <a:pPr/>
-              <a:t>8/25/2020</a:t>
+              <a:t>8/28/2020</a:t>
             </a:fld>
             <a:endParaRPr lang="en-US" dirty="0"/>
           </a:p>
@@ -2438,7 +2439,7 @@
             <a:fld id="{B61BEF0D-F0BB-DE4B-95CE-6DB70DBA9567}" type="datetimeFigureOut">
               <a:rPr lang="en-US" dirty="0"/>
               <a:pPr/>
-              <a:t>8/25/2020</a:t>
+              <a:t>8/28/2020</a:t>
             </a:fld>
             <a:endParaRPr lang="en-US" dirty="0"/>
           </a:p>
@@ -2610,7 +2611,7 @@
             <a:fld id="{B61BEF0D-F0BB-DE4B-95CE-6DB70DBA9567}" type="datetimeFigureOut">
               <a:rPr lang="en-US" dirty="0"/>
               <a:pPr/>
-              <a:t>8/25/2020</a:t>
+              <a:t>8/28/2020</a:t>
             </a:fld>
             <a:endParaRPr lang="en-US" dirty="0"/>
           </a:p>
@@ -2787,7 +2788,7 @@
             <a:fld id="{B61BEF0D-F0BB-DE4B-95CE-6DB70DBA9567}" type="datetimeFigureOut">
               <a:rPr lang="en-US" dirty="0"/>
               <a:pPr/>
-              <a:t>8/25/2020</a:t>
+              <a:t>8/28/2020</a:t>
             </a:fld>
             <a:endParaRPr lang="en-US" dirty="0"/>
           </a:p>
@@ -2954,7 +2955,7 @@
             <a:fld id="{B61BEF0D-F0BB-DE4B-95CE-6DB70DBA9567}" type="datetimeFigureOut">
               <a:rPr lang="en-US" dirty="0"/>
               <a:pPr/>
-              <a:t>8/25/2020</a:t>
+              <a:t>8/28/2020</a:t>
             </a:fld>
             <a:endParaRPr lang="en-US" dirty="0"/>
           </a:p>
@@ -3208,7 +3209,7 @@
             <a:fld id="{B61BEF0D-F0BB-DE4B-95CE-6DB70DBA9567}" type="datetimeFigureOut">
               <a:rPr lang="en-US" dirty="0"/>
               <a:pPr/>
-              <a:t>8/25/2020</a:t>
+              <a:t>8/28/2020</a:t>
             </a:fld>
             <a:endParaRPr lang="en-US" dirty="0"/>
           </a:p>
@@ -3497,7 +3498,7 @@
             <a:fld id="{B61BEF0D-F0BB-DE4B-95CE-6DB70DBA9567}" type="datetimeFigureOut">
               <a:rPr lang="en-US" dirty="0"/>
               <a:pPr/>
-              <a:t>8/25/2020</a:t>
+              <a:t>8/28/2020</a:t>
             </a:fld>
             <a:endParaRPr lang="en-US" dirty="0"/>
           </a:p>
@@ -3924,7 +3925,7 @@
             <a:fld id="{B61BEF0D-F0BB-DE4B-95CE-6DB70DBA9567}" type="datetimeFigureOut">
               <a:rPr lang="en-US" dirty="0"/>
               <a:pPr/>
-              <a:t>8/25/2020</a:t>
+              <a:t>8/28/2020</a:t>
             </a:fld>
             <a:endParaRPr lang="en-US" dirty="0"/>
           </a:p>
@@ -4039,7 +4040,7 @@
             <a:fld id="{B61BEF0D-F0BB-DE4B-95CE-6DB70DBA9567}" type="datetimeFigureOut">
               <a:rPr lang="en-US" dirty="0"/>
               <a:pPr/>
-              <a:t>8/25/2020</a:t>
+              <a:t>8/28/2020</a:t>
             </a:fld>
             <a:endParaRPr lang="en-US" dirty="0"/>
           </a:p>
@@ -4131,7 +4132,7 @@
             <a:fld id="{B61BEF0D-F0BB-DE4B-95CE-6DB70DBA9567}" type="datetimeFigureOut">
               <a:rPr lang="en-US" dirty="0"/>
               <a:pPr/>
-              <a:t>8/25/2020</a:t>
+              <a:t>8/28/2020</a:t>
             </a:fld>
             <a:endParaRPr lang="en-US" dirty="0"/>
           </a:p>
@@ -4411,7 +4412,7 @@
             <a:fld id="{B61BEF0D-F0BB-DE4B-95CE-6DB70DBA9567}" type="datetimeFigureOut">
               <a:rPr lang="en-US" dirty="0"/>
               <a:pPr/>
-              <a:t>8/25/2020</a:t>
+              <a:t>8/28/2020</a:t>
             </a:fld>
             <a:endParaRPr lang="en-US" dirty="0"/>
           </a:p>
@@ -4699,7 +4700,7 @@
             <a:fld id="{B61BEF0D-F0BB-DE4B-95CE-6DB70DBA9567}" type="datetimeFigureOut">
               <a:rPr lang="en-US" dirty="0"/>
               <a:pPr/>
-              <a:t>8/25/2020</a:t>
+              <a:t>8/28/2020</a:t>
             </a:fld>
             <a:endParaRPr lang="en-US" dirty="0"/>
           </a:p>
@@ -4927,7 +4928,7 @@
             <a:fld id="{B61BEF0D-F0BB-DE4B-95CE-6DB70DBA9567}" type="datetimeFigureOut">
               <a:rPr lang="en-US" dirty="0"/>
               <a:pPr/>
-              <a:t>8/25/2020</a:t>
+              <a:t>8/28/2020</a:t>
             </a:fld>
             <a:endParaRPr lang="en-US" dirty="0"/>
           </a:p>
@@ -5785,6 +5786,245 @@
           <a:p>
             <a:r>
               <a:rPr lang="en-US" dirty="0" smtClean="0"/>
+              <a:t>Lesson 1: recognize state based behavior</a:t>
+            </a:r>
+            <a:endParaRPr lang="en-US" dirty="0"/>
+          </a:p>
+        </p:txBody>
+      </p:sp>
+      <p:sp>
+        <p:nvSpPr>
+          <p:cNvPr id="3" name="Content Placeholder 2"/>
+          <p:cNvSpPr>
+            <a:spLocks noGrp="1"/>
+          </p:cNvSpPr>
+          <p:nvPr>
+            <p:ph idx="1"/>
+          </p:nvPr>
+        </p:nvSpPr>
+        <p:spPr/>
+        <p:txBody>
+          <a:bodyPr>
+            <a:normAutofit fontScale="40000" lnSpcReduction="20000"/>
+          </a:bodyPr>
+          <a:lstStyle/>
+          <a:p>
+            <a:r>
+              <a:rPr lang="en-US" dirty="0" smtClean="0"/>
+              <a:t>Very frequent pattern</a:t>
+            </a:r>
+          </a:p>
+          <a:p>
+            <a:r>
+              <a:rPr lang="en-US" dirty="0" smtClean="0"/>
+              <a:t>Requirement/story language</a:t>
+            </a:r>
+          </a:p>
+          <a:p>
+            <a:pPr lvl="1"/>
+            <a:r>
+              <a:rPr lang="en-US" dirty="0" smtClean="0"/>
+              <a:t>“Only accept </a:t>
+            </a:r>
+            <a:r>
+              <a:rPr lang="en-US" dirty="0"/>
+              <a:t>payment if balance &lt; </a:t>
+            </a:r>
+            <a:r>
+              <a:rPr lang="en-US" dirty="0" smtClean="0"/>
+              <a:t>0”</a:t>
+            </a:r>
+          </a:p>
+          <a:p>
+            <a:pPr lvl="1"/>
+            <a:r>
+              <a:rPr lang="en-US" dirty="0" smtClean="0"/>
+              <a:t>“</a:t>
+            </a:r>
+            <a:r>
+              <a:rPr lang="en-US" dirty="0"/>
+              <a:t>only give change when balance &gt; </a:t>
+            </a:r>
+            <a:r>
+              <a:rPr lang="en-US" dirty="0" smtClean="0"/>
+              <a:t>0”</a:t>
+            </a:r>
+          </a:p>
+          <a:p>
+            <a:pPr lvl="1"/>
+            <a:r>
+              <a:rPr lang="en-US" dirty="0" smtClean="0"/>
+              <a:t>“</a:t>
+            </a:r>
+            <a:r>
+              <a:rPr lang="en-US" dirty="0"/>
+              <a:t>No changes to </a:t>
+            </a:r>
+            <a:r>
+              <a:rPr lang="en-US" dirty="0" smtClean="0"/>
+              <a:t>paid sales”</a:t>
+            </a:r>
+          </a:p>
+          <a:p>
+            <a:pPr lvl="1"/>
+            <a:r>
+              <a:rPr lang="en-US" dirty="0" smtClean="0"/>
+              <a:t>“</a:t>
+            </a:r>
+            <a:r>
+              <a:rPr lang="en-US" dirty="0"/>
+              <a:t>No changes to cancelled </a:t>
+            </a:r>
+            <a:r>
+              <a:rPr lang="en-US" dirty="0" smtClean="0"/>
+              <a:t>sale”</a:t>
+            </a:r>
+          </a:p>
+          <a:p>
+            <a:r>
+              <a:rPr lang="en-US" dirty="0" smtClean="0"/>
+              <a:t>Code</a:t>
+            </a:r>
+          </a:p>
+          <a:p>
+            <a:pPr lvl="1"/>
+            <a:r>
+              <a:rPr lang="en-US" dirty="0" smtClean="0"/>
+              <a:t>Mutually exclusive Boolean flags</a:t>
+            </a:r>
+          </a:p>
+          <a:p>
+            <a:pPr lvl="2"/>
+            <a:r>
+              <a:rPr lang="en-US" dirty="0" err="1" smtClean="0"/>
+              <a:t>isOpen</a:t>
+            </a:r>
+            <a:endParaRPr lang="en-US" dirty="0" smtClean="0"/>
+          </a:p>
+          <a:p>
+            <a:pPr lvl="2"/>
+            <a:r>
+              <a:rPr lang="en-US" dirty="0" err="1" smtClean="0"/>
+              <a:t>isOverpaid</a:t>
+            </a:r>
+            <a:endParaRPr lang="en-US" dirty="0" smtClean="0"/>
+          </a:p>
+          <a:p>
+            <a:pPr lvl="2"/>
+            <a:r>
+              <a:rPr lang="en-US" dirty="0" err="1" smtClean="0"/>
+              <a:t>IsPaid</a:t>
+            </a:r>
+            <a:endParaRPr lang="en-US" dirty="0" smtClean="0"/>
+          </a:p>
+          <a:p>
+            <a:pPr lvl="2"/>
+            <a:r>
+              <a:rPr lang="en-US" dirty="0" err="1" smtClean="0"/>
+              <a:t>isCancelled</a:t>
+            </a:r>
+            <a:endParaRPr lang="en-US" dirty="0" smtClean="0"/>
+          </a:p>
+          <a:p>
+            <a:pPr lvl="1"/>
+            <a:r>
+              <a:rPr lang="en-US" dirty="0" smtClean="0"/>
+              <a:t>Repeated checks for state before actions</a:t>
+            </a:r>
+          </a:p>
+          <a:p>
+            <a:pPr lvl="2"/>
+            <a:r>
+              <a:rPr lang="en-US" dirty="0" smtClean="0"/>
+              <a:t>If (&lt;</a:t>
+            </a:r>
+            <a:r>
+              <a:rPr lang="en-US" dirty="0" err="1" smtClean="0"/>
+              <a:t>objectState</a:t>
+            </a:r>
+            <a:r>
+              <a:rPr lang="en-US" dirty="0" smtClean="0"/>
+              <a:t>&gt;) {…}</a:t>
+            </a:r>
+          </a:p>
+          <a:p>
+            <a:pPr lvl="2"/>
+            <a:r>
+              <a:rPr lang="en-US" dirty="0" smtClean="0"/>
+              <a:t>Switch (&lt;</a:t>
+            </a:r>
+            <a:r>
+              <a:rPr lang="en-US" dirty="0" err="1" smtClean="0"/>
+              <a:t>objectState</a:t>
+            </a:r>
+            <a:r>
+              <a:rPr lang="en-US" dirty="0" smtClean="0"/>
+              <a:t>&gt;) {...&lt;</a:t>
+            </a:r>
+            <a:r>
+              <a:rPr lang="en-US" dirty="0" err="1" smtClean="0"/>
+              <a:t>doSomething</a:t>
+            </a:r>
+            <a:r>
+              <a:rPr lang="en-US" dirty="0" smtClean="0"/>
+              <a:t>&gt;…}</a:t>
+            </a:r>
+          </a:p>
+          <a:p>
+            <a:r>
+              <a:rPr lang="en-US" dirty="0" smtClean="0"/>
+              <a:t>Once you realize you need a state machine, next step is to create a state diagram</a:t>
+            </a:r>
+          </a:p>
+        </p:txBody>
+      </p:sp>
+    </p:spTree>
+    <p:extLst>
+      <p:ext uri="{BB962C8B-B14F-4D97-AF65-F5344CB8AC3E}">
+        <p14:creationId xmlns:p14="http://schemas.microsoft.com/office/powerpoint/2010/main" val="2544707152"/>
+      </p:ext>
+    </p:extLst>
+  </p:cSld>
+  <p:clrMapOvr>
+    <a:masterClrMapping/>
+  </p:clrMapOvr>
+</p:sld>
+</file>
+
+<file path=ppt/slides/slide11.xml><?xml version="1.0" encoding="utf-8"?>
+<p:sld xmlns:a="http://schemas.openxmlformats.org/drawingml/2006/main" xmlns:r="http://schemas.openxmlformats.org/officeDocument/2006/relationships" xmlns:p="http://schemas.openxmlformats.org/presentationml/2006/main">
+  <p:cSld>
+    <p:spTree>
+      <p:nvGrpSpPr>
+        <p:cNvPr id="1" name=""/>
+        <p:cNvGrpSpPr/>
+        <p:nvPr/>
+      </p:nvGrpSpPr>
+      <p:grpSpPr>
+        <a:xfrm>
+          <a:off x="0" y="0"/>
+          <a:ext cx="0" cy="0"/>
+          <a:chOff x="0" y="0"/>
+          <a:chExt cx="0" cy="0"/>
+        </a:xfrm>
+      </p:grpSpPr>
+      <p:sp>
+        <p:nvSpPr>
+          <p:cNvPr id="2" name="Title 1"/>
+          <p:cNvSpPr>
+            <a:spLocks noGrp="1"/>
+          </p:cNvSpPr>
+          <p:nvPr>
+            <p:ph type="title"/>
+          </p:nvPr>
+        </p:nvSpPr>
+        <p:spPr/>
+        <p:txBody>
+          <a:bodyPr/>
+          <a:lstStyle/>
+          <a:p>
+            <a:r>
+              <a:rPr lang="en-US" dirty="0" smtClean="0"/>
               <a:t>FINITE SET OF sale STATES</a:t>
             </a:r>
             <a:endParaRPr lang="en-US" dirty="0"/>
@@ -5949,7 +6189,7 @@
 </p:sld>
 </file>
 
-<file path=ppt/slides/slide11.xml><?xml version="1.0" encoding="utf-8"?>
+<file path=ppt/slides/slide12.xml><?xml version="1.0" encoding="utf-8"?>
 <p:sld xmlns:a="http://schemas.openxmlformats.org/drawingml/2006/main" xmlns:r="http://schemas.openxmlformats.org/officeDocument/2006/relationships" xmlns:p="http://schemas.openxmlformats.org/presentationml/2006/main">
   <p:cSld>
     <p:spTree>
@@ -6028,7 +6268,7 @@
 </p:sld>
 </file>
 
-<file path=ppt/slides/slide12.xml><?xml version="1.0" encoding="utf-8"?>
+<file path=ppt/slides/slide13.xml><?xml version="1.0" encoding="utf-8"?>
 <p:sld xmlns:a="http://schemas.openxmlformats.org/drawingml/2006/main" xmlns:r="http://schemas.openxmlformats.org/officeDocument/2006/relationships" xmlns:p="http://schemas.openxmlformats.org/presentationml/2006/main">
   <p:cSld>
     <p:spTree>
@@ -6208,7 +6448,7 @@
 </p:sld>
 </file>
 
-<file path=ppt/slides/slide13.xml><?xml version="1.0" encoding="utf-8"?>
+<file path=ppt/slides/slide14.xml><?xml version="1.0" encoding="utf-8"?>
 <p:sld xmlns:a="http://schemas.openxmlformats.org/drawingml/2006/main" xmlns:r="http://schemas.openxmlformats.org/officeDocument/2006/relationships" xmlns:p="http://schemas.openxmlformats.org/presentationml/2006/main">
   <p:cSld>
     <p:spTree>
@@ -6287,137 +6527,6 @@
 </p:sld>
 </file>
 
-<file path=ppt/slides/slide14.xml><?xml version="1.0" encoding="utf-8"?>
-<p:sld xmlns:a="http://schemas.openxmlformats.org/drawingml/2006/main" xmlns:r="http://schemas.openxmlformats.org/officeDocument/2006/relationships" xmlns:p="http://schemas.openxmlformats.org/presentationml/2006/main">
-  <p:cSld>
-    <p:spTree>
-      <p:nvGrpSpPr>
-        <p:cNvPr id="1" name=""/>
-        <p:cNvGrpSpPr/>
-        <p:nvPr/>
-      </p:nvGrpSpPr>
-      <p:grpSpPr>
-        <a:xfrm>
-          <a:off x="0" y="0"/>
-          <a:ext cx="0" cy="0"/>
-          <a:chOff x="0" y="0"/>
-          <a:chExt cx="0" cy="0"/>
-        </a:xfrm>
-      </p:grpSpPr>
-      <p:sp>
-        <p:nvSpPr>
-          <p:cNvPr id="2" name="Title 1"/>
-          <p:cNvSpPr>
-            <a:spLocks noGrp="1"/>
-          </p:cNvSpPr>
-          <p:nvPr>
-            <p:ph type="title"/>
-          </p:nvPr>
-        </p:nvSpPr>
-        <p:spPr/>
-        <p:txBody>
-          <a:bodyPr/>
-          <a:lstStyle/>
-          <a:p>
-            <a:r>
-              <a:rPr lang="en-US" dirty="0" smtClean="0"/>
-              <a:t>Exercise 2: implement sale state design</a:t>
-            </a:r>
-            <a:endParaRPr lang="en-US" dirty="0"/>
-          </a:p>
-        </p:txBody>
-      </p:sp>
-      <p:sp>
-        <p:nvSpPr>
-          <p:cNvPr id="3" name="Content Placeholder 2"/>
-          <p:cNvSpPr>
-            <a:spLocks noGrp="1"/>
-          </p:cNvSpPr>
-          <p:nvPr>
-            <p:ph idx="1"/>
-          </p:nvPr>
-        </p:nvSpPr>
-        <p:spPr/>
-        <p:txBody>
-          <a:bodyPr>
-            <a:normAutofit/>
-          </a:bodyPr>
-          <a:lstStyle/>
-          <a:p>
-            <a:r>
-              <a:rPr lang="en-US" dirty="0"/>
-              <a:t>Start from </a:t>
-            </a:r>
-            <a:r>
-              <a:rPr lang="en-US" dirty="0" smtClean="0"/>
-              <a:t>Exercise2_Initial\PointOfSaleStateManagement.sln</a:t>
-            </a:r>
-            <a:endParaRPr lang="en-US" dirty="0"/>
-          </a:p>
-          <a:p>
-            <a:r>
-              <a:rPr lang="en-US" dirty="0" smtClean="0"/>
-              <a:t>The initial solution includes</a:t>
-            </a:r>
-          </a:p>
-          <a:p>
-            <a:pPr lvl="1"/>
-            <a:r>
-              <a:rPr lang="en-US" dirty="0" smtClean="0"/>
-              <a:t>Base class for the states (???!!!)</a:t>
-            </a:r>
-          </a:p>
-          <a:p>
-            <a:pPr lvl="1"/>
-            <a:r>
-              <a:rPr lang="en-US" dirty="0" smtClean="0"/>
-              <a:t>Stubbed out concrete states</a:t>
-            </a:r>
-          </a:p>
-          <a:p>
-            <a:pPr lvl="1"/>
-            <a:r>
-              <a:rPr lang="en-US" dirty="0" smtClean="0"/>
-              <a:t>Reference from sale to current state (initialized to Open)</a:t>
-            </a:r>
-          </a:p>
-          <a:p>
-            <a:pPr lvl="1"/>
-            <a:r>
-              <a:rPr lang="en-US" dirty="0" smtClean="0"/>
-              <a:t>Reference from state to sale</a:t>
-            </a:r>
-            <a:endParaRPr lang="en-US" dirty="0"/>
-          </a:p>
-          <a:p>
-            <a:r>
-              <a:rPr lang="en-US" dirty="0"/>
-              <a:t>unit tests should pass when </a:t>
-            </a:r>
-            <a:r>
-              <a:rPr lang="en-US" dirty="0" smtClean="0"/>
-              <a:t>rules implemented</a:t>
-            </a:r>
-            <a:endParaRPr lang="en-US" dirty="0"/>
-          </a:p>
-          <a:p>
-            <a:endParaRPr lang="en-US" dirty="0"/>
-          </a:p>
-        </p:txBody>
-      </p:sp>
-    </p:spTree>
-    <p:extLst>
-      <p:ext uri="{BB962C8B-B14F-4D97-AF65-F5344CB8AC3E}">
-        <p14:creationId xmlns:p14="http://schemas.microsoft.com/office/powerpoint/2010/main" val="2390489064"/>
-      </p:ext>
-    </p:extLst>
-  </p:cSld>
-  <p:clrMapOvr>
-    <a:masterClrMapping/>
-  </p:clrMapOvr>
-</p:sld>
-</file>
-
 <file path=ppt/slides/slide15.xml><?xml version="1.0" encoding="utf-8"?>
 <p:sld xmlns:a="http://schemas.openxmlformats.org/drawingml/2006/main" xmlns:r="http://schemas.openxmlformats.org/officeDocument/2006/relationships" xmlns:p="http://schemas.openxmlformats.org/presentationml/2006/main">
   <p:cSld>
@@ -6452,7 +6561,7 @@
           <a:p>
             <a:r>
               <a:rPr lang="en-US" dirty="0" smtClean="0"/>
-              <a:t>Exercise 2: Rules</a:t>
+              <a:t>Exercise 2: implement sale state design</a:t>
             </a:r>
             <a:endParaRPr lang="en-US" dirty="0"/>
           </a:p>
@@ -6470,185 +6579,66 @@
         </p:nvSpPr>
         <p:spPr/>
         <p:txBody>
-          <a:bodyPr numCol="2">
-            <a:normAutofit fontScale="77500" lnSpcReduction="20000"/>
+          <a:bodyPr>
+            <a:normAutofit/>
           </a:bodyPr>
           <a:lstStyle/>
           <a:p>
-            <a:pPr marL="457200" indent="-457200">
-              <a:buFont typeface="+mj-lt"/>
-              <a:buAutoNum type="arabicPeriod"/>
-            </a:pPr>
-            <a:r>
-              <a:rPr lang="en-US" dirty="0" smtClean="0"/>
-              <a:t>Open: !Overpaid and !Cancelled and !Paid</a:t>
-            </a:r>
-            <a:endParaRPr lang="en-US" dirty="0"/>
-          </a:p>
-          <a:p>
-            <a:pPr marL="800100" lvl="1" indent="-342900">
-              <a:buFont typeface="+mj-lt"/>
-              <a:buAutoNum type="alphaLcPeriod"/>
-            </a:pPr>
             <a:r>
               <a:rPr lang="en-US" dirty="0"/>
-              <a:t>Can modify items</a:t>
-            </a:r>
-          </a:p>
-          <a:p>
-            <a:pPr marL="800100" lvl="1" indent="-342900">
-              <a:buFont typeface="+mj-lt"/>
-              <a:buAutoNum type="alphaLcPeriod"/>
-            </a:pPr>
+              <a:t>Start from </a:t>
+            </a:r>
+            <a:r>
+              <a:rPr lang="en-US" dirty="0" smtClean="0"/>
+              <a:t>Exercise2_Initial\PointOfSaleStateManagement.sln</a:t>
+            </a:r>
+            <a:endParaRPr lang="en-US" dirty="0"/>
+          </a:p>
+          <a:p>
+            <a:r>
+              <a:rPr lang="en-US" dirty="0" smtClean="0"/>
+              <a:t>The initial solution includes</a:t>
+            </a:r>
+          </a:p>
+          <a:p>
+            <a:pPr lvl="1"/>
+            <a:r>
+              <a:rPr lang="en-US" dirty="0" smtClean="0"/>
+              <a:t>Base class for the states (???!!!)</a:t>
+            </a:r>
+          </a:p>
+          <a:p>
+            <a:pPr lvl="1"/>
+            <a:r>
+              <a:rPr lang="en-US" dirty="0" smtClean="0"/>
+              <a:t>Stubbed out concrete states</a:t>
+            </a:r>
+          </a:p>
+          <a:p>
+            <a:pPr lvl="1"/>
+            <a:r>
+              <a:rPr lang="en-US" dirty="0" smtClean="0"/>
+              <a:t>Reference from sale to current state (initialized to Open)</a:t>
+            </a:r>
+          </a:p>
+          <a:p>
+            <a:pPr lvl="1"/>
+            <a:r>
+              <a:rPr lang="en-US" dirty="0" smtClean="0"/>
+              <a:t>Reference from state to sale</a:t>
+            </a:r>
+            <a:endParaRPr lang="en-US" dirty="0"/>
+          </a:p>
+          <a:p>
             <a:r>
               <a:rPr lang="en-US" dirty="0"/>
-              <a:t>If balance &lt; 0, can pay</a:t>
-            </a:r>
-          </a:p>
-          <a:p>
-            <a:pPr marL="800100" lvl="1" indent="-342900">
-              <a:buFont typeface="+mj-lt"/>
-              <a:buAutoNum type="alphaLcPeriod"/>
-            </a:pPr>
-            <a:r>
-              <a:rPr lang="en-US" dirty="0"/>
-              <a:t>If payments = 0, can cancel</a:t>
-            </a:r>
-          </a:p>
-          <a:p>
-            <a:pPr marL="800100" lvl="1" indent="-342900">
-              <a:buFont typeface="+mj-lt"/>
-              <a:buAutoNum type="alphaLcPeriod"/>
-            </a:pPr>
-            <a:r>
-              <a:rPr lang="en-US" dirty="0"/>
-              <a:t>Can give change up to total payment amount</a:t>
-            </a:r>
-          </a:p>
-          <a:p>
-            <a:pPr marL="457200" indent="-457200">
-              <a:buFont typeface="+mj-lt"/>
-              <a:buAutoNum type="arabicPeriod"/>
-            </a:pPr>
-            <a:r>
-              <a:rPr lang="en-US" dirty="0" smtClean="0"/>
-              <a:t>Overpaid: Balance &gt; 0</a:t>
-            </a:r>
-            <a:endParaRPr lang="en-US" dirty="0"/>
-          </a:p>
-          <a:p>
-            <a:pPr marL="800100" lvl="1" indent="-342900">
-              <a:buFont typeface="+mj-lt"/>
-              <a:buAutoNum type="alphaLcPeriod"/>
-            </a:pPr>
-            <a:r>
-              <a:rPr lang="en-US" dirty="0"/>
-              <a:t>Can give change</a:t>
-            </a:r>
-          </a:p>
-          <a:p>
-            <a:pPr marL="800100" lvl="1" indent="-342900">
-              <a:buFont typeface="+mj-lt"/>
-              <a:buAutoNum type="alphaLcPeriod"/>
-            </a:pPr>
-            <a:r>
-              <a:rPr lang="en-US" dirty="0"/>
-              <a:t>Can modify items (possibly add in lieu of change)</a:t>
-            </a:r>
-          </a:p>
-          <a:p>
-            <a:pPr marL="800100" lvl="1" indent="-342900">
-              <a:buFont typeface="+mj-lt"/>
-              <a:buAutoNum type="alphaLcPeriod"/>
-            </a:pPr>
-            <a:r>
-              <a:rPr lang="en-US" dirty="0"/>
-              <a:t>Cannot pay</a:t>
-            </a:r>
-          </a:p>
-          <a:p>
-            <a:pPr marL="800100" lvl="1" indent="-342900">
-              <a:buFont typeface="+mj-lt"/>
-              <a:buAutoNum type="alphaLcPeriod"/>
-            </a:pPr>
-            <a:r>
-              <a:rPr lang="en-US" dirty="0"/>
-              <a:t>Can give change up to previous payments amount, can </a:t>
-            </a:r>
-            <a:r>
-              <a:rPr lang="en-US" dirty="0" smtClean="0"/>
-              <a:t>cancel</a:t>
-            </a:r>
-          </a:p>
-          <a:p>
-            <a:pPr marL="800100" lvl="1" indent="-342900">
-              <a:buFont typeface="+mj-lt"/>
-              <a:buAutoNum type="alphaLcPeriod"/>
-            </a:pPr>
-            <a:endParaRPr lang="en-US" dirty="0"/>
-          </a:p>
-          <a:p>
-            <a:pPr marL="800100" lvl="1" indent="-342900">
-              <a:buFont typeface="+mj-lt"/>
-              <a:buAutoNum type="alphaLcPeriod"/>
-            </a:pPr>
-            <a:endParaRPr lang="en-US" dirty="0" smtClean="0"/>
-          </a:p>
-          <a:p>
-            <a:pPr marL="800100" lvl="1" indent="-342900">
-              <a:buFont typeface="+mj-lt"/>
-              <a:buAutoNum type="alphaLcPeriod"/>
-            </a:pPr>
-            <a:endParaRPr lang="en-US" dirty="0"/>
-          </a:p>
-          <a:p>
-            <a:pPr marL="800100" lvl="1" indent="-342900">
-              <a:buFont typeface="+mj-lt"/>
-              <a:buAutoNum type="alphaLcPeriod"/>
-            </a:pPr>
-            <a:endParaRPr lang="en-US" dirty="0"/>
-          </a:p>
-          <a:p>
-            <a:pPr marL="457200" indent="-457200">
-              <a:buFont typeface="+mj-lt"/>
-              <a:buAutoNum type="arabicPeriod"/>
-            </a:pPr>
-            <a:r>
-              <a:rPr lang="en-US" dirty="0" smtClean="0"/>
-              <a:t>Cancelled: Cancelled successfully executed</a:t>
-            </a:r>
-            <a:endParaRPr lang="en-US" dirty="0"/>
-          </a:p>
-          <a:p>
-            <a:pPr marL="800100" lvl="1" indent="-342900">
-              <a:buFont typeface="+mj-lt"/>
-              <a:buAutoNum type="alphaLcPeriod"/>
-            </a:pPr>
-            <a:r>
-              <a:rPr lang="en-US" dirty="0"/>
-              <a:t>No actions allowed</a:t>
-            </a:r>
-          </a:p>
-          <a:p>
-            <a:pPr marL="457200" indent="-457200">
-              <a:buFont typeface="+mj-lt"/>
-              <a:buAutoNum type="arabicPeriod"/>
-            </a:pPr>
-            <a:r>
-              <a:rPr lang="en-US" dirty="0" smtClean="0"/>
-              <a:t>Paid: Balance = 0, 1+ Items, 1+ Payments</a:t>
-            </a:r>
-            <a:endParaRPr lang="en-US" dirty="0"/>
-          </a:p>
-          <a:p>
-            <a:pPr marL="800100" lvl="1" indent="-342900">
-              <a:buFont typeface="+mj-lt"/>
-              <a:buAutoNum type="alphaLcPeriod"/>
-            </a:pPr>
-            <a:r>
-              <a:rPr lang="en-US" dirty="0"/>
-              <a:t>No actions allowed</a:t>
-            </a:r>
+              <a:t>unit tests should pass when </a:t>
+            </a:r>
+            <a:r>
+              <a:rPr lang="en-US" dirty="0" smtClean="0"/>
+              <a:t>rules implemented</a:t>
+            </a:r>
+            <a:endParaRPr lang="en-US" dirty="0"/>
           </a:p>
           <a:p>
             <a:endParaRPr lang="en-US" dirty="0"/>
@@ -6658,7 +6648,7 @@
     </p:spTree>
     <p:extLst>
       <p:ext uri="{BB962C8B-B14F-4D97-AF65-F5344CB8AC3E}">
-        <p14:creationId xmlns:p14="http://schemas.microsoft.com/office/powerpoint/2010/main" val="3712886392"/>
+        <p14:creationId xmlns:p14="http://schemas.microsoft.com/office/powerpoint/2010/main" val="2390489064"/>
       </p:ext>
     </p:extLst>
   </p:cSld>
@@ -6702,7 +6692,7 @@
           <a:p>
             <a:r>
               <a:rPr lang="en-US" dirty="0" smtClean="0"/>
-              <a:t>Exercise 2: Extra credit 1</a:t>
+              <a:t>Exercise 2: Rules</a:t>
             </a:r>
             <a:endParaRPr lang="en-US" dirty="0"/>
           </a:p>
@@ -6720,93 +6710,185 @@
         </p:nvSpPr>
         <p:spPr/>
         <p:txBody>
-          <a:bodyPr>
-            <a:normAutofit lnSpcReduction="10000"/>
+          <a:bodyPr numCol="2">
+            <a:normAutofit fontScale="77500" lnSpcReduction="20000"/>
           </a:bodyPr>
           <a:lstStyle/>
           <a:p>
-            <a:r>
-              <a:rPr lang="en-US" dirty="0" smtClean="0"/>
-              <a:t>Take </a:t>
-            </a:r>
+            <a:pPr marL="457200" indent="-457200">
+              <a:buFont typeface="+mj-lt"/>
+              <a:buAutoNum type="arabicPeriod"/>
+            </a:pPr>
+            <a:r>
+              <a:rPr lang="en-US" dirty="0" smtClean="0"/>
+              <a:t>Open: !Overpaid and !Cancelled and !Paid</a:t>
+            </a:r>
+            <a:endParaRPr lang="en-US" dirty="0"/>
+          </a:p>
+          <a:p>
+            <a:pPr marL="800100" lvl="1" indent="-342900">
+              <a:buFont typeface="+mj-lt"/>
+              <a:buAutoNum type="alphaLcPeriod"/>
+            </a:pPr>
             <a:r>
               <a:rPr lang="en-US" dirty="0"/>
-              <a:t>advantage of similarities </a:t>
-            </a:r>
-            <a:r>
-              <a:rPr lang="en-US" dirty="0" smtClean="0"/>
-              <a:t>in states to </a:t>
-            </a:r>
-            <a:r>
-              <a:rPr lang="en-US" dirty="0"/>
-              <a:t>reduce </a:t>
-            </a:r>
-            <a:r>
-              <a:rPr lang="en-US" dirty="0" smtClean="0"/>
-              <a:t>code duplication</a:t>
-            </a:r>
-          </a:p>
-          <a:p>
-            <a:pPr lvl="1"/>
-            <a:r>
-              <a:rPr lang="en-US" dirty="0" smtClean="0"/>
-              <a:t>Open/Overpaid</a:t>
-            </a:r>
-          </a:p>
-          <a:p>
-            <a:pPr lvl="2"/>
-            <a:r>
-              <a:rPr lang="en-US" dirty="0" smtClean="0"/>
-              <a:t>Can </a:t>
-            </a:r>
-            <a:r>
-              <a:rPr lang="en-US" dirty="0"/>
-              <a:t>modify items</a:t>
-            </a:r>
-          </a:p>
-          <a:p>
-            <a:pPr lvl="2"/>
+              <a:t>Can modify items</a:t>
+            </a:r>
+          </a:p>
+          <a:p>
+            <a:pPr marL="800100" lvl="1" indent="-342900">
+              <a:buFont typeface="+mj-lt"/>
+              <a:buAutoNum type="alphaLcPeriod"/>
+            </a:pPr>
             <a:r>
               <a:rPr lang="en-US" dirty="0"/>
               <a:t>If balance &lt; 0, can pay</a:t>
             </a:r>
           </a:p>
           <a:p>
-            <a:pPr lvl="2"/>
-            <a:r>
-              <a:rPr lang="en-US" dirty="0" smtClean="0"/>
-              <a:t>Can </a:t>
-            </a:r>
+            <a:pPr marL="800100" lvl="1" indent="-342900">
+              <a:buFont typeface="+mj-lt"/>
+              <a:buAutoNum type="alphaLcPeriod"/>
+            </a:pPr>
             <a:r>
               <a:rPr lang="en-US" dirty="0"/>
-              <a:t>give change up to total payment </a:t>
-            </a:r>
-            <a:r>
-              <a:rPr lang="en-US" dirty="0" smtClean="0"/>
-              <a:t>amount</a:t>
-            </a:r>
-          </a:p>
-          <a:p>
-            <a:pPr lvl="1"/>
-            <a:r>
-              <a:rPr lang="en-US" dirty="0" smtClean="0"/>
-              <a:t>Paid/Cancelled</a:t>
-            </a:r>
-          </a:p>
-          <a:p>
-            <a:pPr lvl="2"/>
-            <a:r>
-              <a:rPr lang="en-US" dirty="0" smtClean="0"/>
+              <a:t>If payments = 0, can cancel</a:t>
+            </a:r>
+          </a:p>
+          <a:p>
+            <a:pPr marL="800100" lvl="1" indent="-342900">
+              <a:buFont typeface="+mj-lt"/>
+              <a:buAutoNum type="alphaLcPeriod"/>
+            </a:pPr>
+            <a:r>
+              <a:rPr lang="en-US" dirty="0"/>
+              <a:t>Can give change up to total payment amount</a:t>
+            </a:r>
+          </a:p>
+          <a:p>
+            <a:pPr marL="457200" indent="-457200">
+              <a:buFont typeface="+mj-lt"/>
+              <a:buAutoNum type="arabicPeriod"/>
+            </a:pPr>
+            <a:r>
+              <a:rPr lang="en-US" dirty="0" smtClean="0"/>
+              <a:t>Overpaid: Balance &gt; 0</a:t>
+            </a:r>
+            <a:endParaRPr lang="en-US" dirty="0"/>
+          </a:p>
+          <a:p>
+            <a:pPr marL="800100" lvl="1" indent="-342900">
+              <a:buFont typeface="+mj-lt"/>
+              <a:buAutoNum type="alphaLcPeriod"/>
+            </a:pPr>
+            <a:r>
+              <a:rPr lang="en-US" dirty="0"/>
+              <a:t>Can give change</a:t>
+            </a:r>
+          </a:p>
+          <a:p>
+            <a:pPr marL="800100" lvl="1" indent="-342900">
+              <a:buFont typeface="+mj-lt"/>
+              <a:buAutoNum type="alphaLcPeriod"/>
+            </a:pPr>
+            <a:r>
+              <a:rPr lang="en-US" dirty="0"/>
+              <a:t>Can modify items (possibly add in lieu of change)</a:t>
+            </a:r>
+          </a:p>
+          <a:p>
+            <a:pPr marL="800100" lvl="1" indent="-342900">
+              <a:buFont typeface="+mj-lt"/>
+              <a:buAutoNum type="alphaLcPeriod"/>
+            </a:pPr>
+            <a:r>
+              <a:rPr lang="en-US" dirty="0"/>
+              <a:t>Cannot pay</a:t>
+            </a:r>
+          </a:p>
+          <a:p>
+            <a:pPr marL="800100" lvl="1" indent="-342900">
+              <a:buFont typeface="+mj-lt"/>
+              <a:buAutoNum type="alphaLcPeriod"/>
+            </a:pPr>
+            <a:r>
+              <a:rPr lang="en-US" dirty="0"/>
+              <a:t>Can give change up to previous payments amount, can </a:t>
+            </a:r>
+            <a:r>
+              <a:rPr lang="en-US" dirty="0" smtClean="0"/>
+              <a:t>cancel</a:t>
+            </a:r>
+          </a:p>
+          <a:p>
+            <a:pPr marL="800100" lvl="1" indent="-342900">
+              <a:buFont typeface="+mj-lt"/>
+              <a:buAutoNum type="alphaLcPeriod"/>
+            </a:pPr>
+            <a:endParaRPr lang="en-US" dirty="0"/>
+          </a:p>
+          <a:p>
+            <a:pPr marL="800100" lvl="1" indent="-342900">
+              <a:buFont typeface="+mj-lt"/>
+              <a:buAutoNum type="alphaLcPeriod"/>
+            </a:pPr>
+            <a:endParaRPr lang="en-US" dirty="0" smtClean="0"/>
+          </a:p>
+          <a:p>
+            <a:pPr marL="800100" lvl="1" indent="-342900">
+              <a:buFont typeface="+mj-lt"/>
+              <a:buAutoNum type="alphaLcPeriod"/>
+            </a:pPr>
+            <a:endParaRPr lang="en-US" dirty="0"/>
+          </a:p>
+          <a:p>
+            <a:pPr marL="800100" lvl="1" indent="-342900">
+              <a:buFont typeface="+mj-lt"/>
+              <a:buAutoNum type="alphaLcPeriod"/>
+            </a:pPr>
+            <a:endParaRPr lang="en-US" dirty="0"/>
+          </a:p>
+          <a:p>
+            <a:pPr marL="457200" indent="-457200">
+              <a:buFont typeface="+mj-lt"/>
+              <a:buAutoNum type="arabicPeriod"/>
+            </a:pPr>
+            <a:r>
+              <a:rPr lang="en-US" dirty="0" smtClean="0"/>
+              <a:t>Cancelled: Cancelled successfully executed</a:t>
+            </a:r>
+            <a:endParaRPr lang="en-US" dirty="0"/>
+          </a:p>
+          <a:p>
+            <a:pPr marL="800100" lvl="1" indent="-342900">
+              <a:buFont typeface="+mj-lt"/>
+              <a:buAutoNum type="alphaLcPeriod"/>
+            </a:pPr>
+            <a:r>
+              <a:rPr lang="en-US" dirty="0"/>
               <a:t>No actions allowed</a:t>
             </a:r>
           </a:p>
           <a:p>
-            <a:pPr lvl="2"/>
-            <a:r>
-              <a:rPr lang="en-US" dirty="0" smtClean="0"/>
-              <a:t>Each is just a marker for how it was finalized</a:t>
-            </a:r>
-            <a:endParaRPr lang="en-US" dirty="0"/>
+            <a:pPr marL="457200" indent="-457200">
+              <a:buFont typeface="+mj-lt"/>
+              <a:buAutoNum type="arabicPeriod"/>
+            </a:pPr>
+            <a:r>
+              <a:rPr lang="en-US" dirty="0" smtClean="0"/>
+              <a:t>Paid: Balance = 0, 1+ Items, 1+ Payments</a:t>
+            </a:r>
+            <a:endParaRPr lang="en-US" dirty="0"/>
+          </a:p>
+          <a:p>
+            <a:pPr marL="800100" lvl="1" indent="-342900">
+              <a:buFont typeface="+mj-lt"/>
+              <a:buAutoNum type="alphaLcPeriod"/>
+            </a:pPr>
+            <a:r>
+              <a:rPr lang="en-US" dirty="0"/>
+              <a:t>No actions allowed</a:t>
+            </a:r>
           </a:p>
           <a:p>
             <a:endParaRPr lang="en-US" dirty="0"/>
@@ -6816,7 +6898,7 @@
     </p:spTree>
     <p:extLst>
       <p:ext uri="{BB962C8B-B14F-4D97-AF65-F5344CB8AC3E}">
-        <p14:creationId xmlns:p14="http://schemas.microsoft.com/office/powerpoint/2010/main" val="3100472726"/>
+        <p14:creationId xmlns:p14="http://schemas.microsoft.com/office/powerpoint/2010/main" val="3712886392"/>
       </p:ext>
     </p:extLst>
   </p:cSld>
@@ -6860,7 +6942,7 @@
           <a:p>
             <a:r>
               <a:rPr lang="en-US" dirty="0" smtClean="0"/>
-              <a:t>Exercise 2: Extra credit 2</a:t>
+              <a:t>Exercise 2: Extra credit 1</a:t>
             </a:r>
             <a:endParaRPr lang="en-US" dirty="0"/>
           </a:p>
@@ -6879,18 +6961,92 @@
         <p:spPr/>
         <p:txBody>
           <a:bodyPr>
-            <a:normAutofit/>
+            <a:normAutofit lnSpcReduction="10000"/>
           </a:bodyPr>
           <a:lstStyle/>
           <a:p>
             <a:r>
               <a:rPr lang="en-US" dirty="0" smtClean="0"/>
-              <a:t>Account </a:t>
+              <a:t>Take </a:t>
             </a:r>
             <a:r>
               <a:rPr lang="en-US" dirty="0"/>
-              <a:t>for loading a sale that wasn’t in the initial state when saved</a:t>
-            </a:r>
+              <a:t>advantage of similarities </a:t>
+            </a:r>
+            <a:r>
+              <a:rPr lang="en-US" dirty="0" smtClean="0"/>
+              <a:t>in states to </a:t>
+            </a:r>
+            <a:r>
+              <a:rPr lang="en-US" dirty="0"/>
+              <a:t>reduce </a:t>
+            </a:r>
+            <a:r>
+              <a:rPr lang="en-US" dirty="0" smtClean="0"/>
+              <a:t>code duplication</a:t>
+            </a:r>
+          </a:p>
+          <a:p>
+            <a:pPr lvl="1"/>
+            <a:r>
+              <a:rPr lang="en-US" dirty="0" smtClean="0"/>
+              <a:t>Open/Overpaid</a:t>
+            </a:r>
+          </a:p>
+          <a:p>
+            <a:pPr lvl="2"/>
+            <a:r>
+              <a:rPr lang="en-US" dirty="0" smtClean="0"/>
+              <a:t>Can </a:t>
+            </a:r>
+            <a:r>
+              <a:rPr lang="en-US" dirty="0"/>
+              <a:t>modify items</a:t>
+            </a:r>
+          </a:p>
+          <a:p>
+            <a:pPr lvl="2"/>
+            <a:r>
+              <a:rPr lang="en-US" dirty="0"/>
+              <a:t>If balance &lt; 0, can pay</a:t>
+            </a:r>
+          </a:p>
+          <a:p>
+            <a:pPr lvl="2"/>
+            <a:r>
+              <a:rPr lang="en-US" dirty="0" smtClean="0"/>
+              <a:t>Can </a:t>
+            </a:r>
+            <a:r>
+              <a:rPr lang="en-US" dirty="0"/>
+              <a:t>give change up to total payment </a:t>
+            </a:r>
+            <a:r>
+              <a:rPr lang="en-US" dirty="0" smtClean="0"/>
+              <a:t>amount</a:t>
+            </a:r>
+          </a:p>
+          <a:p>
+            <a:pPr lvl="1"/>
+            <a:r>
+              <a:rPr lang="en-US" dirty="0" smtClean="0"/>
+              <a:t>Paid/Cancelled</a:t>
+            </a:r>
+          </a:p>
+          <a:p>
+            <a:pPr lvl="2"/>
+            <a:r>
+              <a:rPr lang="en-US" dirty="0" smtClean="0"/>
+              <a:t>No actions allowed</a:t>
+            </a:r>
+          </a:p>
+          <a:p>
+            <a:pPr lvl="2"/>
+            <a:r>
+              <a:rPr lang="en-US" dirty="0" smtClean="0"/>
+              <a:t>Each is just a marker for how it was finalized</a:t>
+            </a:r>
+            <a:endParaRPr lang="en-US" dirty="0"/>
           </a:p>
           <a:p>
             <a:endParaRPr lang="en-US" dirty="0"/>
@@ -6900,7 +7056,7 @@
     </p:spTree>
     <p:extLst>
       <p:ext uri="{BB962C8B-B14F-4D97-AF65-F5344CB8AC3E}">
-        <p14:creationId xmlns:p14="http://schemas.microsoft.com/office/powerpoint/2010/main" val="2091513166"/>
+        <p14:creationId xmlns:p14="http://schemas.microsoft.com/office/powerpoint/2010/main" val="3100472726"/>
       </p:ext>
     </p:extLst>
   </p:cSld>
@@ -6944,7 +7100,7 @@
           <a:p>
             <a:r>
               <a:rPr lang="en-US" dirty="0" smtClean="0"/>
-              <a:t>Exercise 2: retrospective</a:t>
+              <a:t>Exercise 2: Extra credit 2</a:t>
             </a:r>
             <a:endParaRPr lang="en-US" dirty="0"/>
           </a:p>
@@ -6963,106 +7119,20 @@
         <p:spPr/>
         <p:txBody>
           <a:bodyPr>
-            <a:normAutofit fontScale="70000" lnSpcReduction="20000"/>
+            <a:normAutofit/>
           </a:bodyPr>
           <a:lstStyle/>
           <a:p>
             <a:r>
               <a:rPr lang="en-US" dirty="0" smtClean="0"/>
-              <a:t>Logic organized, componentized, and much cleaner</a:t>
-            </a:r>
-          </a:p>
-          <a:p>
-            <a:pPr lvl="1"/>
-            <a:r>
-              <a:rPr lang="en-US" dirty="0" smtClean="0"/>
-              <a:t>Removes many conditionals and/or switches in most naïve implementations</a:t>
-            </a:r>
-          </a:p>
-          <a:p>
+              <a:t>Account </a:t>
+            </a:r>
             <a:r>
               <a:rPr lang="en-US" dirty="0"/>
-              <a:t>Explicit action defined for every </a:t>
-            </a:r>
-            <a:r>
-              <a:rPr lang="en-US" dirty="0" smtClean="0"/>
-              <a:t>state</a:t>
-            </a:r>
-          </a:p>
-          <a:p>
-            <a:pPr lvl="1"/>
-            <a:r>
-              <a:rPr lang="en-US" dirty="0" smtClean="0"/>
-              <a:t>Can require writing lots code </a:t>
-            </a:r>
-          </a:p>
-          <a:p>
-            <a:pPr lvl="2"/>
-            <a:r>
-              <a:rPr lang="en-US" dirty="0" smtClean="0"/>
-              <a:t>&lt;number of methods&gt; = ~(&lt;number of states&gt; * &lt;number of actions&gt;) + &lt;number of transitions&gt;</a:t>
-            </a:r>
-          </a:p>
-          <a:p>
-            <a:pPr lvl="1"/>
-            <a:r>
-              <a:rPr lang="en-US" dirty="0" smtClean="0"/>
-              <a:t>Without care, can lead to code duplication</a:t>
-            </a:r>
-            <a:endParaRPr lang="en-US" dirty="0"/>
-          </a:p>
-          <a:p>
-            <a:r>
-              <a:rPr lang="en-US" dirty="0" smtClean="0"/>
-              <a:t>SOLID design principles alignment</a:t>
-            </a:r>
-          </a:p>
-          <a:p>
-            <a:pPr lvl="1"/>
-            <a:r>
-              <a:rPr lang="en-US" i="1" dirty="0"/>
-              <a:t>single responsibility principle </a:t>
-            </a:r>
-            <a:r>
-              <a:rPr lang="en-US" i="1" dirty="0" smtClean="0"/>
-              <a:t>: </a:t>
-            </a:r>
-            <a:r>
-              <a:rPr lang="en-US" dirty="0" smtClean="0"/>
-              <a:t>Concrete states manage actions and transitions</a:t>
-            </a:r>
-          </a:p>
-          <a:p>
-            <a:pPr lvl="1"/>
-            <a:r>
-              <a:rPr lang="en-US" i="1" dirty="0" smtClean="0"/>
-              <a:t>open/closed principle: </a:t>
-            </a:r>
-            <a:r>
-              <a:rPr lang="en-US" dirty="0" smtClean="0"/>
-              <a:t>adding new states can require changes to existing states</a:t>
-            </a:r>
-            <a:endParaRPr lang="en-US" i="1" dirty="0" smtClean="0"/>
-          </a:p>
-          <a:p>
-            <a:r>
-              <a:rPr lang="en-US" dirty="0" smtClean="0"/>
-              <a:t>Can take some work to derive overall workflow from concrete states</a:t>
-            </a:r>
-          </a:p>
-          <a:p>
-            <a:r>
-              <a:rPr lang="en-US" dirty="0" smtClean="0"/>
-              <a:t>Exercise2_Final\PointOfSaleStateManagement.sln </a:t>
-            </a:r>
-            <a:r>
-              <a:rPr lang="en-US" dirty="0"/>
-              <a:t>is my version of this </a:t>
-            </a:r>
-            <a:r>
-              <a:rPr lang="en-US" dirty="0" smtClean="0"/>
-              <a:t>exercise</a:t>
-            </a:r>
+              <a:t>for loading a sale that wasn’t in the initial state when saved</a:t>
+            </a:r>
+          </a:p>
+          <a:p>
             <a:endParaRPr lang="en-US" dirty="0"/>
           </a:p>
         </p:txBody>
@@ -7070,7 +7140,7 @@
     </p:spTree>
     <p:extLst>
       <p:ext uri="{BB962C8B-B14F-4D97-AF65-F5344CB8AC3E}">
-        <p14:creationId xmlns:p14="http://schemas.microsoft.com/office/powerpoint/2010/main" val="1829763881"/>
+        <p14:creationId xmlns:p14="http://schemas.microsoft.com/office/powerpoint/2010/main" val="2091513166"/>
       </p:ext>
     </p:extLst>
   </p:cSld>
@@ -7114,7 +7184,7 @@
           <a:p>
             <a:r>
               <a:rPr lang="en-US" dirty="0" smtClean="0"/>
-              <a:t>Improving upon the state design pattern</a:t>
+              <a:t>Exercise 2: retrospective</a:t>
             </a:r>
             <a:endParaRPr lang="en-US" dirty="0"/>
           </a:p>
@@ -7132,56 +7202,107 @@
         </p:nvSpPr>
         <p:spPr/>
         <p:txBody>
-          <a:bodyPr/>
-          <a:lstStyle/>
-          <a:p>
-            <a:r>
-              <a:rPr lang="en-US" dirty="0" smtClean="0"/>
-              <a:t>What if we could…</a:t>
+          <a:bodyPr>
+            <a:normAutofit fontScale="70000" lnSpcReduction="20000"/>
+          </a:bodyPr>
+          <a:lstStyle/>
+          <a:p>
+            <a:r>
+              <a:rPr lang="en-US" dirty="0" smtClean="0"/>
+              <a:t>Logic organized, componentized, and much cleaner</a:t>
             </a:r>
           </a:p>
           <a:p>
             <a:pPr lvl="1"/>
             <a:r>
               <a:rPr lang="en-US" dirty="0" smtClean="0"/>
-              <a:t>Reduce the amount of code required by the state design pattern?</a:t>
+              <a:t>Removes many conditionals and/or switches in most naïve implementations</a:t>
+            </a:r>
+          </a:p>
+          <a:p>
+            <a:r>
+              <a:rPr lang="en-US" dirty="0"/>
+              <a:t>Explicit action defined for every </a:t>
+            </a:r>
+            <a:r>
+              <a:rPr lang="en-US" dirty="0" smtClean="0"/>
+              <a:t>state</a:t>
+            </a:r>
+          </a:p>
+          <a:p>
+            <a:pPr lvl="1"/>
+            <a:r>
+              <a:rPr lang="en-US" dirty="0" smtClean="0"/>
+              <a:t>Can require writing lots code </a:t>
             </a:r>
           </a:p>
           <a:p>
             <a:pPr lvl="2"/>
             <a:r>
               <a:rPr lang="en-US" dirty="0" smtClean="0"/>
-              <a:t>Including the likelihood of duplicate code</a:t>
+              <a:t>&lt;number of methods&gt; = ~(&lt;number of states&gt; * &lt;number of actions&gt;) + &lt;number of transitions&gt;</a:t>
             </a:r>
           </a:p>
           <a:p>
             <a:pPr lvl="1"/>
             <a:r>
               <a:rPr lang="en-US" dirty="0" smtClean="0"/>
-              <a:t>Better align with SOLID principles?</a:t>
+              <a:t>Without care, can lead to code duplication</a:t>
+            </a:r>
+            <a:endParaRPr lang="en-US" dirty="0"/>
+          </a:p>
+          <a:p>
+            <a:r>
+              <a:rPr lang="en-US" dirty="0" smtClean="0"/>
+              <a:t>SOLID design principles alignment</a:t>
             </a:r>
           </a:p>
           <a:p>
             <a:pPr lvl="1"/>
             <a:r>
-              <a:rPr lang="en-US" dirty="0" smtClean="0"/>
-              <a:t>Make it easy to derive workflow from state machine implementation?</a:t>
+              <a:rPr lang="en-US" i="1" dirty="0"/>
+              <a:t>single responsibility principle </a:t>
+            </a:r>
+            <a:r>
+              <a:rPr lang="en-US" i="1" dirty="0" smtClean="0"/>
+              <a:t>: </a:t>
+            </a:r>
+            <a:r>
+              <a:rPr lang="en-US" dirty="0" smtClean="0"/>
+              <a:t>Concrete states manage actions and transitions</a:t>
             </a:r>
           </a:p>
           <a:p>
             <a:pPr lvl="1"/>
-            <a:endParaRPr lang="en-US" dirty="0" smtClean="0"/>
-          </a:p>
-          <a:p>
-            <a:pPr lvl="2"/>
-            <a:endParaRPr lang="en-US" dirty="0" smtClean="0"/>
-          </a:p>
-          <a:p>
-            <a:pPr lvl="1"/>
-            <a:endParaRPr lang="en-US" dirty="0" smtClean="0"/>
-          </a:p>
-          <a:p>
-            <a:pPr lvl="1"/>
+            <a:r>
+              <a:rPr lang="en-US" i="1" dirty="0" smtClean="0"/>
+              <a:t>open/closed principle: </a:t>
+            </a:r>
+            <a:r>
+              <a:rPr lang="en-US" dirty="0" smtClean="0"/>
+              <a:t>adding new states can require changes to existing states</a:t>
+            </a:r>
+            <a:endParaRPr lang="en-US" i="1" dirty="0" smtClean="0"/>
+          </a:p>
+          <a:p>
+            <a:r>
+              <a:rPr lang="en-US" dirty="0" smtClean="0"/>
+              <a:t>Can take some work to derive overall workflow from concrete states</a:t>
+            </a:r>
+          </a:p>
+          <a:p>
+            <a:r>
+              <a:rPr lang="en-US" dirty="0" smtClean="0"/>
+              <a:t>Exercise2_Final\PointOfSaleStateManagement.sln </a:t>
+            </a:r>
+            <a:r>
+              <a:rPr lang="en-US" dirty="0"/>
+              <a:t>is my version of this </a:t>
+            </a:r>
+            <a:r>
+              <a:rPr lang="en-US" dirty="0" smtClean="0"/>
+              <a:t>exercise</a:t>
+            </a:r>
             <a:endParaRPr lang="en-US" dirty="0"/>
           </a:p>
         </p:txBody>
@@ -7189,7 +7310,7 @@
     </p:spTree>
     <p:extLst>
       <p:ext uri="{BB962C8B-B14F-4D97-AF65-F5344CB8AC3E}">
-        <p14:creationId xmlns:p14="http://schemas.microsoft.com/office/powerpoint/2010/main" val="556216006"/>
+        <p14:creationId xmlns:p14="http://schemas.microsoft.com/office/powerpoint/2010/main" val="1829763881"/>
       </p:ext>
     </p:extLst>
   </p:cSld>
@@ -7336,7 +7457,7 @@
           <a:p>
             <a:r>
               <a:rPr lang="en-US" dirty="0" smtClean="0"/>
-              <a:t>Lesson 3: State management libraries</a:t>
+              <a:t>Improving upon the state design pattern</a:t>
             </a:r>
             <a:endParaRPr lang="en-US" dirty="0"/>
           </a:p>
@@ -7354,105 +7475,56 @@
         </p:nvSpPr>
         <p:spPr/>
         <p:txBody>
-          <a:bodyPr>
-            <a:normAutofit fontScale="47500" lnSpcReduction="20000"/>
-          </a:bodyPr>
-          <a:lstStyle/>
-          <a:p>
-            <a:r>
-              <a:rPr lang="en-US" dirty="0" smtClean="0"/>
-              <a:t>Define and configure states in a simple format</a:t>
+          <a:bodyPr/>
+          <a:lstStyle/>
+          <a:p>
+            <a:r>
+              <a:rPr lang="en-US" dirty="0" smtClean="0"/>
+              <a:t>What if we could…</a:t>
             </a:r>
           </a:p>
           <a:p>
             <a:pPr lvl="1"/>
             <a:r>
               <a:rPr lang="en-US" dirty="0" smtClean="0"/>
-              <a:t>Transitions and conditions</a:t>
+              <a:t>Reduce the amount of code required by the state design pattern?</a:t>
+            </a:r>
+          </a:p>
+          <a:p>
+            <a:pPr lvl="2"/>
+            <a:r>
+              <a:rPr lang="en-US" dirty="0" smtClean="0"/>
+              <a:t>Including the likelihood of duplicate code</a:t>
             </a:r>
           </a:p>
           <a:p>
             <a:pPr lvl="1"/>
             <a:r>
-              <a:rPr lang="en-US" dirty="0" err="1" smtClean="0"/>
-              <a:t>Substates</a:t>
-            </a:r>
+              <a:rPr lang="en-US" dirty="0" smtClean="0"/>
+              <a:t>Better align with SOLID principles?</a:t>
+            </a:r>
+          </a:p>
+          <a:p>
+            <a:pPr lvl="1"/>
+            <a:r>
+              <a:rPr lang="en-US" dirty="0" smtClean="0"/>
+              <a:t>Make it easy to derive workflow from state machine implementation?</a:t>
+            </a:r>
+          </a:p>
+          <a:p>
+            <a:pPr lvl="1"/>
             <a:endParaRPr lang="en-US" dirty="0" smtClean="0"/>
           </a:p>
           <a:p>
+            <a:pPr lvl="2"/>
+            <a:endParaRPr lang="en-US" dirty="0" smtClean="0"/>
+          </a:p>
+          <a:p>
             <a:pPr lvl="1"/>
-            <a:r>
-              <a:rPr lang="en-US" dirty="0" smtClean="0"/>
-              <a:t>Shortcuts for common transition patterns</a:t>
-            </a:r>
-          </a:p>
-          <a:p>
-            <a:r>
-              <a:rPr lang="en-US" dirty="0" smtClean="0"/>
-              <a:t>Define actions on state transition events</a:t>
-            </a:r>
+            <a:endParaRPr lang="en-US" dirty="0" smtClean="0"/>
           </a:p>
           <a:p>
             <a:pPr lvl="1"/>
-            <a:r>
-              <a:rPr lang="en-US" dirty="0" smtClean="0"/>
-              <a:t>Entry, Exit, Reenter</a:t>
-            </a:r>
-          </a:p>
-          <a:p>
-            <a:r>
-              <a:rPr lang="en-US" dirty="0" smtClean="0"/>
-              <a:t>Automatically transition after an action</a:t>
-            </a:r>
-          </a:p>
-          <a:p>
-            <a:pPr lvl="1"/>
-            <a:r>
-              <a:rPr lang="en-US" dirty="0" err="1" smtClean="0"/>
-              <a:t>AutoForward</a:t>
-            </a:r>
-            <a:r>
-              <a:rPr lang="en-US" dirty="0" smtClean="0"/>
-              <a:t>/Fallback</a:t>
-            </a:r>
-          </a:p>
-          <a:p>
-            <a:r>
-              <a:rPr lang="en-US" dirty="0" smtClean="0"/>
-              <a:t>Dynamically define transitions at run time</a:t>
-            </a:r>
-          </a:p>
-          <a:p>
-            <a:r>
-              <a:rPr lang="en-US" dirty="0" smtClean="0"/>
-              <a:t>Derive workflow from code</a:t>
-            </a:r>
-          </a:p>
-          <a:p>
-            <a:pPr lvl="1"/>
-            <a:r>
-              <a:rPr lang="en-US" dirty="0" smtClean="0"/>
-              <a:t>Excel table</a:t>
-            </a:r>
-          </a:p>
-          <a:p>
-            <a:pPr lvl="1"/>
-            <a:r>
-              <a:rPr lang="en-US" dirty="0" smtClean="0"/>
-              <a:t>State diagram</a:t>
-            </a:r>
-          </a:p>
-          <a:p>
-            <a:r>
-              <a:rPr lang="en-US" dirty="0" smtClean="0"/>
-              <a:t>Available libraries…</a:t>
-            </a:r>
-          </a:p>
-          <a:p>
-            <a:r>
-              <a:rPr lang="en-US" dirty="0" smtClean="0"/>
-              <a:t>Note that “Actions” are frequently referred to as “triggers”, “events”, or “trigger events”</a:t>
-            </a:r>
             <a:endParaRPr lang="en-US" dirty="0"/>
           </a:p>
         </p:txBody>
@@ -7460,7 +7532,7 @@
     </p:spTree>
     <p:extLst>
       <p:ext uri="{BB962C8B-B14F-4D97-AF65-F5344CB8AC3E}">
-        <p14:creationId xmlns:p14="http://schemas.microsoft.com/office/powerpoint/2010/main" val="3809142904"/>
+        <p14:creationId xmlns:p14="http://schemas.microsoft.com/office/powerpoint/2010/main" val="556216006"/>
       </p:ext>
     </p:extLst>
   </p:cSld>
@@ -7504,7 +7576,7 @@
           <a:p>
             <a:r>
               <a:rPr lang="en-US" dirty="0" smtClean="0"/>
-              <a:t>Exercise 3: sale state machine with library </a:t>
+              <a:t>Lesson 3: State management libraries</a:t>
             </a:r>
             <a:endParaRPr lang="en-US" dirty="0"/>
           </a:p>
@@ -7522,59 +7594,105 @@
         </p:nvSpPr>
         <p:spPr/>
         <p:txBody>
-          <a:bodyPr/>
-          <a:lstStyle/>
-          <a:p>
-            <a:r>
-              <a:rPr lang="en-US" dirty="0"/>
-              <a:t>Start from </a:t>
-            </a:r>
-            <a:r>
-              <a:rPr lang="en-US" dirty="0" smtClean="0"/>
-              <a:t>Exercise3_Initial\PointOfSaleStateManagement.sln</a:t>
-            </a:r>
-            <a:endParaRPr lang="en-US" dirty="0"/>
+          <a:bodyPr>
+            <a:normAutofit fontScale="47500" lnSpcReduction="20000"/>
+          </a:bodyPr>
+          <a:lstStyle/>
+          <a:p>
+            <a:r>
+              <a:rPr lang="en-US" dirty="0" smtClean="0"/>
+              <a:t>Define and configure states in a simple format</a:t>
+            </a:r>
           </a:p>
           <a:p>
             <a:pPr lvl="1"/>
             <a:r>
+              <a:rPr lang="en-US" dirty="0" smtClean="0"/>
+              <a:t>Transitions and conditions</a:t>
+            </a:r>
+          </a:p>
+          <a:p>
+            <a:pPr lvl="1"/>
+            <a:r>
               <a:rPr lang="en-US" dirty="0" err="1" smtClean="0"/>
-              <a:t>NStateManager</a:t>
-            </a:r>
-            <a:r>
-              <a:rPr lang="en-US" dirty="0" smtClean="0"/>
-              <a:t> already loaded</a:t>
-            </a:r>
-          </a:p>
-          <a:p>
-            <a:r>
-              <a:rPr lang="en-US" dirty="0" smtClean="0"/>
-              <a:t>???Only </a:t>
-            </a:r>
-            <a:r>
-              <a:rPr lang="en-US" dirty="0"/>
-              <a:t>make changes to </a:t>
-            </a:r>
-            <a:r>
-              <a:rPr lang="en-US" dirty="0" err="1"/>
-              <a:t>Sale.cs</a:t>
-            </a:r>
-            <a:endParaRPr lang="en-US" dirty="0"/>
+              <a:t>Substates</a:t>
+            </a:r>
+            <a:endParaRPr lang="en-US" dirty="0" smtClean="0"/>
           </a:p>
           <a:p>
             <a:pPr lvl="1"/>
             <a:r>
-              <a:rPr lang="en-US" dirty="0"/>
-              <a:t>Skip the UI constraints</a:t>
-            </a:r>
-          </a:p>
-          <a:p>
-            <a:r>
-              <a:rPr lang="en-US" dirty="0"/>
-              <a:t>unit tests should pass when new rules implemented</a:t>
-            </a:r>
-          </a:p>
-          <a:p>
+              <a:rPr lang="en-US" dirty="0" smtClean="0"/>
+              <a:t>Shortcuts for common transition patterns</a:t>
+            </a:r>
+          </a:p>
+          <a:p>
+            <a:r>
+              <a:rPr lang="en-US" dirty="0" smtClean="0"/>
+              <a:t>Define actions on state transition events</a:t>
+            </a:r>
+          </a:p>
+          <a:p>
+            <a:pPr lvl="1"/>
+            <a:r>
+              <a:rPr lang="en-US" dirty="0" smtClean="0"/>
+              <a:t>Entry, Exit, Reenter</a:t>
+            </a:r>
+          </a:p>
+          <a:p>
+            <a:r>
+              <a:rPr lang="en-US" dirty="0" smtClean="0"/>
+              <a:t>Automatically transition after an action</a:t>
+            </a:r>
+          </a:p>
+          <a:p>
+            <a:pPr lvl="1"/>
+            <a:r>
+              <a:rPr lang="en-US" dirty="0" err="1" smtClean="0"/>
+              <a:t>AutoForward</a:t>
+            </a:r>
+            <a:r>
+              <a:rPr lang="en-US" dirty="0" smtClean="0"/>
+              <a:t>/Fallback</a:t>
+            </a:r>
+          </a:p>
+          <a:p>
+            <a:r>
+              <a:rPr lang="en-US" dirty="0" smtClean="0"/>
+              <a:t>Dynamically define transitions at run time</a:t>
+            </a:r>
+          </a:p>
+          <a:p>
+            <a:r>
+              <a:rPr lang="en-US" dirty="0" smtClean="0"/>
+              <a:t>Derive workflow from code</a:t>
+            </a:r>
+          </a:p>
+          <a:p>
+            <a:pPr lvl="1"/>
+            <a:r>
+              <a:rPr lang="en-US" dirty="0" smtClean="0"/>
+              <a:t>Excel table</a:t>
+            </a:r>
+          </a:p>
+          <a:p>
+            <a:pPr lvl="1"/>
+            <a:r>
+              <a:rPr lang="en-US" dirty="0" smtClean="0"/>
+              <a:t>State diagram</a:t>
+            </a:r>
+          </a:p>
+          <a:p>
+            <a:r>
+              <a:rPr lang="en-US" dirty="0" smtClean="0"/>
+              <a:t>Available libraries…</a:t>
+            </a:r>
+          </a:p>
+          <a:p>
+            <a:r>
+              <a:rPr lang="en-US" dirty="0" smtClean="0"/>
+              <a:t>Note that “Actions” are frequently referred to as “triggers”, “events”, or “trigger events”</a:t>
+            </a:r>
             <a:endParaRPr lang="en-US" dirty="0"/>
           </a:p>
         </p:txBody>
@@ -7582,7 +7700,7 @@
     </p:spTree>
     <p:extLst>
       <p:ext uri="{BB962C8B-B14F-4D97-AF65-F5344CB8AC3E}">
-        <p14:creationId xmlns:p14="http://schemas.microsoft.com/office/powerpoint/2010/main" val="1352888777"/>
+        <p14:creationId xmlns:p14="http://schemas.microsoft.com/office/powerpoint/2010/main" val="3809142904"/>
       </p:ext>
     </p:extLst>
   </p:cSld>
@@ -7626,7 +7744,7 @@
           <a:p>
             <a:r>
               <a:rPr lang="en-US" dirty="0" smtClean="0"/>
-              <a:t>Exercise 3: implementation details</a:t>
+              <a:t>Exercise 3: sale state machine with library </a:t>
             </a:r>
             <a:endParaRPr lang="en-US" dirty="0"/>
           </a:p>
@@ -7647,14 +7765,64 @@
           <a:bodyPr/>
           <a:lstStyle/>
           <a:p>
-            <a:endParaRPr lang="en-US"/>
+            <a:r>
+              <a:rPr lang="en-US" dirty="0"/>
+              <a:t>Start from </a:t>
+            </a:r>
+            <a:r>
+              <a:rPr lang="en-US" dirty="0" smtClean="0"/>
+              <a:t>Exercise3_Initial\PointOfSaleStateManagement.sln</a:t>
+            </a:r>
+            <a:endParaRPr lang="en-US" dirty="0"/>
+          </a:p>
+          <a:p>
+            <a:pPr lvl="1"/>
+            <a:r>
+              <a:rPr lang="en-US" dirty="0" err="1" smtClean="0"/>
+              <a:t>NStateManager</a:t>
+            </a:r>
+            <a:r>
+              <a:rPr lang="en-US" dirty="0" smtClean="0"/>
+              <a:t> already loaded</a:t>
+            </a:r>
+          </a:p>
+          <a:p>
+            <a:r>
+              <a:rPr lang="en-US" dirty="0" smtClean="0"/>
+              <a:t>???Only </a:t>
+            </a:r>
+            <a:r>
+              <a:rPr lang="en-US" dirty="0"/>
+              <a:t>make changes to </a:t>
+            </a:r>
+            <a:r>
+              <a:rPr lang="en-US" dirty="0" err="1"/>
+              <a:t>Sale.cs</a:t>
+            </a:r>
+            <a:endParaRPr lang="en-US" dirty="0"/>
+          </a:p>
+          <a:p>
+            <a:pPr lvl="1"/>
+            <a:r>
+              <a:rPr lang="en-US" dirty="0"/>
+              <a:t>Skip the UI constraints</a:t>
+            </a:r>
+          </a:p>
+          <a:p>
+            <a:r>
+              <a:rPr lang="en-US" dirty="0"/>
+              <a:t>unit tests should pass when new rules implemented</a:t>
+            </a:r>
+          </a:p>
+          <a:p>
+            <a:endParaRPr lang="en-US" dirty="0"/>
           </a:p>
         </p:txBody>
       </p:sp>
     </p:spTree>
     <p:extLst>
       <p:ext uri="{BB962C8B-B14F-4D97-AF65-F5344CB8AC3E}">
-        <p14:creationId xmlns:p14="http://schemas.microsoft.com/office/powerpoint/2010/main" val="3948845357"/>
+        <p14:creationId xmlns:p14="http://schemas.microsoft.com/office/powerpoint/2010/main" val="1352888777"/>
       </p:ext>
     </p:extLst>
   </p:cSld>
@@ -7698,6 +7866,78 @@
           <a:p>
             <a:r>
               <a:rPr lang="en-US" dirty="0" smtClean="0"/>
+              <a:t>Exercise 3: implementation details</a:t>
+            </a:r>
+            <a:endParaRPr lang="en-US" dirty="0"/>
+          </a:p>
+        </p:txBody>
+      </p:sp>
+      <p:sp>
+        <p:nvSpPr>
+          <p:cNvPr id="3" name="Content Placeholder 2"/>
+          <p:cNvSpPr>
+            <a:spLocks noGrp="1"/>
+          </p:cNvSpPr>
+          <p:nvPr>
+            <p:ph idx="1"/>
+          </p:nvPr>
+        </p:nvSpPr>
+        <p:spPr/>
+        <p:txBody>
+          <a:bodyPr/>
+          <a:lstStyle/>
+          <a:p>
+            <a:endParaRPr lang="en-US"/>
+          </a:p>
+        </p:txBody>
+      </p:sp>
+    </p:spTree>
+    <p:extLst>
+      <p:ext uri="{BB962C8B-B14F-4D97-AF65-F5344CB8AC3E}">
+        <p14:creationId xmlns:p14="http://schemas.microsoft.com/office/powerpoint/2010/main" val="3948845357"/>
+      </p:ext>
+    </p:extLst>
+  </p:cSld>
+  <p:clrMapOvr>
+    <a:masterClrMapping/>
+  </p:clrMapOvr>
+</p:sld>
+</file>
+
+<file path=ppt/slides/slide24.xml><?xml version="1.0" encoding="utf-8"?>
+<p:sld xmlns:a="http://schemas.openxmlformats.org/drawingml/2006/main" xmlns:r="http://schemas.openxmlformats.org/officeDocument/2006/relationships" xmlns:p="http://schemas.openxmlformats.org/presentationml/2006/main">
+  <p:cSld>
+    <p:spTree>
+      <p:nvGrpSpPr>
+        <p:cNvPr id="1" name=""/>
+        <p:cNvGrpSpPr/>
+        <p:nvPr/>
+      </p:nvGrpSpPr>
+      <p:grpSpPr>
+        <a:xfrm>
+          <a:off x="0" y="0"/>
+          <a:ext cx="0" cy="0"/>
+          <a:chOff x="0" y="0"/>
+          <a:chExt cx="0" cy="0"/>
+        </a:xfrm>
+      </p:grpSpPr>
+      <p:sp>
+        <p:nvSpPr>
+          <p:cNvPr id="2" name="Title 1"/>
+          <p:cNvSpPr>
+            <a:spLocks noGrp="1"/>
+          </p:cNvSpPr>
+          <p:nvPr>
+            <p:ph type="title"/>
+          </p:nvPr>
+        </p:nvSpPr>
+        <p:spPr/>
+        <p:txBody>
+          <a:bodyPr/>
+          <a:lstStyle/>
+          <a:p>
+            <a:r>
+              <a:rPr lang="en-US" dirty="0" smtClean="0"/>
               <a:t>Exercise 3: retrospective</a:t>
             </a:r>
             <a:endParaRPr lang="en-US" dirty="0"/>
@@ -7746,7 +7986,7 @@
 </p:sld>
 </file>
 
-<file path=ppt/slides/slide24.xml><?xml version="1.0" encoding="utf-8"?>
+<file path=ppt/slides/slide25.xml><?xml version="1.0" encoding="utf-8"?>
 <p:sld xmlns:a="http://schemas.openxmlformats.org/drawingml/2006/main" xmlns:r="http://schemas.openxmlformats.org/officeDocument/2006/relationships" xmlns:p="http://schemas.openxmlformats.org/presentationml/2006/main">
   <p:cSld>
     <p:spTree>
@@ -7901,12 +8141,31 @@
           <a:p>
             <a:r>
               <a:rPr lang="en-US" dirty="0" smtClean="0"/>
-              <a:t>Latest Visual </a:t>
-            </a:r>
-            <a:r>
-              <a:rPr lang="en-US" dirty="0" smtClean="0"/>
-              <a:t>Studio 2019</a:t>
-            </a:r>
+              <a:t>Latest Visual Studio </a:t>
+            </a:r>
+            <a:r>
+              <a:rPr lang="en-US" dirty="0" smtClean="0"/>
+              <a:t>2019 with </a:t>
+            </a:r>
+            <a:r>
+              <a:rPr lang="en-US" b="1" dirty="0">
+                <a:effectLst/>
+              </a:rPr>
+              <a:t>ASP.NET and web development</a:t>
+            </a:r>
+            <a:r>
+              <a:rPr lang="en-US" dirty="0">
+                <a:effectLst/>
+              </a:rPr>
+              <a:t> </a:t>
+            </a:r>
+            <a:r>
+              <a:rPr lang="en-US" dirty="0" smtClean="0">
+                <a:effectLst/>
+              </a:rPr>
+              <a:t>module</a:t>
+            </a:r>
+            <a:endParaRPr lang="en-US" dirty="0" smtClean="0"/>
           </a:p>
           <a:p>
             <a:r>
@@ -7989,7 +8248,7 @@
         <p:spPr/>
         <p:txBody>
           <a:bodyPr>
-            <a:normAutofit fontScale="92500" lnSpcReduction="10000"/>
+            <a:normAutofit fontScale="85000" lnSpcReduction="20000"/>
           </a:bodyPr>
           <a:lstStyle/>
           <a:p>
@@ -8011,37 +8270,84 @@
             </a:r>
           </a:p>
           <a:p>
-            <a:pPr lvl="1"/>
-            <a:r>
-              <a:rPr lang="en-US" dirty="0" smtClean="0"/>
-              <a:t>Modify items: add, change quantity, delete</a:t>
-            </a:r>
-          </a:p>
-          <a:p>
-            <a:pPr lvl="1"/>
+            <a:pPr marL="800100" lvl="1" indent="-342900">
+              <a:buFont typeface="+mj-lt"/>
+              <a:buAutoNum type="arabicPeriod"/>
+            </a:pPr>
+            <a:r>
+              <a:rPr lang="en-US" dirty="0" smtClean="0"/>
+              <a:t>Modify </a:t>
+            </a:r>
+            <a:r>
+              <a:rPr lang="en-US" dirty="0" smtClean="0"/>
+              <a:t>items</a:t>
+            </a:r>
+          </a:p>
+          <a:p>
+            <a:pPr marL="1257300" lvl="2" indent="-342900">
+              <a:buFont typeface="+mj-lt"/>
+              <a:buAutoNum type="alphaLcPeriod"/>
+            </a:pPr>
+            <a:r>
+              <a:rPr lang="en-US" dirty="0" smtClean="0"/>
+              <a:t>Add</a:t>
+            </a:r>
+          </a:p>
+          <a:p>
+            <a:pPr marL="1257300" lvl="2" indent="-342900">
+              <a:buFont typeface="+mj-lt"/>
+              <a:buAutoNum type="alphaLcPeriod"/>
+            </a:pPr>
+            <a:r>
+              <a:rPr lang="en-US" dirty="0" smtClean="0"/>
+              <a:t>change quantity</a:t>
+            </a:r>
+          </a:p>
+          <a:p>
+            <a:pPr marL="1257300" lvl="2" indent="-342900">
+              <a:buFont typeface="+mj-lt"/>
+              <a:buAutoNum type="alphaLcPeriod"/>
+            </a:pPr>
+            <a:r>
+              <a:rPr lang="en-US" dirty="0" smtClean="0"/>
+              <a:t>delete</a:t>
+            </a:r>
+            <a:endParaRPr lang="en-US" dirty="0" smtClean="0"/>
+          </a:p>
+          <a:p>
+            <a:pPr marL="800100" lvl="1" indent="-342900">
+              <a:buFont typeface="+mj-lt"/>
+              <a:buAutoNum type="arabicPeriod"/>
+            </a:pPr>
             <a:r>
               <a:rPr lang="en-US" dirty="0" smtClean="0"/>
               <a:t>Accept payment</a:t>
             </a:r>
           </a:p>
           <a:p>
-            <a:pPr lvl="1"/>
-            <a:r>
-              <a:rPr lang="en-US" dirty="0" smtClean="0"/>
-              <a:t>Give change</a:t>
-            </a:r>
-          </a:p>
-          <a:p>
-            <a:r>
-              <a:rPr lang="en-US" dirty="0" smtClean="0"/>
-              <a:t>Demo…</a:t>
-            </a:r>
-          </a:p>
-          <a:p>
-            <a:r>
-              <a:rPr lang="en-US" dirty="0" smtClean="0"/>
-              <a:t>Review solution structure…</a:t>
-            </a:r>
+            <a:pPr marL="800100" lvl="1" indent="-342900">
+              <a:buFont typeface="+mj-lt"/>
+              <a:buAutoNum type="arabicPeriod"/>
+            </a:pPr>
+            <a:r>
+              <a:rPr lang="en-US" dirty="0" smtClean="0"/>
+              <a:t>Give </a:t>
+            </a:r>
+            <a:r>
+              <a:rPr lang="en-US" dirty="0" smtClean="0"/>
+              <a:t>change</a:t>
+            </a:r>
+          </a:p>
+          <a:p>
+            <a:pPr marL="800100" lvl="1" indent="-342900">
+              <a:buFont typeface="+mj-lt"/>
+              <a:buAutoNum type="arabicPeriod"/>
+            </a:pPr>
+            <a:r>
+              <a:rPr lang="en-US" dirty="0" smtClean="0"/>
+              <a:t>Start a new sale</a:t>
+            </a:r>
+            <a:endParaRPr lang="en-US" dirty="0" smtClean="0"/>
           </a:p>
         </p:txBody>
       </p:sp>
@@ -8092,7 +8398,7 @@
           <a:p>
             <a:r>
               <a:rPr lang="en-US" dirty="0" smtClean="0"/>
-              <a:t>Exercise 1: new rules</a:t>
+              <a:t>The solution</a:t>
             </a:r>
             <a:endParaRPr lang="en-US" dirty="0"/>
           </a:p>
@@ -8110,88 +8416,63 @@
         </p:nvSpPr>
         <p:spPr/>
         <p:txBody>
-          <a:bodyPr>
-            <a:normAutofit/>
-          </a:bodyPr>
-          <a:lstStyle/>
-          <a:p>
-            <a:pPr marL="457200" indent="-457200">
-              <a:buFont typeface="+mj-lt"/>
-              <a:buAutoNum type="arabicPeriod"/>
-            </a:pPr>
-            <a:r>
-              <a:rPr lang="en-US" dirty="0" smtClean="0"/>
-              <a:t>Can </a:t>
-            </a:r>
+          <a:bodyPr/>
+          <a:lstStyle/>
+          <a:p>
             <a:r>
               <a:rPr lang="en-US" dirty="0"/>
-              <a:t>only accept payment if balance &lt; </a:t>
-            </a:r>
-            <a:r>
-              <a:rPr lang="en-US" dirty="0" smtClean="0"/>
-              <a:t>0</a:t>
-            </a:r>
-          </a:p>
-          <a:p>
-            <a:pPr marL="457200" indent="-457200">
-              <a:buFont typeface="+mj-lt"/>
-              <a:buAutoNum type="arabicPeriod"/>
-            </a:pPr>
-            <a:r>
-              <a:rPr lang="en-US" dirty="0" smtClean="0"/>
-              <a:t>Can </a:t>
+              <a:t>Use Exercise1_Initial\PointOfSaleStateManagement.sln</a:t>
+            </a:r>
+          </a:p>
+          <a:p>
+            <a:endParaRPr lang="en-US" dirty="0" smtClean="0"/>
+          </a:p>
+          <a:p>
+            <a:r>
+              <a:rPr lang="en-US" dirty="0" smtClean="0"/>
+              <a:t>Demo</a:t>
             </a:r>
             <a:r>
               <a:rPr lang="en-US" dirty="0"/>
-              <a:t>only give change </a:t>
-            </a:r>
-            <a:r>
-              <a:rPr lang="en-US" dirty="0" smtClean="0"/>
-              <a:t>when balance &gt; 0</a:t>
-            </a:r>
-          </a:p>
-          <a:p>
-            <a:pPr marL="457200" indent="-457200">
-              <a:buFont typeface="+mj-lt"/>
-              <a:buAutoNum type="arabicPeriod"/>
-            </a:pPr>
-            <a:r>
-              <a:rPr lang="en-US" dirty="0" smtClean="0"/>
-              <a:t>No </a:t>
+              <a:t>…</a:t>
+            </a:r>
+          </a:p>
+          <a:p>
+            <a:endParaRPr lang="en-US" dirty="0" smtClean="0"/>
+          </a:p>
+          <a:p>
+            <a:r>
+              <a:rPr lang="en-US" dirty="0" smtClean="0"/>
+              <a:t>solution </a:t>
             </a:r>
             <a:r>
               <a:rPr lang="en-US" dirty="0"/>
-              <a:t>changes </a:t>
-            </a:r>
-            <a:r>
-              <a:rPr lang="en-US" dirty="0" smtClean="0"/>
-              <a:t>to paid sales</a:t>
-            </a:r>
-          </a:p>
-          <a:p>
-            <a:pPr lvl="1">
-              <a:buFont typeface="Wingdings" panose="05000000000000000000" pitchFamily="2" charset="2"/>
-              <a:buChar char="Ø"/>
-            </a:pPr>
-            <a:r>
-              <a:rPr lang="en-US" dirty="0" smtClean="0"/>
-              <a:t>Paid = 0 </a:t>
-            </a:r>
-            <a:r>
-              <a:rPr lang="en-US" dirty="0"/>
-              <a:t>balance, 1+ items, 1+ </a:t>
-            </a:r>
-            <a:r>
-              <a:rPr lang="en-US" dirty="0" smtClean="0"/>
-              <a:t>payments</a:t>
-            </a:r>
+              <a:t>structure</a:t>
+            </a:r>
+            <a:r>
+              <a:rPr lang="en-US" dirty="0" smtClean="0"/>
+              <a:t>…</a:t>
+            </a:r>
+          </a:p>
+          <a:p>
+            <a:endParaRPr lang="en-US" dirty="0"/>
+          </a:p>
+          <a:p>
+            <a:r>
+              <a:rPr lang="en-US" dirty="0" smtClean="0"/>
+              <a:t>Unit tests</a:t>
+            </a:r>
+            <a:endParaRPr lang="en-US" dirty="0"/>
+          </a:p>
+          <a:p>
+            <a:endParaRPr lang="en-US" dirty="0"/>
           </a:p>
         </p:txBody>
       </p:sp>
     </p:spTree>
     <p:extLst>
       <p:ext uri="{BB962C8B-B14F-4D97-AF65-F5344CB8AC3E}">
-        <p14:creationId xmlns:p14="http://schemas.microsoft.com/office/powerpoint/2010/main" val="1387114179"/>
+        <p14:creationId xmlns:p14="http://schemas.microsoft.com/office/powerpoint/2010/main" val="2868652422"/>
       </p:ext>
     </p:extLst>
   </p:cSld>
@@ -8235,7 +8516,7 @@
           <a:p>
             <a:r>
               <a:rPr lang="en-US" dirty="0" smtClean="0"/>
-              <a:t>Exercise 1: implementation details</a:t>
+              <a:t>Exercise 1: new rules</a:t>
             </a:r>
             <a:endParaRPr lang="en-US" dirty="0"/>
           </a:p>
@@ -8253,86 +8534,88 @@
         </p:nvSpPr>
         <p:spPr/>
         <p:txBody>
-          <a:bodyPr/>
-          <a:lstStyle/>
-          <a:p>
-            <a:r>
-              <a:rPr lang="en-US" dirty="0" smtClean="0"/>
-              <a:t>Use Exercise1_Initial\PointOfSaleStateManagement.sln</a:t>
-            </a:r>
-          </a:p>
-          <a:p>
-            <a:r>
-              <a:rPr lang="en-US" dirty="0" smtClean="0"/>
-              <a:t>Changes should go in Data\</a:t>
-            </a:r>
-            <a:r>
-              <a:rPr lang="en-US" dirty="0" err="1" smtClean="0"/>
-              <a:t>Sale.cs</a:t>
-            </a:r>
-            <a:r>
-              <a:rPr lang="en-US" dirty="0" smtClean="0"/>
-              <a:t> or create new classes to be used by </a:t>
-            </a:r>
-            <a:r>
-              <a:rPr lang="en-US" dirty="0" err="1" smtClean="0"/>
-              <a:t>Sale.cs</a:t>
-            </a:r>
-            <a:endParaRPr lang="en-US" dirty="0" smtClean="0"/>
-          </a:p>
-          <a:p>
-            <a:pPr lvl="1"/>
-            <a:r>
-              <a:rPr lang="en-US" dirty="0" smtClean="0"/>
-              <a:t>i.e. don’t </a:t>
+          <a:bodyPr>
+            <a:normAutofit/>
+          </a:bodyPr>
+          <a:lstStyle/>
+          <a:p>
+            <a:pPr marL="457200" indent="-457200">
+              <a:buFont typeface="+mj-lt"/>
+              <a:buAutoNum type="arabicPeriod" startAt="5"/>
+            </a:pPr>
+            <a:r>
+              <a:rPr lang="en-US" dirty="0" smtClean="0"/>
+              <a:t>Can </a:t>
             </a:r>
             <a:r>
               <a:rPr lang="en-US" dirty="0"/>
-              <a:t>implement rules in </a:t>
-            </a:r>
-            <a:r>
-              <a:rPr lang="en-US" dirty="0" smtClean="0"/>
-              <a:t>UI</a:t>
-            </a:r>
-          </a:p>
-          <a:p>
-            <a:r>
-              <a:rPr lang="en-US" dirty="0" smtClean="0"/>
-              <a:t>When rules are violated, return appropriate </a:t>
-            </a:r>
-            <a:r>
-              <a:rPr lang="en-US" dirty="0" err="1" smtClean="0"/>
-              <a:t>ActionResult</a:t>
-            </a:r>
-            <a:r>
-              <a:rPr lang="en-US" dirty="0" smtClean="0"/>
-              <a:t> </a:t>
-            </a:r>
-          </a:p>
-          <a:p>
-            <a:pPr lvl="1"/>
-            <a:r>
-              <a:rPr lang="en-US" dirty="0" err="1" smtClean="0"/>
-              <a:t>WasSuccess</a:t>
-            </a:r>
-            <a:r>
-              <a:rPr lang="en-US" dirty="0" smtClean="0"/>
-              <a:t> = false and an error message</a:t>
-            </a:r>
-          </a:p>
-          <a:p>
-            <a:r>
-              <a:rPr lang="en-US" dirty="0" smtClean="0"/>
-              <a:t>All unit tests should pass when new rules implemented</a:t>
-            </a:r>
-            <a:endParaRPr lang="en-US" dirty="0"/>
+              <a:t>only accept payment if balance &lt; </a:t>
+            </a:r>
+            <a:r>
+              <a:rPr lang="en-US" dirty="0" smtClean="0"/>
+              <a:t>0</a:t>
+            </a:r>
+          </a:p>
+          <a:p>
+            <a:pPr marL="457200" indent="-457200">
+              <a:buFont typeface="+mj-lt"/>
+              <a:buAutoNum type="arabicPeriod" startAt="5"/>
+            </a:pPr>
+            <a:r>
+              <a:rPr lang="en-US" dirty="0" smtClean="0"/>
+              <a:t>Can </a:t>
+            </a:r>
+            <a:r>
+              <a:rPr lang="en-US" dirty="0"/>
+              <a:t>only give change </a:t>
+            </a:r>
+            <a:r>
+              <a:rPr lang="en-US" dirty="0" smtClean="0"/>
+              <a:t>when balance &gt; 0</a:t>
+            </a:r>
+          </a:p>
+          <a:p>
+            <a:pPr marL="457200" indent="-457200">
+              <a:buFont typeface="+mj-lt"/>
+              <a:buAutoNum type="arabicPeriod" startAt="5"/>
+            </a:pPr>
+            <a:r>
+              <a:rPr lang="en-US" dirty="0" smtClean="0"/>
+              <a:t>No </a:t>
+            </a:r>
+            <a:r>
+              <a:rPr lang="en-US" dirty="0"/>
+              <a:t>changes </a:t>
+            </a:r>
+            <a:r>
+              <a:rPr lang="en-US" dirty="0" smtClean="0"/>
+              <a:t>to paid sales</a:t>
+            </a:r>
+          </a:p>
+          <a:p>
+            <a:pPr lvl="1">
+              <a:buFont typeface="Wingdings" panose="05000000000000000000" pitchFamily="2" charset="2"/>
+              <a:buChar char="Ø"/>
+            </a:pPr>
+            <a:r>
+              <a:rPr lang="en-US" dirty="0" smtClean="0"/>
+              <a:t>Paid = 0 </a:t>
+            </a:r>
+            <a:r>
+              <a:rPr lang="en-US" dirty="0"/>
+              <a:t>balance, 1+ items, 1+ </a:t>
+            </a:r>
+            <a:r>
+              <a:rPr lang="en-US" dirty="0" smtClean="0"/>
+              <a:t>payments</a:t>
+            </a:r>
           </a:p>
         </p:txBody>
       </p:sp>
     </p:spTree>
     <p:extLst>
       <p:ext uri="{BB962C8B-B14F-4D97-AF65-F5344CB8AC3E}">
-        <p14:creationId xmlns:p14="http://schemas.microsoft.com/office/powerpoint/2010/main" val="1609853759"/>
+        <p14:creationId xmlns:p14="http://schemas.microsoft.com/office/powerpoint/2010/main" val="1387114179"/>
       </p:ext>
     </p:extLst>
   </p:cSld>
@@ -8376,7 +8659,7 @@
           <a:p>
             <a:r>
               <a:rPr lang="en-US" dirty="0" smtClean="0"/>
-              <a:t>Exercise 1: new rules II</a:t>
+              <a:t>Exercise 1: implementation details</a:t>
             </a:r>
             <a:endParaRPr lang="en-US" dirty="0"/>
           </a:p>
@@ -8394,92 +8677,96 @@
         </p:nvSpPr>
         <p:spPr/>
         <p:txBody>
-          <a:bodyPr>
-            <a:normAutofit/>
-          </a:bodyPr>
-          <a:lstStyle/>
-          <a:p>
-            <a:pPr marL="457200" indent="-457200">
-              <a:buFont typeface="+mj-lt"/>
-              <a:buAutoNum type="arabicPeriod" startAt="4"/>
-            </a:pPr>
-            <a:r>
-              <a:rPr lang="en-US" dirty="0" smtClean="0"/>
-              <a:t>Need to be able to cancel a sale</a:t>
-            </a:r>
-          </a:p>
-          <a:p>
-            <a:pPr marL="800100" lvl="1" indent="-342900">
-              <a:buFont typeface="+mj-lt"/>
-              <a:buAutoNum type="alphaLcPeriod"/>
-            </a:pPr>
-            <a:r>
-              <a:rPr lang="en-US" dirty="0" smtClean="0"/>
-              <a:t>If payments on sale, must give change for total payment amounts before cancelling</a:t>
-            </a:r>
-          </a:p>
-          <a:p>
-            <a:pPr lvl="2">
-              <a:buFont typeface="Wingdings" panose="05000000000000000000" pitchFamily="2" charset="2"/>
-              <a:buChar char="Ø"/>
-            </a:pPr>
-            <a:r>
-              <a:rPr lang="en-US" dirty="0" smtClean="0"/>
-              <a:t>This negates rule 2: “</a:t>
+          <a:bodyPr/>
+          <a:lstStyle/>
+          <a:p>
+            <a:r>
+              <a:rPr lang="en-US" dirty="0" smtClean="0"/>
+              <a:t>Changes </a:t>
+            </a:r>
+            <a:r>
+              <a:rPr lang="en-US" dirty="0" smtClean="0"/>
+              <a:t>should go in Data\</a:t>
+            </a:r>
+            <a:r>
+              <a:rPr lang="en-US" dirty="0" err="1" smtClean="0"/>
+              <a:t>Sale.cs</a:t>
+            </a:r>
+            <a:r>
+              <a:rPr lang="en-US" dirty="0" smtClean="0"/>
+              <a:t> or create new classes to be used by </a:t>
+            </a:r>
+            <a:r>
+              <a:rPr lang="en-US" dirty="0" err="1" smtClean="0"/>
+              <a:t>Sale.cs</a:t>
+            </a:r>
+            <a:endParaRPr lang="en-US" dirty="0" smtClean="0"/>
+          </a:p>
+          <a:p>
+            <a:pPr lvl="1"/>
+            <a:r>
+              <a:rPr lang="en-US" dirty="0" smtClean="0"/>
+              <a:t>i.e. don’t </a:t>
             </a:r>
             <a:r>
               <a:rPr lang="en-US" dirty="0"/>
-              <a:t>Can only give change when balance &gt; </a:t>
-            </a:r>
-            <a:r>
-              <a:rPr lang="en-US" dirty="0" smtClean="0"/>
-              <a:t>0”</a:t>
-            </a:r>
-          </a:p>
-          <a:p>
-            <a:pPr marL="800100" lvl="1" indent="-342900">
-              <a:buFont typeface="+mj-lt"/>
-              <a:buAutoNum type="alphaLcPeriod"/>
-            </a:pPr>
-            <a:r>
-              <a:rPr lang="en-US" dirty="0" smtClean="0"/>
-              <a:t>No </a:t>
-            </a:r>
-            <a:r>
-              <a:rPr lang="en-US" dirty="0"/>
-              <a:t>changes to cancelled </a:t>
-            </a:r>
-            <a:r>
-              <a:rPr lang="en-US" dirty="0" smtClean="0"/>
-              <a:t>sales</a:t>
-            </a:r>
-          </a:p>
-          <a:p>
-            <a:pPr lvl="2">
-              <a:buFont typeface="Wingdings" panose="05000000000000000000" pitchFamily="2" charset="2"/>
-              <a:buChar char="Ø"/>
-            </a:pPr>
-            <a:r>
-              <a:rPr lang="en-US" dirty="0" smtClean="0"/>
-              <a:t>Can’t modify items, add payments, give change, or cancel</a:t>
-            </a:r>
-          </a:p>
-          <a:p>
-            <a:pPr marL="342900" indent="-342900">
-              <a:buFont typeface="+mj-lt"/>
-              <a:buAutoNum type="arabicPeriod" startAt="4"/>
-            </a:pPr>
-            <a:r>
-              <a:rPr lang="en-US" dirty="0" smtClean="0"/>
-              <a:t>Can’t create a new sale until current sale is paid or cancelled</a:t>
-            </a:r>
+              <a:t>implement rules in </a:t>
+            </a:r>
+            <a:r>
+              <a:rPr lang="en-US" dirty="0" smtClean="0"/>
+              <a:t>UI</a:t>
+            </a:r>
+          </a:p>
+          <a:p>
+            <a:pPr lvl="1"/>
+            <a:r>
+              <a:rPr lang="en-US" dirty="0" smtClean="0"/>
+              <a:t>Couple of unit tests will require small changes – marked as </a:t>
+            </a:r>
+            <a:r>
+              <a:rPr lang="en-US" b="1" i="1" dirty="0" smtClean="0"/>
+              <a:t>TODO</a:t>
+            </a:r>
+            <a:endParaRPr lang="en-US" b="1" i="1" dirty="0" smtClean="0"/>
+          </a:p>
+          <a:p>
+            <a:r>
+              <a:rPr lang="en-US" dirty="0" smtClean="0"/>
+              <a:t>When rules are violated, return appropriate </a:t>
+            </a:r>
+            <a:r>
+              <a:rPr lang="en-US" dirty="0" err="1" smtClean="0"/>
+              <a:t>ActionResult</a:t>
+            </a:r>
+            <a:r>
+              <a:rPr lang="en-US" dirty="0" smtClean="0"/>
+              <a:t> </a:t>
+            </a:r>
+          </a:p>
+          <a:p>
+            <a:pPr lvl="1"/>
+            <a:r>
+              <a:rPr lang="en-US" dirty="0" err="1" smtClean="0"/>
+              <a:t>WasSuccess</a:t>
+            </a:r>
+            <a:r>
+              <a:rPr lang="en-US" dirty="0" smtClean="0"/>
+              <a:t> = false and an error message</a:t>
+            </a:r>
+          </a:p>
+          <a:p>
+            <a:r>
+              <a:rPr lang="en-US" dirty="0" smtClean="0"/>
+              <a:t>All unit tests should pass when new rules implemented</a:t>
+            </a:r>
+            <a:endParaRPr lang="en-US" dirty="0"/>
           </a:p>
         </p:txBody>
       </p:sp>
     </p:spTree>
     <p:extLst>
       <p:ext uri="{BB962C8B-B14F-4D97-AF65-F5344CB8AC3E}">
-        <p14:creationId xmlns:p14="http://schemas.microsoft.com/office/powerpoint/2010/main" val="2363280830"/>
+        <p14:creationId xmlns:p14="http://schemas.microsoft.com/office/powerpoint/2010/main" val="1609853759"/>
       </p:ext>
     </p:extLst>
   </p:cSld>
@@ -8523,7 +8810,7 @@
           <a:p>
             <a:r>
               <a:rPr lang="en-US" dirty="0" smtClean="0"/>
-              <a:t>Exercise 1: Retrospective</a:t>
+              <a:t>Exercise 1: new rules II</a:t>
             </a:r>
             <a:endParaRPr lang="en-US" dirty="0"/>
           </a:p>
@@ -8542,89 +8829,118 @@
         <p:spPr/>
         <p:txBody>
           <a:bodyPr>
-            <a:normAutofit lnSpcReduction="10000"/>
+            <a:normAutofit/>
           </a:bodyPr>
           <a:lstStyle/>
           <a:p>
+            <a:pPr marL="457200" indent="-457200">
+              <a:buFont typeface="+mj-lt"/>
+              <a:buAutoNum type="arabicPeriod" startAt="8"/>
+            </a:pPr>
+            <a:r>
+              <a:rPr lang="en-US" dirty="0" smtClean="0"/>
+              <a:t>Need to be able to cancel a sale</a:t>
+            </a:r>
+          </a:p>
+          <a:p>
+            <a:pPr marL="800100" lvl="1" indent="-342900">
+              <a:buFont typeface="+mj-lt"/>
+              <a:buAutoNum type="alphaLcPeriod"/>
+            </a:pPr>
+            <a:r>
+              <a:rPr lang="en-US" dirty="0" smtClean="0"/>
+              <a:t>If payments on sale, must give change for total payment amounts before cancelling</a:t>
+            </a:r>
+          </a:p>
+          <a:p>
+            <a:pPr lvl="2">
+              <a:buFont typeface="Wingdings" panose="05000000000000000000" pitchFamily="2" charset="2"/>
+              <a:buChar char="Ø"/>
+            </a:pPr>
+            <a:r>
+              <a:rPr lang="en-US" dirty="0" smtClean="0"/>
+              <a:t>This negates rule 2: “</a:t>
+            </a:r>
             <a:r>
               <a:rPr lang="en-US" dirty="0"/>
-              <a:t>Need to </a:t>
-            </a:r>
-            <a:r>
-              <a:rPr lang="en-US" dirty="0" smtClean="0"/>
-              <a:t>recognize when state machine is needed</a:t>
-            </a:r>
-          </a:p>
-          <a:p>
-            <a:pPr lvl="1"/>
-            <a:r>
-              <a:rPr lang="en-US" dirty="0" smtClean="0"/>
-              <a:t>i.e. managing behavior/actions based on current state</a:t>
-            </a:r>
-          </a:p>
-          <a:p>
-            <a:pPr lvl="1"/>
-            <a:r>
-              <a:rPr lang="en-US" dirty="0" smtClean="0"/>
-              <a:t>Usually not presented as state management by product owners</a:t>
-            </a:r>
-          </a:p>
-          <a:p>
-            <a:pPr lvl="1"/>
-            <a:r>
-              <a:rPr lang="en-US" dirty="0" smtClean="0"/>
-              <a:t>Initially simple rules frequently grow complex over time</a:t>
-            </a:r>
-          </a:p>
-          <a:p>
-            <a:r>
-              <a:rPr lang="en-US" dirty="0" smtClean="0"/>
-              <a:t>Naïve </a:t>
+              <a:t>Can only give change when balance &gt; </a:t>
+            </a:r>
+            <a:r>
+              <a:rPr lang="en-US" dirty="0" smtClean="0"/>
+              <a:t>0”</a:t>
+            </a:r>
+          </a:p>
+          <a:p>
+            <a:pPr marL="800100" lvl="1" indent="-342900">
+              <a:buFont typeface="+mj-lt"/>
+              <a:buAutoNum type="alphaLcPeriod"/>
+            </a:pPr>
+            <a:r>
+              <a:rPr lang="en-US" dirty="0" smtClean="0"/>
+              <a:t>No </a:t>
             </a:r>
             <a:r>
               <a:rPr lang="en-US" dirty="0"/>
-              <a:t>state machine implementations can become </a:t>
-            </a:r>
-            <a:r>
-              <a:rPr lang="en-US" dirty="0" smtClean="0"/>
-              <a:t>complex</a:t>
-            </a:r>
-          </a:p>
-          <a:p>
-            <a:pPr lvl="1"/>
-            <a:r>
-              <a:rPr lang="en-US" dirty="0" smtClean="0"/>
-              <a:t>Multiple Boolean flags, IF (&lt;</a:t>
+              <a:t>changes to cancelled </a:t>
+            </a:r>
+            <a:r>
+              <a:rPr lang="en-US" dirty="0" smtClean="0"/>
+              <a:t>sales</a:t>
+            </a:r>
+          </a:p>
+          <a:p>
+            <a:pPr lvl="2">
+              <a:buFont typeface="Wingdings" panose="05000000000000000000" pitchFamily="2" charset="2"/>
+              <a:buChar char="Ø"/>
+            </a:pPr>
+            <a:r>
+              <a:rPr lang="en-US" dirty="0" smtClean="0"/>
+              <a:t>Can’t modify items, add payments, give change, or cancel</a:t>
+            </a:r>
+          </a:p>
+          <a:p>
+            <a:pPr marL="342900" indent="-342900">
+              <a:buFont typeface="+mj-lt"/>
+              <a:buAutoNum type="arabicPeriod" startAt="8"/>
+            </a:pPr>
+            <a:r>
+              <a:rPr lang="en-US" dirty="0" smtClean="0"/>
+              <a:t>Can’t create a new sale until current sale is paid or </a:t>
+            </a:r>
+            <a:r>
+              <a:rPr lang="en-US" dirty="0" smtClean="0"/>
+              <a:t>cancelled</a:t>
+            </a:r>
+          </a:p>
+          <a:p>
+            <a:r>
+              <a:rPr lang="en-US" dirty="0" smtClean="0"/>
+              <a:t>Implementation note: Set </a:t>
             </a:r>
             <a:r>
               <a:rPr lang="en-US" dirty="0" err="1" smtClean="0"/>
-              <a:t>currentState</a:t>
-            </a:r>
-            <a:r>
-              <a:rPr lang="en-US" dirty="0" smtClean="0"/>
-              <a:t>&gt;) {…}, switch statements, etc.</a:t>
-            </a:r>
-          </a:p>
-          <a:p>
-            <a:pPr lvl="1"/>
-            <a:r>
-              <a:rPr lang="en-US" dirty="0" smtClean="0"/>
-              <a:t>Frequently violate Single Responsibility and Open/Closed principles</a:t>
-            </a:r>
-          </a:p>
-          <a:p>
-            <a:r>
-              <a:rPr lang="en-US" dirty="0" smtClean="0"/>
-              <a:t>Exercise1_Final\PointOfSaleStateManagement.sln is my version of this exercise</a:t>
-            </a:r>
-            <a:endParaRPr lang="en-US" dirty="0"/>
+              <a:t>Index.cs</a:t>
+            </a:r>
+            <a:r>
+              <a:rPr lang="en-US" dirty="0" smtClean="0"/>
+              <a:t>/</a:t>
+            </a:r>
+            <a:r>
+              <a:rPr lang="en-US" dirty="0" err="1" smtClean="0"/>
+              <a:t>IncludeCancel</a:t>
+            </a:r>
+            <a:r>
+              <a:rPr lang="en-US" dirty="0" smtClean="0"/>
+              <a:t> = true</a:t>
+            </a:r>
+            <a:endParaRPr lang="en-US" dirty="0" smtClean="0"/>
           </a:p>
         </p:txBody>
       </p:sp>
     </p:spTree>
     <p:extLst>
       <p:ext uri="{BB962C8B-B14F-4D97-AF65-F5344CB8AC3E}">
-        <p14:creationId xmlns:p14="http://schemas.microsoft.com/office/powerpoint/2010/main" val="2941040360"/>
+        <p14:creationId xmlns:p14="http://schemas.microsoft.com/office/powerpoint/2010/main" val="2363280830"/>
       </p:ext>
     </p:extLst>
   </p:cSld>
@@ -8668,7 +8984,7 @@
           <a:p>
             <a:r>
               <a:rPr lang="en-US" dirty="0" smtClean="0"/>
-              <a:t>Lesson 1: recognize state based behavior</a:t>
+              <a:t>Exercise 1: Retrospective</a:t>
             </a:r>
             <a:endParaRPr lang="en-US" dirty="0"/>
           </a:p>
@@ -8687,183 +9003,89 @@
         <p:spPr/>
         <p:txBody>
           <a:bodyPr>
-            <a:normAutofit fontScale="40000" lnSpcReduction="20000"/>
+            <a:normAutofit lnSpcReduction="10000"/>
           </a:bodyPr>
           <a:lstStyle/>
           <a:p>
             <a:r>
-              <a:rPr lang="en-US" dirty="0" smtClean="0"/>
-              <a:t>Very frequent pattern</a:t>
-            </a:r>
-          </a:p>
-          <a:p>
-            <a:r>
-              <a:rPr lang="en-US" dirty="0" smtClean="0"/>
-              <a:t>Requirement/story language</a:t>
+              <a:rPr lang="en-US" dirty="0"/>
+              <a:t>Need to </a:t>
+            </a:r>
+            <a:r>
+              <a:rPr lang="en-US" dirty="0" smtClean="0"/>
+              <a:t>recognize when state machine is needed</a:t>
             </a:r>
           </a:p>
           <a:p>
             <a:pPr lvl="1"/>
             <a:r>
               <a:rPr lang="en-US" dirty="0" smtClean="0"/>
-              <a:t>“Only accept </a:t>
+              <a:t>i.e. managing behavior/actions based on current state</a:t>
+            </a:r>
+          </a:p>
+          <a:p>
+            <a:pPr lvl="1"/>
+            <a:r>
+              <a:rPr lang="en-US" dirty="0" smtClean="0"/>
+              <a:t>Usually not presented as state management by product owners</a:t>
+            </a:r>
+          </a:p>
+          <a:p>
+            <a:pPr lvl="1"/>
+            <a:r>
+              <a:rPr lang="en-US" dirty="0" smtClean="0"/>
+              <a:t>Initially simple rules frequently grow complex over time</a:t>
+            </a:r>
+          </a:p>
+          <a:p>
+            <a:r>
+              <a:rPr lang="en-US" dirty="0" smtClean="0"/>
+              <a:t>Naïve </a:t>
             </a:r>
             <a:r>
               <a:rPr lang="en-US" dirty="0"/>
-              <a:t>payment if balance &lt; </a:t>
-            </a:r>
-            <a:r>
-              <a:rPr lang="en-US" dirty="0" smtClean="0"/>
-              <a:t>0”</a:t>
+              <a:t>state machine implementations can become </a:t>
+            </a:r>
+            <a:r>
+              <a:rPr lang="en-US" dirty="0" smtClean="0"/>
+              <a:t>complex</a:t>
             </a:r>
           </a:p>
           <a:p>
             <a:pPr lvl="1"/>
             <a:r>
               <a:rPr lang="en-US" dirty="0" smtClean="0"/>
-              <a:t>“</a:t>
-            </a:r>
-            <a:r>
-              <a:rPr lang="en-US" dirty="0"/>
-              <a:t>only give change when balance &gt; </a:t>
-            </a:r>
-            <a:r>
-              <a:rPr lang="en-US" dirty="0" smtClean="0"/>
-              <a:t>0”</a:t>
+              <a:t>Multiple Boolean flags, IF (&lt;</a:t>
+            </a:r>
+            <a:r>
+              <a:rPr lang="en-US" dirty="0" err="1" smtClean="0"/>
+              <a:t>currentState</a:t>
+            </a:r>
+            <a:r>
+              <a:rPr lang="en-US" dirty="0" smtClean="0"/>
+              <a:t>&gt;) {…}, switch statements, etc.</a:t>
             </a:r>
           </a:p>
           <a:p>
             <a:pPr lvl="1"/>
             <a:r>
               <a:rPr lang="en-US" dirty="0" smtClean="0"/>
-              <a:t>“</a:t>
-            </a:r>
-            <a:r>
-              <a:rPr lang="en-US" dirty="0"/>
-              <a:t>No changes to </a:t>
-            </a:r>
-            <a:r>
-              <a:rPr lang="en-US" dirty="0" smtClean="0"/>
-              <a:t>paid sales”</a:t>
-            </a:r>
-          </a:p>
-          <a:p>
-            <a:pPr lvl="1"/>
-            <a:r>
-              <a:rPr lang="en-US" dirty="0" smtClean="0"/>
-              <a:t>“</a:t>
-            </a:r>
-            <a:r>
-              <a:rPr lang="en-US" dirty="0"/>
-              <a:t>No changes to cancelled </a:t>
-            </a:r>
-            <a:r>
-              <a:rPr lang="en-US" dirty="0" smtClean="0"/>
-              <a:t>sale”</a:t>
-            </a:r>
-          </a:p>
-          <a:p>
-            <a:r>
-              <a:rPr lang="en-US" dirty="0" smtClean="0"/>
-              <a:t>Code</a:t>
-            </a:r>
-          </a:p>
-          <a:p>
-            <a:pPr lvl="1"/>
-            <a:r>
-              <a:rPr lang="en-US" dirty="0" smtClean="0"/>
-              <a:t>Mutually exclusive Boolean flags</a:t>
-            </a:r>
-          </a:p>
-          <a:p>
-            <a:pPr lvl="2"/>
-            <a:r>
-              <a:rPr lang="en-US" dirty="0" err="1" smtClean="0"/>
-              <a:t>isOpen</a:t>
-            </a:r>
-            <a:endParaRPr lang="en-US" dirty="0" smtClean="0"/>
-          </a:p>
-          <a:p>
-            <a:pPr lvl="2"/>
-            <a:r>
-              <a:rPr lang="en-US" dirty="0" err="1" smtClean="0"/>
-              <a:t>isOverpaid</a:t>
-            </a:r>
-            <a:endParaRPr lang="en-US" dirty="0" smtClean="0"/>
-          </a:p>
-          <a:p>
-            <a:pPr lvl="2"/>
-            <a:r>
-              <a:rPr lang="en-US" dirty="0" err="1" smtClean="0"/>
-              <a:t>IsPaid</a:t>
-            </a:r>
-            <a:endParaRPr lang="en-US" dirty="0" smtClean="0"/>
-          </a:p>
-          <a:p>
-            <a:pPr lvl="2"/>
-            <a:r>
-              <a:rPr lang="en-US" dirty="0" err="1" smtClean="0"/>
-              <a:t>isCancelled</a:t>
-            </a:r>
-            <a:endParaRPr lang="en-US" dirty="0" smtClean="0"/>
-          </a:p>
-          <a:p>
-            <a:pPr lvl="1"/>
-            <a:r>
-              <a:rPr lang="en-US" dirty="0" smtClean="0"/>
-              <a:t>Repeated checks for state before actions</a:t>
-            </a:r>
-          </a:p>
-          <a:p>
-            <a:pPr lvl="2"/>
-            <a:r>
-              <a:rPr lang="en-US" dirty="0" smtClean="0"/>
-              <a:t>If (&lt;</a:t>
-            </a:r>
-            <a:r>
-              <a:rPr lang="en-US" dirty="0" err="1" smtClean="0"/>
-              <a:t>objectState</a:t>
-            </a:r>
-            <a:r>
-              <a:rPr lang="en-US" dirty="0" smtClean="0"/>
-              <a:t>&gt;) {…}</a:t>
-            </a:r>
-          </a:p>
-          <a:p>
-            <a:pPr lvl="2"/>
-            <a:r>
-              <a:rPr lang="en-US" dirty="0" smtClean="0"/>
-              <a:t>Switch (&lt;</a:t>
-            </a:r>
-            <a:r>
-              <a:rPr lang="en-US" dirty="0" err="1" smtClean="0"/>
-              <a:t>objectState</a:t>
-            </a:r>
-            <a:r>
-              <a:rPr lang="en-US" dirty="0" smtClean="0"/>
-              <a:t>&gt;) {...&lt;</a:t>
-            </a:r>
-            <a:r>
-              <a:rPr lang="en-US" dirty="0" err="1" smtClean="0"/>
-              <a:t>doSomething</a:t>
-            </a:r>
-            <a:r>
-              <a:rPr lang="en-US" dirty="0" smtClean="0"/>
-              <a:t>&gt;…}</a:t>
-            </a:r>
-          </a:p>
-          <a:p>
-            <a:r>
-              <a:rPr lang="en-US" dirty="0" smtClean="0"/>
-              <a:t>Once you realize you need a state machine, next step is to create a state diagram</a:t>
-            </a:r>
+              <a:t>Frequently violate Single Responsibility and Open/Closed principles</a:t>
+            </a:r>
+          </a:p>
+          <a:p>
+            <a:r>
+              <a:rPr lang="en-US" dirty="0" smtClean="0"/>
+              <a:t>Exercise1_Final\PointOfSaleStateManagement.sln is my version of this exercise</a:t>
+            </a:r>
+            <a:endParaRPr lang="en-US" dirty="0"/>
           </a:p>
         </p:txBody>
       </p:sp>
     </p:spTree>
     <p:extLst>
       <p:ext uri="{BB962C8B-B14F-4D97-AF65-F5344CB8AC3E}">
-        <p14:creationId xmlns:p14="http://schemas.microsoft.com/office/powerpoint/2010/main" val="2544707152"/>
+        <p14:creationId xmlns:p14="http://schemas.microsoft.com/office/powerpoint/2010/main" val="2941040360"/>
       </p:ext>
     </p:extLst>
   </p:cSld>

</xml_diff>

<commit_message>
Completed Exercise 1 solution, updated unit tests, and made other minor fixes along the way.
</commit_message>
<xml_diff>
--- a/DotNetStateMachines.pptx
+++ b/DotNetStateMachines.pptx
@@ -350,7 +350,7 @@
             <a:fld id="{B61BEF0D-F0BB-DE4B-95CE-6DB70DBA9567}" type="datetimeFigureOut">
               <a:rPr lang="en-US" dirty="0"/>
               <a:pPr/>
-              <a:t>8/28/2020</a:t>
+              <a:t>8/29/2020</a:t>
             </a:fld>
             <a:endParaRPr lang="en-US" dirty="0"/>
           </a:p>
@@ -638,7 +638,7 @@
             <a:fld id="{B61BEF0D-F0BB-DE4B-95CE-6DB70DBA9567}" type="datetimeFigureOut">
               <a:rPr lang="en-US" dirty="0"/>
               <a:pPr/>
-              <a:t>8/28/2020</a:t>
+              <a:t>8/29/2020</a:t>
             </a:fld>
             <a:endParaRPr lang="en-US" dirty="0"/>
           </a:p>
@@ -894,7 +894,7 @@
             <a:fld id="{B61BEF0D-F0BB-DE4B-95CE-6DB70DBA9567}" type="datetimeFigureOut">
               <a:rPr lang="en-US" dirty="0"/>
               <a:pPr/>
-              <a:t>8/28/2020</a:t>
+              <a:t>8/29/2020</a:t>
             </a:fld>
             <a:endParaRPr lang="en-US" dirty="0"/>
           </a:p>
@@ -1360,7 +1360,7 @@
             <a:fld id="{B61BEF0D-F0BB-DE4B-95CE-6DB70DBA9567}" type="datetimeFigureOut">
               <a:rPr lang="en-US" dirty="0"/>
               <a:pPr/>
-              <a:t>8/28/2020</a:t>
+              <a:t>8/29/2020</a:t>
             </a:fld>
             <a:endParaRPr lang="en-US" dirty="0"/>
           </a:p>
@@ -1537,7 +1537,7 @@
             <a:fld id="{B61BEF0D-F0BB-DE4B-95CE-6DB70DBA9567}" type="datetimeFigureOut">
               <a:rPr lang="en-US" dirty="0"/>
               <a:pPr/>
-              <a:t>8/28/2020</a:t>
+              <a:t>8/29/2020</a:t>
             </a:fld>
             <a:endParaRPr lang="en-US" dirty="0"/>
           </a:p>
@@ -2110,7 +2110,7 @@
             <a:fld id="{B61BEF0D-F0BB-DE4B-95CE-6DB70DBA9567}" type="datetimeFigureOut">
               <a:rPr lang="en-US" dirty="0"/>
               <a:pPr/>
-              <a:t>8/28/2020</a:t>
+              <a:t>8/29/2020</a:t>
             </a:fld>
             <a:endParaRPr lang="en-US" dirty="0"/>
           </a:p>
@@ -2439,7 +2439,7 @@
             <a:fld id="{B61BEF0D-F0BB-DE4B-95CE-6DB70DBA9567}" type="datetimeFigureOut">
               <a:rPr lang="en-US" dirty="0"/>
               <a:pPr/>
-              <a:t>8/28/2020</a:t>
+              <a:t>8/29/2020</a:t>
             </a:fld>
             <a:endParaRPr lang="en-US" dirty="0"/>
           </a:p>
@@ -2611,7 +2611,7 @@
             <a:fld id="{B61BEF0D-F0BB-DE4B-95CE-6DB70DBA9567}" type="datetimeFigureOut">
               <a:rPr lang="en-US" dirty="0"/>
               <a:pPr/>
-              <a:t>8/28/2020</a:t>
+              <a:t>8/29/2020</a:t>
             </a:fld>
             <a:endParaRPr lang="en-US" dirty="0"/>
           </a:p>
@@ -2788,7 +2788,7 @@
             <a:fld id="{B61BEF0D-F0BB-DE4B-95CE-6DB70DBA9567}" type="datetimeFigureOut">
               <a:rPr lang="en-US" dirty="0"/>
               <a:pPr/>
-              <a:t>8/28/2020</a:t>
+              <a:t>8/29/2020</a:t>
             </a:fld>
             <a:endParaRPr lang="en-US" dirty="0"/>
           </a:p>
@@ -2955,7 +2955,7 @@
             <a:fld id="{B61BEF0D-F0BB-DE4B-95CE-6DB70DBA9567}" type="datetimeFigureOut">
               <a:rPr lang="en-US" dirty="0"/>
               <a:pPr/>
-              <a:t>8/28/2020</a:t>
+              <a:t>8/29/2020</a:t>
             </a:fld>
             <a:endParaRPr lang="en-US" dirty="0"/>
           </a:p>
@@ -3209,7 +3209,7 @@
             <a:fld id="{B61BEF0D-F0BB-DE4B-95CE-6DB70DBA9567}" type="datetimeFigureOut">
               <a:rPr lang="en-US" dirty="0"/>
               <a:pPr/>
-              <a:t>8/28/2020</a:t>
+              <a:t>8/29/2020</a:t>
             </a:fld>
             <a:endParaRPr lang="en-US" dirty="0"/>
           </a:p>
@@ -3498,7 +3498,7 @@
             <a:fld id="{B61BEF0D-F0BB-DE4B-95CE-6DB70DBA9567}" type="datetimeFigureOut">
               <a:rPr lang="en-US" dirty="0"/>
               <a:pPr/>
-              <a:t>8/28/2020</a:t>
+              <a:t>8/29/2020</a:t>
             </a:fld>
             <a:endParaRPr lang="en-US" dirty="0"/>
           </a:p>
@@ -3925,7 +3925,7 @@
             <a:fld id="{B61BEF0D-F0BB-DE4B-95CE-6DB70DBA9567}" type="datetimeFigureOut">
               <a:rPr lang="en-US" dirty="0"/>
               <a:pPr/>
-              <a:t>8/28/2020</a:t>
+              <a:t>8/29/2020</a:t>
             </a:fld>
             <a:endParaRPr lang="en-US" dirty="0"/>
           </a:p>
@@ -4040,7 +4040,7 @@
             <a:fld id="{B61BEF0D-F0BB-DE4B-95CE-6DB70DBA9567}" type="datetimeFigureOut">
               <a:rPr lang="en-US" dirty="0"/>
               <a:pPr/>
-              <a:t>8/28/2020</a:t>
+              <a:t>8/29/2020</a:t>
             </a:fld>
             <a:endParaRPr lang="en-US" dirty="0"/>
           </a:p>
@@ -4132,7 +4132,7 @@
             <a:fld id="{B61BEF0D-F0BB-DE4B-95CE-6DB70DBA9567}" type="datetimeFigureOut">
               <a:rPr lang="en-US" dirty="0"/>
               <a:pPr/>
-              <a:t>8/28/2020</a:t>
+              <a:t>8/29/2020</a:t>
             </a:fld>
             <a:endParaRPr lang="en-US" dirty="0"/>
           </a:p>
@@ -4412,7 +4412,7 @@
             <a:fld id="{B61BEF0D-F0BB-DE4B-95CE-6DB70DBA9567}" type="datetimeFigureOut">
               <a:rPr lang="en-US" dirty="0"/>
               <a:pPr/>
-              <a:t>8/28/2020</a:t>
+              <a:t>8/29/2020</a:t>
             </a:fld>
             <a:endParaRPr lang="en-US" dirty="0"/>
           </a:p>
@@ -4700,7 +4700,7 @@
             <a:fld id="{B61BEF0D-F0BB-DE4B-95CE-6DB70DBA9567}" type="datetimeFigureOut">
               <a:rPr lang="en-US" dirty="0"/>
               <a:pPr/>
-              <a:t>8/28/2020</a:t>
+              <a:t>8/29/2020</a:t>
             </a:fld>
             <a:endParaRPr lang="en-US" dirty="0"/>
           </a:p>
@@ -4928,7 +4928,7 @@
             <a:fld id="{B61BEF0D-F0BB-DE4B-95CE-6DB70DBA9567}" type="datetimeFigureOut">
               <a:rPr lang="en-US" dirty="0"/>
               <a:pPr/>
-              <a:t>8/28/2020</a:t>
+              <a:t>8/29/2020</a:t>
             </a:fld>
             <a:endParaRPr lang="en-US" dirty="0"/>
           </a:p>
@@ -8141,11 +8141,7 @@
           <a:p>
             <a:r>
               <a:rPr lang="en-US" dirty="0" smtClean="0"/>
-              <a:t>Latest Visual Studio </a:t>
-            </a:r>
-            <a:r>
-              <a:rPr lang="en-US" dirty="0" smtClean="0"/>
-              <a:t>2019 with </a:t>
+              <a:t>Latest Visual Studio 2019 with </a:t>
             </a:r>
             <a:r>
               <a:rPr lang="en-US" b="1" dirty="0">
@@ -8276,11 +8272,7 @@
             </a:pPr>
             <a:r>
               <a:rPr lang="en-US" dirty="0" smtClean="0"/>
-              <a:t>Modify </a:t>
-            </a:r>
-            <a:r>
-              <a:rPr lang="en-US" dirty="0" smtClean="0"/>
-              <a:t>items</a:t>
+              <a:t>Modify items</a:t>
             </a:r>
           </a:p>
           <a:p>
@@ -8312,7 +8304,6 @@
               <a:rPr lang="en-US" dirty="0" smtClean="0"/>
               <a:t>delete</a:t>
             </a:r>
-            <a:endParaRPr lang="en-US" dirty="0" smtClean="0"/>
           </a:p>
           <a:p>
             <a:pPr marL="800100" lvl="1" indent="-342900">
@@ -8331,11 +8322,7 @@
             </a:pPr>
             <a:r>
               <a:rPr lang="en-US" dirty="0" smtClean="0"/>
-              <a:t>Give </a:t>
-            </a:r>
-            <a:r>
-              <a:rPr lang="en-US" dirty="0" smtClean="0"/>
-              <a:t>change</a:t>
+              <a:t>Give change</a:t>
             </a:r>
           </a:p>
           <a:p>
@@ -8347,7 +8334,6 @@
               <a:rPr lang="en-US" dirty="0" smtClean="0"/>
               <a:t>Start a new sale</a:t>
             </a:r>
-            <a:endParaRPr lang="en-US" dirty="0" smtClean="0"/>
           </a:p>
         </p:txBody>
       </p:sp>
@@ -8416,7 +8402,9 @@
         </p:nvSpPr>
         <p:spPr/>
         <p:txBody>
-          <a:bodyPr/>
+          <a:bodyPr>
+            <a:normAutofit fontScale="92500" lnSpcReduction="20000"/>
+          </a:bodyPr>
           <a:lstStyle/>
           <a:p>
             <a:r>
@@ -8433,9 +8421,17 @@
               <a:t>Demo</a:t>
             </a:r>
             <a:r>
-              <a:rPr lang="en-US" dirty="0"/>
+              <a:rPr lang="en-US" dirty="0" smtClean="0"/>
               <a:t>…</a:t>
             </a:r>
+          </a:p>
+          <a:p>
+            <a:pPr lvl="1"/>
+            <a:r>
+              <a:rPr lang="en-US" dirty="0" smtClean="0"/>
+              <a:t>Logging</a:t>
+            </a:r>
+            <a:endParaRPr lang="en-US" dirty="0"/>
           </a:p>
           <a:p>
             <a:endParaRPr lang="en-US" dirty="0" smtClean="0"/>
@@ -8677,8 +8673,20 @@
         </p:nvSpPr>
         <p:spPr/>
         <p:txBody>
-          <a:bodyPr/>
-          <a:lstStyle/>
+          <a:bodyPr>
+            <a:normAutofit fontScale="92500" lnSpcReduction="10000"/>
+          </a:bodyPr>
+          <a:lstStyle/>
+          <a:p>
+            <a:r>
+              <a:rPr lang="en-US" dirty="0" smtClean="0"/>
+              <a:t>Rules </a:t>
+            </a:r>
+            <a:r>
+              <a:rPr lang="en-US" smtClean="0"/>
+              <a:t>in Rules.txt</a:t>
+            </a:r>
+          </a:p>
           <a:p>
             <a:r>
               <a:rPr lang="en-US" dirty="0" smtClean="0"/>
@@ -8727,7 +8735,6 @@
               <a:rPr lang="en-US" b="1" i="1" dirty="0" smtClean="0"/>
               <a:t>TODO</a:t>
             </a:r>
-            <a:endParaRPr lang="en-US" b="1" i="1" dirty="0" smtClean="0"/>
           </a:p>
           <a:p>
             <a:r>
@@ -8746,13 +8753,40 @@
           <a:p>
             <a:pPr lvl="1"/>
             <a:r>
+              <a:rPr lang="en-US" dirty="0" err="1"/>
+              <a:t>I</a:t>
+            </a:r>
+            <a:r>
               <a:rPr lang="en-US" dirty="0" err="1" smtClean="0"/>
-              <a:t>WasSuccess</a:t>
-            </a:r>
-            <a:r>
-              <a:rPr lang="en-US" dirty="0" smtClean="0"/>
-              <a:t> = false and an error message</a:t>
-            </a:r>
+              <a:t>sSuccess</a:t>
+            </a:r>
+            <a:r>
+              <a:rPr lang="en-US" dirty="0" smtClean="0"/>
+              <a:t> </a:t>
+            </a:r>
+            <a:r>
+              <a:rPr lang="en-US" dirty="0" smtClean="0"/>
+              <a:t>= false and an error </a:t>
+            </a:r>
+            <a:r>
+              <a:rPr lang="en-US" dirty="0" smtClean="0"/>
+              <a:t>message</a:t>
+            </a:r>
+          </a:p>
+          <a:p>
+            <a:r>
+              <a:rPr lang="en-US" dirty="0" smtClean="0"/>
+              <a:t>Be sure to address all </a:t>
+            </a:r>
+            <a:r>
+              <a:rPr lang="en-US" b="1" i="1" dirty="0" smtClean="0"/>
+              <a:t>TODO</a:t>
+            </a:r>
+            <a:r>
+              <a:rPr lang="en-US" dirty="0" smtClean="0"/>
+              <a:t>s</a:t>
+            </a:r>
+            <a:endParaRPr lang="en-US" dirty="0" smtClean="0"/>
           </a:p>
           <a:p>
             <a:r>
@@ -8905,11 +8939,7 @@
             </a:pPr>
             <a:r>
               <a:rPr lang="en-US" dirty="0" smtClean="0"/>
-              <a:t>Can’t create a new sale until current sale is paid or </a:t>
-            </a:r>
-            <a:r>
-              <a:rPr lang="en-US" dirty="0" smtClean="0"/>
-              <a:t>cancelled</a:t>
+              <a:t>Can’t create a new sale until current sale is paid or cancelled</a:t>
             </a:r>
           </a:p>
           <a:p>
@@ -8933,7 +8963,6 @@
               <a:rPr lang="en-US" dirty="0" smtClean="0"/>
               <a:t> = true</a:t>
             </a:r>
-            <a:endParaRPr lang="en-US" dirty="0" smtClean="0"/>
           </a:p>
         </p:txBody>
       </p:sp>

</xml_diff>